<commit_message>
Added new graph diagrams
</commit_message>
<xml_diff>
--- a/Lesson1/Figures/Lesson1Figures.pptx
+++ b/Lesson1/Figures/Lesson1Figures.pptx
@@ -5,8 +5,11 @@
     <p:sldMasterId id="2147483648" r:id="rId1"/>
   </p:sldMasterIdLst>
   <p:sldIdLst>
-    <p:sldId id="256" r:id="rId2"/>
-    <p:sldId id="257" r:id="rId3"/>
+    <p:sldId id="258" r:id="rId2"/>
+    <p:sldId id="256" r:id="rId3"/>
+    <p:sldId id="257" r:id="rId4"/>
+    <p:sldId id="259" r:id="rId5"/>
+    <p:sldId id="260" r:id="rId6"/>
   </p:sldIdLst>
   <p:sldSz cx="12192000" cy="6858000"/>
   <p:notesSz cx="6858000" cy="9144000"/>
@@ -3329,10 +3332,80 @@
       </p:grpSpPr>
       <p:sp>
         <p:nvSpPr>
-          <p:cNvPr id="4" name="Oval 3">
-            <a:extLst>
-              <a:ext uri="{FF2B5EF4-FFF2-40B4-BE49-F238E27FC236}">
-                <a16:creationId xmlns:a16="http://schemas.microsoft.com/office/drawing/2014/main" id="{BB8F69CA-2925-4140-840B-FA90B4908F09}"/>
+          <p:cNvPr id="2" name="TextBox 1">
+            <a:extLst>
+              <a:ext uri="{FF2B5EF4-FFF2-40B4-BE49-F238E27FC236}">
+                <a16:creationId xmlns:a16="http://schemas.microsoft.com/office/drawing/2014/main" id="{8F291190-8AE0-4B34-B33A-F042CB775BEF}"/>
+              </a:ext>
+            </a:extLst>
+          </p:cNvPr>
+          <p:cNvSpPr txBox="1"/>
+          <p:nvPr/>
+        </p:nvSpPr>
+        <p:spPr>
+          <a:xfrm>
+            <a:off x="9860152" y="1966303"/>
+            <a:ext cx="2226340" cy="584775"/>
+          </a:xfrm>
+          <a:prstGeom prst="rect">
+            <a:avLst/>
+          </a:prstGeom>
+          <a:noFill/>
+        </p:spPr>
+        <p:txBody>
+          <a:bodyPr wrap="square" rtlCol="0">
+            <a:spAutoFit/>
+          </a:bodyPr>
+          <a:lstStyle/>
+          <a:p>
+            <a:r>
+              <a:rPr lang="en-US" sz="3200" b="1" dirty="0"/>
+              <a:t>Output  = Y</a:t>
+            </a:r>
+          </a:p>
+        </p:txBody>
+      </p:sp>
+      <p:sp>
+        <p:nvSpPr>
+          <p:cNvPr id="3" name="TextBox 2">
+            <a:extLst>
+              <a:ext uri="{FF2B5EF4-FFF2-40B4-BE49-F238E27FC236}">
+                <a16:creationId xmlns:a16="http://schemas.microsoft.com/office/drawing/2014/main" id="{78627DC6-689B-4EDE-B88F-3B6771300E76}"/>
+              </a:ext>
+            </a:extLst>
+          </p:cNvPr>
+          <p:cNvSpPr txBox="1"/>
+          <p:nvPr/>
+        </p:nvSpPr>
+        <p:spPr>
+          <a:xfrm>
+            <a:off x="276329" y="1966303"/>
+            <a:ext cx="1864215" cy="584775"/>
+          </a:xfrm>
+          <a:prstGeom prst="rect">
+            <a:avLst/>
+          </a:prstGeom>
+          <a:noFill/>
+        </p:spPr>
+        <p:txBody>
+          <a:bodyPr wrap="square" rtlCol="0">
+            <a:spAutoFit/>
+          </a:bodyPr>
+          <a:lstStyle/>
+          <a:p>
+            <a:r>
+              <a:rPr lang="en-US" sz="3200" b="1" dirty="0"/>
+              <a:t>Input  = X</a:t>
+            </a:r>
+          </a:p>
+        </p:txBody>
+      </p:sp>
+      <p:sp>
+        <p:nvSpPr>
+          <p:cNvPr id="4" name="Rectangle: Rounded Corners 3">
+            <a:extLst>
+              <a:ext uri="{FF2B5EF4-FFF2-40B4-BE49-F238E27FC236}">
+                <a16:creationId xmlns:a16="http://schemas.microsoft.com/office/drawing/2014/main" id="{B20B2FA9-CC1C-465E-AEE5-ABF2A51C3FA5}"/>
               </a:ext>
             </a:extLst>
           </p:cNvPr>
@@ -3341,14 +3414,21 @@
         </p:nvSpPr>
         <p:spPr>
           <a:xfrm>
-            <a:off x="5276675" y="1770136"/>
-            <a:ext cx="2101442" cy="1941979"/>
-          </a:xfrm>
-          <a:prstGeom prst="ellipse">
+            <a:off x="2538073" y="1349402"/>
+            <a:ext cx="3127464" cy="1900107"/>
+          </a:xfrm>
+          <a:prstGeom prst="roundRect">
             <a:avLst/>
           </a:prstGeom>
           <a:noFill/>
-          <a:ln w="31750"/>
+          <a:ln w="31750">
+            <a:solidFill>
+              <a:schemeClr val="accent1">
+                <a:shade val="50000"/>
+                <a:alpha val="99000"/>
+              </a:schemeClr>
+            </a:solidFill>
+          </a:ln>
         </p:spPr>
         <p:style>
           <a:lnRef idx="2">
@@ -3371,29 +3451,98 @@
           <a:lstStyle/>
           <a:p>
             <a:pPr algn="ctr"/>
-            <a:endParaRPr lang="en-US"/>
+            <a:r>
+              <a:rPr lang="en-US" sz="3200" b="1" dirty="0">
+                <a:solidFill>
+                  <a:schemeClr val="tx1"/>
+                </a:solidFill>
+              </a:rPr>
+              <a:t>Representation</a:t>
+            </a:r>
+          </a:p>
+        </p:txBody>
+      </p:sp>
+      <p:sp>
+        <p:nvSpPr>
+          <p:cNvPr id="5" name="Rectangle: Rounded Corners 4">
+            <a:extLst>
+              <a:ext uri="{FF2B5EF4-FFF2-40B4-BE49-F238E27FC236}">
+                <a16:creationId xmlns:a16="http://schemas.microsoft.com/office/drawing/2014/main" id="{A1D62B5E-1863-4F1C-A074-1258C3B2700C}"/>
+              </a:ext>
+            </a:extLst>
+          </p:cNvPr>
+          <p:cNvSpPr/>
+          <p:nvPr/>
+        </p:nvSpPr>
+        <p:spPr>
+          <a:xfrm>
+            <a:off x="2575671" y="4285222"/>
+            <a:ext cx="3078258" cy="1900107"/>
+          </a:xfrm>
+          <a:prstGeom prst="roundRect">
+            <a:avLst/>
+          </a:prstGeom>
+          <a:noFill/>
+          <a:ln w="31750">
+            <a:solidFill>
+              <a:schemeClr val="accent1">
+                <a:shade val="50000"/>
+                <a:alpha val="99000"/>
+              </a:schemeClr>
+            </a:solidFill>
+          </a:ln>
+        </p:spPr>
+        <p:style>
+          <a:lnRef idx="2">
+            <a:schemeClr val="accent1">
+              <a:shade val="50000"/>
+            </a:schemeClr>
+          </a:lnRef>
+          <a:fillRef idx="1">
+            <a:schemeClr val="accent1"/>
+          </a:fillRef>
+          <a:effectRef idx="0">
+            <a:schemeClr val="accent1"/>
+          </a:effectRef>
+          <a:fontRef idx="minor">
+            <a:schemeClr val="lt1"/>
+          </a:fontRef>
+        </p:style>
+        <p:txBody>
+          <a:bodyPr rtlCol="0" anchor="ctr"/>
+          <a:lstStyle/>
+          <a:p>
+            <a:pPr algn="ctr"/>
+            <a:r>
+              <a:rPr lang="en-US" sz="3200" b="1" dirty="0">
+                <a:solidFill>
+                  <a:schemeClr val="tx1"/>
+                </a:solidFill>
+              </a:rPr>
+              <a:t>Learning</a:t>
+            </a:r>
           </a:p>
         </p:txBody>
       </p:sp>
       <p:cxnSp>
         <p:nvCxnSpPr>
-          <p:cNvPr id="6" name="Straight Arrow Connector 5">
-            <a:extLst>
-              <a:ext uri="{FF2B5EF4-FFF2-40B4-BE49-F238E27FC236}">
-                <a16:creationId xmlns:a16="http://schemas.microsoft.com/office/drawing/2014/main" id="{EF8B217E-5999-4BD5-905C-EAC4AC0F57CD}"/>
+          <p:cNvPr id="7" name="Straight Arrow Connector 6">
+            <a:extLst>
+              <a:ext uri="{FF2B5EF4-FFF2-40B4-BE49-F238E27FC236}">
+                <a16:creationId xmlns:a16="http://schemas.microsoft.com/office/drawing/2014/main" id="{1FD1BB98-A5A7-44C3-9982-EE448C1674F2}"/>
               </a:ext>
             </a:extLst>
           </p:cNvPr>
           <p:cNvCxnSpPr>
             <a:cxnSpLocks/>
-            <a:stCxn id="4" idx="6"/>
+            <a:endCxn id="36" idx="1"/>
           </p:cNvCxnSpPr>
           <p:nvPr/>
         </p:nvCxnSpPr>
         <p:spPr>
-          <a:xfrm flipV="1">
-            <a:off x="7378117" y="2741101"/>
-            <a:ext cx="982656" cy="25"/>
+          <a:xfrm>
+            <a:off x="5665537" y="2287811"/>
+            <a:ext cx="493264" cy="12971"/>
           </a:xfrm>
           <a:prstGeom prst="straightConnector1">
             <a:avLst/>
@@ -3417,105 +3566,24 @@
           </a:fontRef>
         </p:style>
       </p:cxnSp>
-      <p:sp>
-        <p:nvSpPr>
-          <p:cNvPr id="7" name="TextBox 6">
-            <a:extLst>
-              <a:ext uri="{FF2B5EF4-FFF2-40B4-BE49-F238E27FC236}">
-                <a16:creationId xmlns:a16="http://schemas.microsoft.com/office/drawing/2014/main" id="{093C07B0-9790-4FC9-AD0E-B96F14ADF6E2}"/>
-              </a:ext>
-            </a:extLst>
-          </p:cNvPr>
-          <p:cNvSpPr txBox="1"/>
-          <p:nvPr/>
-        </p:nvSpPr>
-        <p:spPr>
-          <a:xfrm>
-            <a:off x="3225521" y="1104334"/>
-            <a:ext cx="643095" cy="584775"/>
-          </a:xfrm>
-          <a:prstGeom prst="rect">
-            <a:avLst/>
-          </a:prstGeom>
-          <a:noFill/>
-        </p:spPr>
-        <p:txBody>
-          <a:bodyPr wrap="square" rtlCol="0">
-            <a:spAutoFit/>
-          </a:bodyPr>
-          <a:lstStyle/>
-          <a:p>
-            <a:r>
-              <a:rPr lang="en-US" sz="3200" b="1" dirty="0"/>
-              <a:t>X</a:t>
-            </a:r>
-            <a:r>
-              <a:rPr lang="en-US" sz="3200" b="1" baseline="-25000" dirty="0"/>
-              <a:t>1</a:t>
-            </a:r>
-          </a:p>
-        </p:txBody>
-      </p:sp>
-      <p:sp>
-        <p:nvSpPr>
-          <p:cNvPr id="8" name="TextBox 7">
-            <a:extLst>
-              <a:ext uri="{FF2B5EF4-FFF2-40B4-BE49-F238E27FC236}">
-                <a16:creationId xmlns:a16="http://schemas.microsoft.com/office/drawing/2014/main" id="{55C679DA-96B8-4801-8FB9-6C6B2CACFED2}"/>
-              </a:ext>
-            </a:extLst>
-          </p:cNvPr>
-          <p:cNvSpPr txBox="1"/>
-          <p:nvPr/>
-        </p:nvSpPr>
-        <p:spPr>
-          <a:xfrm>
-            <a:off x="5724364" y="2448713"/>
-            <a:ext cx="1115366" cy="584775"/>
-          </a:xfrm>
-          <a:prstGeom prst="rect">
-            <a:avLst/>
-          </a:prstGeom>
-          <a:noFill/>
-        </p:spPr>
-        <p:txBody>
-          <a:bodyPr wrap="square" rtlCol="0">
-            <a:spAutoFit/>
-          </a:bodyPr>
-          <a:lstStyle/>
-          <a:p>
-            <a:r>
-              <a:rPr lang="en-US" sz="3200" b="1" dirty="0">
-                <a:latin typeface="Symbol" panose="05050102010706020507" pitchFamily="18" charset="2"/>
-              </a:rPr>
-              <a:t>S</a:t>
-            </a:r>
-            <a:r>
-              <a:rPr lang="en-US" sz="3200" b="1" dirty="0"/>
-              <a:t> + b</a:t>
-            </a:r>
-          </a:p>
-        </p:txBody>
-      </p:sp>
       <p:cxnSp>
         <p:nvCxnSpPr>
-          <p:cNvPr id="9" name="Straight Arrow Connector 8">
-            <a:extLst>
-              <a:ext uri="{FF2B5EF4-FFF2-40B4-BE49-F238E27FC236}">
-                <a16:creationId xmlns:a16="http://schemas.microsoft.com/office/drawing/2014/main" id="{2BA62E85-2CE6-4124-B74F-6A60D9B42F50}"/>
+          <p:cNvPr id="8" name="Straight Arrow Connector 7">
+            <a:extLst>
+              <a:ext uri="{FF2B5EF4-FFF2-40B4-BE49-F238E27FC236}">
+                <a16:creationId xmlns:a16="http://schemas.microsoft.com/office/drawing/2014/main" id="{D3C9D2F6-56BA-4C6D-BEAF-05455BFA14F5}"/>
               </a:ext>
             </a:extLst>
           </p:cNvPr>
           <p:cNvCxnSpPr>
             <a:cxnSpLocks/>
-            <a:endCxn id="4" idx="1"/>
           </p:cNvCxnSpPr>
           <p:nvPr/>
         </p:nvCxnSpPr>
         <p:spPr>
           <a:xfrm>
-            <a:off x="3926048" y="1436914"/>
-            <a:ext cx="1658376" cy="617618"/>
+            <a:off x="2048131" y="2258691"/>
+            <a:ext cx="489941" cy="1"/>
           </a:xfrm>
           <a:prstGeom prst="straightConnector1">
             <a:avLst/>
@@ -3539,100 +3607,24 @@
           </a:fontRef>
         </p:style>
       </p:cxnSp>
-      <p:sp>
-        <p:nvSpPr>
-          <p:cNvPr id="15" name="TextBox 14">
-            <a:extLst>
-              <a:ext uri="{FF2B5EF4-FFF2-40B4-BE49-F238E27FC236}">
-                <a16:creationId xmlns:a16="http://schemas.microsoft.com/office/drawing/2014/main" id="{99CE5695-F6F7-4CB1-89FC-FA1EE42A5171}"/>
-              </a:ext>
-            </a:extLst>
-          </p:cNvPr>
-          <p:cNvSpPr txBox="1"/>
-          <p:nvPr/>
-        </p:nvSpPr>
-        <p:spPr>
-          <a:xfrm>
-            <a:off x="8335399" y="2448713"/>
-            <a:ext cx="527999" cy="584775"/>
-          </a:xfrm>
-          <a:prstGeom prst="rect">
-            <a:avLst/>
-          </a:prstGeom>
-          <a:noFill/>
-        </p:spPr>
-        <p:txBody>
-          <a:bodyPr wrap="square" rtlCol="0">
-            <a:spAutoFit/>
-          </a:bodyPr>
-          <a:lstStyle/>
-          <a:p>
-            <a:r>
-              <a:rPr lang="en-US" sz="3200" b="1" dirty="0"/>
-              <a:t>Y</a:t>
-            </a:r>
-          </a:p>
-        </p:txBody>
-      </p:sp>
-      <p:sp>
-        <p:nvSpPr>
-          <p:cNvPr id="16" name="TextBox 15">
-            <a:extLst>
-              <a:ext uri="{FF2B5EF4-FFF2-40B4-BE49-F238E27FC236}">
-                <a16:creationId xmlns:a16="http://schemas.microsoft.com/office/drawing/2014/main" id="{8D0794AE-53C6-43BD-BC1A-1BBC3F3A924C}"/>
-              </a:ext>
-            </a:extLst>
-          </p:cNvPr>
-          <p:cNvSpPr txBox="1"/>
-          <p:nvPr/>
-        </p:nvSpPr>
-        <p:spPr>
-          <a:xfrm>
-            <a:off x="3407267" y="3934073"/>
-            <a:ext cx="643095" cy="584775"/>
-          </a:xfrm>
-          <a:prstGeom prst="rect">
-            <a:avLst/>
-          </a:prstGeom>
-          <a:noFill/>
-        </p:spPr>
-        <p:txBody>
-          <a:bodyPr wrap="square" rtlCol="0">
-            <a:spAutoFit/>
-          </a:bodyPr>
-          <a:lstStyle/>
-          <a:p>
-            <a:r>
-              <a:rPr lang="en-US" sz="3200" b="1" dirty="0"/>
-              <a:t>X</a:t>
-            </a:r>
-            <a:r>
-              <a:rPr lang="en-US" sz="3200" b="1" baseline="-25000" dirty="0"/>
-              <a:t>2</a:t>
-            </a:r>
-          </a:p>
-        </p:txBody>
-      </p:sp>
       <p:cxnSp>
         <p:nvCxnSpPr>
-          <p:cNvPr id="17" name="Straight Arrow Connector 16">
-            <a:extLst>
-              <a:ext uri="{FF2B5EF4-FFF2-40B4-BE49-F238E27FC236}">
-                <a16:creationId xmlns:a16="http://schemas.microsoft.com/office/drawing/2014/main" id="{8D8105A9-31D1-4E2D-8B2B-E936C9D52651}"/>
+          <p:cNvPr id="9" name="Straight Arrow Connector 8">
+            <a:extLst>
+              <a:ext uri="{FF2B5EF4-FFF2-40B4-BE49-F238E27FC236}">
+                <a16:creationId xmlns:a16="http://schemas.microsoft.com/office/drawing/2014/main" id="{D52E5BA6-AB35-40C9-AF23-097E7377D0CB}"/>
               </a:ext>
             </a:extLst>
           </p:cNvPr>
           <p:cNvCxnSpPr>
             <a:cxnSpLocks/>
-            <a:stCxn id="16" idx="3"/>
-            <a:endCxn id="4" idx="3"/>
           </p:cNvCxnSpPr>
           <p:nvPr/>
         </p:nvCxnSpPr>
         <p:spPr>
-          <a:xfrm flipV="1">
-            <a:off x="4050362" y="3427719"/>
-            <a:ext cx="1534062" cy="798742"/>
+          <a:xfrm>
+            <a:off x="3655867" y="3249509"/>
+            <a:ext cx="0" cy="1076307"/>
           </a:xfrm>
           <a:prstGeom prst="straightConnector1">
             <a:avLst/>
@@ -3656,64 +3648,24 @@
           </a:fontRef>
         </p:style>
       </p:cxnSp>
-      <p:sp>
-        <p:nvSpPr>
-          <p:cNvPr id="19" name="TextBox 18">
-            <a:extLst>
-              <a:ext uri="{FF2B5EF4-FFF2-40B4-BE49-F238E27FC236}">
-                <a16:creationId xmlns:a16="http://schemas.microsoft.com/office/drawing/2014/main" id="{B16B5E90-5D9E-4D80-B81C-2841402B34C1}"/>
-              </a:ext>
-            </a:extLst>
-          </p:cNvPr>
-          <p:cNvSpPr txBox="1"/>
-          <p:nvPr/>
-        </p:nvSpPr>
-        <p:spPr>
-          <a:xfrm>
-            <a:off x="3148299" y="2448714"/>
-            <a:ext cx="643095" cy="584775"/>
-          </a:xfrm>
-          <a:prstGeom prst="rect">
-            <a:avLst/>
-          </a:prstGeom>
-          <a:noFill/>
-        </p:spPr>
-        <p:txBody>
-          <a:bodyPr wrap="square" rtlCol="0">
-            <a:spAutoFit/>
-          </a:bodyPr>
-          <a:lstStyle/>
-          <a:p>
-            <a:r>
-              <a:rPr lang="en-US" sz="3200" b="1"/>
-              <a:t>X</a:t>
-            </a:r>
-            <a:r>
-              <a:rPr lang="en-US" sz="3200" b="1" baseline="-25000" dirty="0"/>
-              <a:t>2</a:t>
-            </a:r>
-          </a:p>
-        </p:txBody>
-      </p:sp>
       <p:cxnSp>
         <p:nvCxnSpPr>
-          <p:cNvPr id="20" name="Straight Arrow Connector 19">
-            <a:extLst>
-              <a:ext uri="{FF2B5EF4-FFF2-40B4-BE49-F238E27FC236}">
-                <a16:creationId xmlns:a16="http://schemas.microsoft.com/office/drawing/2014/main" id="{F8E97B63-C2BB-4E6B-9BEC-ECB8D4B05667}"/>
+          <p:cNvPr id="13" name="Straight Arrow Connector 12">
+            <a:extLst>
+              <a:ext uri="{FF2B5EF4-FFF2-40B4-BE49-F238E27FC236}">
+                <a16:creationId xmlns:a16="http://schemas.microsoft.com/office/drawing/2014/main" id="{94B502A3-C336-466A-AF5D-07899D30F994}"/>
               </a:ext>
             </a:extLst>
           </p:cNvPr>
           <p:cNvCxnSpPr>
             <a:cxnSpLocks/>
-            <a:endCxn id="4" idx="2"/>
           </p:cNvCxnSpPr>
           <p:nvPr/>
         </p:nvCxnSpPr>
         <p:spPr>
-          <a:xfrm flipV="1">
-            <a:off x="3850210" y="2741126"/>
-            <a:ext cx="1426465" cy="58842"/>
+          <a:xfrm flipH="1" flipV="1">
+            <a:off x="4730261" y="3249509"/>
+            <a:ext cx="5804" cy="1035714"/>
           </a:xfrm>
           <a:prstGeom prst="straightConnector1">
             <a:avLst/>
@@ -3737,127 +3689,196 @@
           </a:fontRef>
         </p:style>
       </p:cxnSp>
-      <p:sp>
-        <p:nvSpPr>
-          <p:cNvPr id="12" name="TextBox 11">
-            <a:extLst>
-              <a:ext uri="{FF2B5EF4-FFF2-40B4-BE49-F238E27FC236}">
-                <a16:creationId xmlns:a16="http://schemas.microsoft.com/office/drawing/2014/main" id="{5DD43739-AF60-4011-BAF4-56ADA4EFAEF3}"/>
-              </a:ext>
-            </a:extLst>
-          </p:cNvPr>
-          <p:cNvSpPr txBox="1"/>
-          <p:nvPr/>
-        </p:nvSpPr>
-        <p:spPr>
-          <a:xfrm>
-            <a:off x="4710802" y="1214723"/>
-            <a:ext cx="643095" cy="584775"/>
-          </a:xfrm>
-          <a:prstGeom prst="rect">
+      <p:cxnSp>
+        <p:nvCxnSpPr>
+          <p:cNvPr id="17" name="Straight Arrow Connector 16">
+            <a:extLst>
+              <a:ext uri="{FF2B5EF4-FFF2-40B4-BE49-F238E27FC236}">
+                <a16:creationId xmlns:a16="http://schemas.microsoft.com/office/drawing/2014/main" id="{07EE5E18-FD25-465B-8275-B71A8450F9C0}"/>
+              </a:ext>
+            </a:extLst>
+          </p:cNvPr>
+          <p:cNvCxnSpPr>
+            <a:cxnSpLocks/>
+            <a:endCxn id="5" idx="3"/>
+          </p:cNvCxnSpPr>
+          <p:nvPr/>
+        </p:nvCxnSpPr>
+        <p:spPr>
+          <a:xfrm flipH="1">
+            <a:off x="5653929" y="5235275"/>
+            <a:ext cx="2068604" cy="1"/>
+          </a:xfrm>
+          <a:prstGeom prst="straightConnector1">
+            <a:avLst/>
+          </a:prstGeom>
+          <a:ln w="31750">
+            <a:tailEnd type="triangle"/>
+          </a:ln>
+        </p:spPr>
+        <p:style>
+          <a:lnRef idx="1">
+            <a:schemeClr val="accent1"/>
+          </a:lnRef>
+          <a:fillRef idx="0">
+            <a:schemeClr val="accent1"/>
+          </a:fillRef>
+          <a:effectRef idx="0">
+            <a:schemeClr val="accent1"/>
+          </a:effectRef>
+          <a:fontRef idx="minor">
+            <a:schemeClr val="tx1"/>
+          </a:fontRef>
+        </p:style>
+      </p:cxnSp>
+      <p:cxnSp>
+        <p:nvCxnSpPr>
+          <p:cNvPr id="21" name="Straight Arrow Connector 20">
+            <a:extLst>
+              <a:ext uri="{FF2B5EF4-FFF2-40B4-BE49-F238E27FC236}">
+                <a16:creationId xmlns:a16="http://schemas.microsoft.com/office/drawing/2014/main" id="{A2A9B33C-CF02-46AF-BF67-8757A0DF98D2}"/>
+              </a:ext>
+            </a:extLst>
+          </p:cNvPr>
+          <p:cNvCxnSpPr>
+            <a:cxnSpLocks/>
+          </p:cNvCxnSpPr>
+          <p:nvPr/>
+        </p:nvCxnSpPr>
+        <p:spPr>
+          <a:xfrm>
+            <a:off x="7722533" y="3237864"/>
+            <a:ext cx="0" cy="1997411"/>
+          </a:xfrm>
+          <a:prstGeom prst="straightConnector1">
+            <a:avLst/>
+          </a:prstGeom>
+          <a:ln w="31750">
+            <a:tailEnd type="none"/>
+          </a:ln>
+        </p:spPr>
+        <p:style>
+          <a:lnRef idx="1">
+            <a:schemeClr val="accent1"/>
+          </a:lnRef>
+          <a:fillRef idx="0">
+            <a:schemeClr val="accent1"/>
+          </a:fillRef>
+          <a:effectRef idx="0">
+            <a:schemeClr val="accent1"/>
+          </a:effectRef>
+          <a:fontRef idx="minor">
+            <a:schemeClr val="tx1"/>
+          </a:fontRef>
+        </p:style>
+      </p:cxnSp>
+      <p:sp>
+        <p:nvSpPr>
+          <p:cNvPr id="36" name="Rectangle: Rounded Corners 35">
+            <a:extLst>
+              <a:ext uri="{FF2B5EF4-FFF2-40B4-BE49-F238E27FC236}">
+                <a16:creationId xmlns:a16="http://schemas.microsoft.com/office/drawing/2014/main" id="{084A2593-059A-427E-935A-08B573AF1D8B}"/>
+              </a:ext>
+            </a:extLst>
+          </p:cNvPr>
+          <p:cNvSpPr/>
+          <p:nvPr/>
+        </p:nvSpPr>
+        <p:spPr>
+          <a:xfrm>
+            <a:off x="6158801" y="1350728"/>
+            <a:ext cx="3127464" cy="1900107"/>
+          </a:xfrm>
+          <a:prstGeom prst="roundRect">
             <a:avLst/>
           </a:prstGeom>
           <a:noFill/>
-        </p:spPr>
-        <p:txBody>
-          <a:bodyPr wrap="square" rtlCol="0">
-            <a:spAutoFit/>
-          </a:bodyPr>
-          <a:lstStyle/>
-          <a:p>
-            <a:r>
-              <a:rPr lang="en-US" sz="3200" b="1" dirty="0"/>
-              <a:t>w</a:t>
-            </a:r>
-            <a:r>
-              <a:rPr lang="en-US" sz="3200" b="1" baseline="-25000" dirty="0"/>
-              <a:t>1</a:t>
-            </a:r>
-          </a:p>
-        </p:txBody>
-      </p:sp>
-      <p:sp>
-        <p:nvSpPr>
-          <p:cNvPr id="21" name="TextBox 20">
-            <a:extLst>
-              <a:ext uri="{FF2B5EF4-FFF2-40B4-BE49-F238E27FC236}">
-                <a16:creationId xmlns:a16="http://schemas.microsoft.com/office/drawing/2014/main" id="{06C8F561-519B-4BCC-9EED-6B8768CC0B53}"/>
-              </a:ext>
-            </a:extLst>
-          </p:cNvPr>
-          <p:cNvSpPr txBox="1"/>
-          <p:nvPr/>
-        </p:nvSpPr>
-        <p:spPr>
-          <a:xfrm>
-            <a:off x="4212487" y="2193704"/>
-            <a:ext cx="643095" cy="584775"/>
-          </a:xfrm>
-          <a:prstGeom prst="rect">
-            <a:avLst/>
-          </a:prstGeom>
-          <a:noFill/>
-        </p:spPr>
-        <p:txBody>
-          <a:bodyPr wrap="square" rtlCol="0">
-            <a:spAutoFit/>
-          </a:bodyPr>
-          <a:lstStyle/>
-          <a:p>
-            <a:r>
-              <a:rPr lang="en-US" sz="3200" b="1" dirty="0"/>
-              <a:t>w</a:t>
-            </a:r>
-            <a:r>
-              <a:rPr lang="en-US" sz="3200" b="1" baseline="-25000" dirty="0"/>
-              <a:t>2</a:t>
-            </a:r>
-          </a:p>
-        </p:txBody>
-      </p:sp>
-      <p:sp>
-        <p:nvSpPr>
-          <p:cNvPr id="22" name="TextBox 21">
-            <a:extLst>
-              <a:ext uri="{FF2B5EF4-FFF2-40B4-BE49-F238E27FC236}">
-                <a16:creationId xmlns:a16="http://schemas.microsoft.com/office/drawing/2014/main" id="{F4A6AE4C-45D3-4481-A30E-7B6D8BD4F913}"/>
-              </a:ext>
-            </a:extLst>
-          </p:cNvPr>
-          <p:cNvSpPr txBox="1"/>
-          <p:nvPr/>
-        </p:nvSpPr>
-        <p:spPr>
-          <a:xfrm>
-            <a:off x="4563442" y="3079179"/>
-            <a:ext cx="643095" cy="584775"/>
-          </a:xfrm>
-          <a:prstGeom prst="rect">
-            <a:avLst/>
-          </a:prstGeom>
-          <a:noFill/>
-        </p:spPr>
-        <p:txBody>
-          <a:bodyPr wrap="square" rtlCol="0">
-            <a:spAutoFit/>
-          </a:bodyPr>
-          <a:lstStyle/>
-          <a:p>
-            <a:r>
-              <a:rPr lang="en-US" sz="3200" b="1" dirty="0"/>
-              <a:t>w</a:t>
-            </a:r>
-            <a:r>
-              <a:rPr lang="en-US" sz="3200" b="1" baseline="-25000" dirty="0"/>
-              <a:t>3</a:t>
-            </a:r>
-          </a:p>
-        </p:txBody>
-      </p:sp>
+          <a:ln w="31750">
+            <a:solidFill>
+              <a:schemeClr val="accent1">
+                <a:shade val="50000"/>
+                <a:alpha val="99000"/>
+              </a:schemeClr>
+            </a:solidFill>
+          </a:ln>
+        </p:spPr>
+        <p:style>
+          <a:lnRef idx="2">
+            <a:schemeClr val="accent1">
+              <a:shade val="50000"/>
+            </a:schemeClr>
+          </a:lnRef>
+          <a:fillRef idx="1">
+            <a:schemeClr val="accent1"/>
+          </a:fillRef>
+          <a:effectRef idx="0">
+            <a:schemeClr val="accent1"/>
+          </a:effectRef>
+          <a:fontRef idx="minor">
+            <a:schemeClr val="lt1"/>
+          </a:fontRef>
+        </p:style>
+        <p:txBody>
+          <a:bodyPr rtlCol="0" anchor="ctr"/>
+          <a:lstStyle/>
+          <a:p>
+            <a:pPr algn="ctr"/>
+            <a:r>
+              <a:rPr lang="en-US" sz="3200" b="1" dirty="0">
+                <a:solidFill>
+                  <a:schemeClr val="tx1"/>
+                </a:solidFill>
+              </a:rPr>
+              <a:t>Inference</a:t>
+            </a:r>
+          </a:p>
+        </p:txBody>
+      </p:sp>
+      <p:cxnSp>
+        <p:nvCxnSpPr>
+          <p:cNvPr id="41" name="Straight Arrow Connector 40">
+            <a:extLst>
+              <a:ext uri="{FF2B5EF4-FFF2-40B4-BE49-F238E27FC236}">
+                <a16:creationId xmlns:a16="http://schemas.microsoft.com/office/drawing/2014/main" id="{38B9C0CD-BEFA-4478-AE00-87AF30EB0249}"/>
+              </a:ext>
+            </a:extLst>
+          </p:cNvPr>
+          <p:cNvCxnSpPr>
+            <a:cxnSpLocks/>
+          </p:cNvCxnSpPr>
+          <p:nvPr/>
+        </p:nvCxnSpPr>
+        <p:spPr>
+          <a:xfrm flipV="1">
+            <a:off x="9286265" y="2294296"/>
+            <a:ext cx="493264" cy="6485"/>
+          </a:xfrm>
+          <a:prstGeom prst="straightConnector1">
+            <a:avLst/>
+          </a:prstGeom>
+          <a:ln w="31750">
+            <a:tailEnd type="triangle"/>
+          </a:ln>
+        </p:spPr>
+        <p:style>
+          <a:lnRef idx="1">
+            <a:schemeClr val="accent1"/>
+          </a:lnRef>
+          <a:fillRef idx="0">
+            <a:schemeClr val="accent1"/>
+          </a:fillRef>
+          <a:effectRef idx="0">
+            <a:schemeClr val="accent1"/>
+          </a:effectRef>
+          <a:fontRef idx="minor">
+            <a:schemeClr val="tx1"/>
+          </a:fontRef>
+        </p:style>
+      </p:cxnSp>
     </p:spTree>
     <p:extLst>
       <p:ext uri="{BB962C8B-B14F-4D97-AF65-F5344CB8AC3E}">
-        <p14:creationId xmlns:p14="http://schemas.microsoft.com/office/powerpoint/2010/main" val="152181687"/>
+        <p14:creationId xmlns:p14="http://schemas.microsoft.com/office/powerpoint/2010/main" val="380732829"/>
       </p:ext>
     </p:extLst>
   </p:cSld>
@@ -4027,8 +4048,8 @@
         </p:nvSpPr>
         <p:spPr>
           <a:xfrm>
-            <a:off x="5584424" y="2464619"/>
-            <a:ext cx="1738350" cy="584775"/>
+            <a:off x="5724364" y="2448713"/>
+            <a:ext cx="1115366" cy="584775"/>
           </a:xfrm>
           <a:prstGeom prst="rect">
             <a:avLst/>
@@ -4045,17 +4066,11 @@
               <a:rPr lang="en-US" sz="3200" b="1" dirty="0">
                 <a:latin typeface="Symbol" panose="05050102010706020507" pitchFamily="18" charset="2"/>
               </a:rPr>
-              <a:t>s(S</a:t>
+              <a:t>S</a:t>
             </a:r>
             <a:r>
               <a:rPr lang="en-US" sz="3200" b="1" dirty="0"/>
               <a:t> + b</a:t>
-            </a:r>
-            <a:r>
-              <a:rPr lang="en-US" sz="3200" b="1" dirty="0">
-                <a:latin typeface="Symbol" panose="05050102010706020507" pitchFamily="18" charset="2"/>
-              </a:rPr>
-              <a:t>)</a:t>
             </a:r>
           </a:p>
         </p:txBody>
@@ -4420,7 +4435,3330 @@
     </p:spTree>
     <p:extLst>
       <p:ext uri="{BB962C8B-B14F-4D97-AF65-F5344CB8AC3E}">
+        <p14:creationId xmlns:p14="http://schemas.microsoft.com/office/powerpoint/2010/main" val="152181687"/>
+      </p:ext>
+    </p:extLst>
+  </p:cSld>
+  <p:clrMapOvr>
+    <a:masterClrMapping/>
+  </p:clrMapOvr>
+</p:sld>
+</file>
+
+<file path=ppt/slides/slide3.xml><?xml version="1.0" encoding="utf-8"?>
+<p:sld xmlns:a="http://schemas.openxmlformats.org/drawingml/2006/main" xmlns:r="http://schemas.openxmlformats.org/officeDocument/2006/relationships" xmlns:p="http://schemas.openxmlformats.org/presentationml/2006/main">
+  <p:cSld>
+    <p:spTree>
+      <p:nvGrpSpPr>
+        <p:cNvPr id="1" name=""/>
+        <p:cNvGrpSpPr/>
+        <p:nvPr/>
+      </p:nvGrpSpPr>
+      <p:grpSpPr>
+        <a:xfrm>
+          <a:off x="0" y="0"/>
+          <a:ext cx="0" cy="0"/>
+          <a:chOff x="0" y="0"/>
+          <a:chExt cx="0" cy="0"/>
+        </a:xfrm>
+      </p:grpSpPr>
+      <p:sp>
+        <p:nvSpPr>
+          <p:cNvPr id="4" name="Oval 3">
+            <a:extLst>
+              <a:ext uri="{FF2B5EF4-FFF2-40B4-BE49-F238E27FC236}">
+                <a16:creationId xmlns:a16="http://schemas.microsoft.com/office/drawing/2014/main" id="{BB8F69CA-2925-4140-840B-FA90B4908F09}"/>
+              </a:ext>
+            </a:extLst>
+          </p:cNvPr>
+          <p:cNvSpPr/>
+          <p:nvPr/>
+        </p:nvSpPr>
+        <p:spPr>
+          <a:xfrm>
+            <a:off x="5276675" y="1770136"/>
+            <a:ext cx="2101442" cy="1941979"/>
+          </a:xfrm>
+          <a:prstGeom prst="ellipse">
+            <a:avLst/>
+          </a:prstGeom>
+          <a:noFill/>
+          <a:ln w="31750"/>
+        </p:spPr>
+        <p:style>
+          <a:lnRef idx="2">
+            <a:schemeClr val="accent1">
+              <a:shade val="50000"/>
+            </a:schemeClr>
+          </a:lnRef>
+          <a:fillRef idx="1">
+            <a:schemeClr val="accent1"/>
+          </a:fillRef>
+          <a:effectRef idx="0">
+            <a:schemeClr val="accent1"/>
+          </a:effectRef>
+          <a:fontRef idx="minor">
+            <a:schemeClr val="lt1"/>
+          </a:fontRef>
+        </p:style>
+        <p:txBody>
+          <a:bodyPr rtlCol="0" anchor="ctr"/>
+          <a:lstStyle/>
+          <a:p>
+            <a:pPr algn="ctr"/>
+            <a:endParaRPr lang="en-US"/>
+          </a:p>
+        </p:txBody>
+      </p:sp>
+      <p:cxnSp>
+        <p:nvCxnSpPr>
+          <p:cNvPr id="6" name="Straight Arrow Connector 5">
+            <a:extLst>
+              <a:ext uri="{FF2B5EF4-FFF2-40B4-BE49-F238E27FC236}">
+                <a16:creationId xmlns:a16="http://schemas.microsoft.com/office/drawing/2014/main" id="{EF8B217E-5999-4BD5-905C-EAC4AC0F57CD}"/>
+              </a:ext>
+            </a:extLst>
+          </p:cNvPr>
+          <p:cNvCxnSpPr>
+            <a:cxnSpLocks/>
+            <a:stCxn id="4" idx="6"/>
+          </p:cNvCxnSpPr>
+          <p:nvPr/>
+        </p:nvCxnSpPr>
+        <p:spPr>
+          <a:xfrm flipV="1">
+            <a:off x="7378117" y="2741101"/>
+            <a:ext cx="982656" cy="25"/>
+          </a:xfrm>
+          <a:prstGeom prst="straightConnector1">
+            <a:avLst/>
+          </a:prstGeom>
+          <a:ln w="31750">
+            <a:tailEnd type="triangle"/>
+          </a:ln>
+        </p:spPr>
+        <p:style>
+          <a:lnRef idx="1">
+            <a:schemeClr val="accent1"/>
+          </a:lnRef>
+          <a:fillRef idx="0">
+            <a:schemeClr val="accent1"/>
+          </a:fillRef>
+          <a:effectRef idx="0">
+            <a:schemeClr val="accent1"/>
+          </a:effectRef>
+          <a:fontRef idx="minor">
+            <a:schemeClr val="tx1"/>
+          </a:fontRef>
+        </p:style>
+      </p:cxnSp>
+      <p:sp>
+        <p:nvSpPr>
+          <p:cNvPr id="7" name="TextBox 6">
+            <a:extLst>
+              <a:ext uri="{FF2B5EF4-FFF2-40B4-BE49-F238E27FC236}">
+                <a16:creationId xmlns:a16="http://schemas.microsoft.com/office/drawing/2014/main" id="{093C07B0-9790-4FC9-AD0E-B96F14ADF6E2}"/>
+              </a:ext>
+            </a:extLst>
+          </p:cNvPr>
+          <p:cNvSpPr txBox="1"/>
+          <p:nvPr/>
+        </p:nvSpPr>
+        <p:spPr>
+          <a:xfrm>
+            <a:off x="3225521" y="1104334"/>
+            <a:ext cx="643095" cy="584775"/>
+          </a:xfrm>
+          <a:prstGeom prst="rect">
+            <a:avLst/>
+          </a:prstGeom>
+          <a:noFill/>
+        </p:spPr>
+        <p:txBody>
+          <a:bodyPr wrap="square" rtlCol="0">
+            <a:spAutoFit/>
+          </a:bodyPr>
+          <a:lstStyle/>
+          <a:p>
+            <a:r>
+              <a:rPr lang="en-US" sz="3200" b="1" dirty="0"/>
+              <a:t>X</a:t>
+            </a:r>
+            <a:r>
+              <a:rPr lang="en-US" sz="3200" b="1" baseline="-25000" dirty="0"/>
+              <a:t>1</a:t>
+            </a:r>
+          </a:p>
+        </p:txBody>
+      </p:sp>
+      <p:sp>
+        <p:nvSpPr>
+          <p:cNvPr id="8" name="TextBox 7">
+            <a:extLst>
+              <a:ext uri="{FF2B5EF4-FFF2-40B4-BE49-F238E27FC236}">
+                <a16:creationId xmlns:a16="http://schemas.microsoft.com/office/drawing/2014/main" id="{55C679DA-96B8-4801-8FB9-6C6B2CACFED2}"/>
+              </a:ext>
+            </a:extLst>
+          </p:cNvPr>
+          <p:cNvSpPr txBox="1"/>
+          <p:nvPr/>
+        </p:nvSpPr>
+        <p:spPr>
+          <a:xfrm>
+            <a:off x="5584424" y="2464619"/>
+            <a:ext cx="1738350" cy="584775"/>
+          </a:xfrm>
+          <a:prstGeom prst="rect">
+            <a:avLst/>
+          </a:prstGeom>
+          <a:noFill/>
+        </p:spPr>
+        <p:txBody>
+          <a:bodyPr wrap="square" rtlCol="0">
+            <a:spAutoFit/>
+          </a:bodyPr>
+          <a:lstStyle/>
+          <a:p>
+            <a:r>
+              <a:rPr lang="en-US" sz="3200" b="1" dirty="0">
+                <a:latin typeface="Symbol" panose="05050102010706020507" pitchFamily="18" charset="2"/>
+              </a:rPr>
+              <a:t>s(S</a:t>
+            </a:r>
+            <a:r>
+              <a:rPr lang="en-US" sz="3200" b="1" dirty="0"/>
+              <a:t> + b</a:t>
+            </a:r>
+            <a:r>
+              <a:rPr lang="en-US" sz="3200" b="1" dirty="0">
+                <a:latin typeface="Symbol" panose="05050102010706020507" pitchFamily="18" charset="2"/>
+              </a:rPr>
+              <a:t>)</a:t>
+            </a:r>
+          </a:p>
+        </p:txBody>
+      </p:sp>
+      <p:cxnSp>
+        <p:nvCxnSpPr>
+          <p:cNvPr id="9" name="Straight Arrow Connector 8">
+            <a:extLst>
+              <a:ext uri="{FF2B5EF4-FFF2-40B4-BE49-F238E27FC236}">
+                <a16:creationId xmlns:a16="http://schemas.microsoft.com/office/drawing/2014/main" id="{2BA62E85-2CE6-4124-B74F-6A60D9B42F50}"/>
+              </a:ext>
+            </a:extLst>
+          </p:cNvPr>
+          <p:cNvCxnSpPr>
+            <a:cxnSpLocks/>
+            <a:endCxn id="4" idx="1"/>
+          </p:cNvCxnSpPr>
+          <p:nvPr/>
+        </p:nvCxnSpPr>
+        <p:spPr>
+          <a:xfrm>
+            <a:off x="3926048" y="1436914"/>
+            <a:ext cx="1658376" cy="617618"/>
+          </a:xfrm>
+          <a:prstGeom prst="straightConnector1">
+            <a:avLst/>
+          </a:prstGeom>
+          <a:ln w="31750">
+            <a:tailEnd type="triangle"/>
+          </a:ln>
+        </p:spPr>
+        <p:style>
+          <a:lnRef idx="1">
+            <a:schemeClr val="accent1"/>
+          </a:lnRef>
+          <a:fillRef idx="0">
+            <a:schemeClr val="accent1"/>
+          </a:fillRef>
+          <a:effectRef idx="0">
+            <a:schemeClr val="accent1"/>
+          </a:effectRef>
+          <a:fontRef idx="minor">
+            <a:schemeClr val="tx1"/>
+          </a:fontRef>
+        </p:style>
+      </p:cxnSp>
+      <p:sp>
+        <p:nvSpPr>
+          <p:cNvPr id="15" name="TextBox 14">
+            <a:extLst>
+              <a:ext uri="{FF2B5EF4-FFF2-40B4-BE49-F238E27FC236}">
+                <a16:creationId xmlns:a16="http://schemas.microsoft.com/office/drawing/2014/main" id="{99CE5695-F6F7-4CB1-89FC-FA1EE42A5171}"/>
+              </a:ext>
+            </a:extLst>
+          </p:cNvPr>
+          <p:cNvSpPr txBox="1"/>
+          <p:nvPr/>
+        </p:nvSpPr>
+        <p:spPr>
+          <a:xfrm>
+            <a:off x="8335399" y="2448713"/>
+            <a:ext cx="527999" cy="584775"/>
+          </a:xfrm>
+          <a:prstGeom prst="rect">
+            <a:avLst/>
+          </a:prstGeom>
+          <a:noFill/>
+        </p:spPr>
+        <p:txBody>
+          <a:bodyPr wrap="square" rtlCol="0">
+            <a:spAutoFit/>
+          </a:bodyPr>
+          <a:lstStyle/>
+          <a:p>
+            <a:r>
+              <a:rPr lang="en-US" sz="3200" b="1" dirty="0"/>
+              <a:t>Y</a:t>
+            </a:r>
+          </a:p>
+        </p:txBody>
+      </p:sp>
+      <p:sp>
+        <p:nvSpPr>
+          <p:cNvPr id="16" name="TextBox 15">
+            <a:extLst>
+              <a:ext uri="{FF2B5EF4-FFF2-40B4-BE49-F238E27FC236}">
+                <a16:creationId xmlns:a16="http://schemas.microsoft.com/office/drawing/2014/main" id="{8D0794AE-53C6-43BD-BC1A-1BBC3F3A924C}"/>
+              </a:ext>
+            </a:extLst>
+          </p:cNvPr>
+          <p:cNvSpPr txBox="1"/>
+          <p:nvPr/>
+        </p:nvSpPr>
+        <p:spPr>
+          <a:xfrm>
+            <a:off x="3407267" y="3934073"/>
+            <a:ext cx="643095" cy="584775"/>
+          </a:xfrm>
+          <a:prstGeom prst="rect">
+            <a:avLst/>
+          </a:prstGeom>
+          <a:noFill/>
+        </p:spPr>
+        <p:txBody>
+          <a:bodyPr wrap="square" rtlCol="0">
+            <a:spAutoFit/>
+          </a:bodyPr>
+          <a:lstStyle/>
+          <a:p>
+            <a:r>
+              <a:rPr lang="en-US" sz="3200" b="1" dirty="0"/>
+              <a:t>X</a:t>
+            </a:r>
+            <a:r>
+              <a:rPr lang="en-US" sz="3200" b="1" baseline="-25000" dirty="0"/>
+              <a:t>2</a:t>
+            </a:r>
+          </a:p>
+        </p:txBody>
+      </p:sp>
+      <p:cxnSp>
+        <p:nvCxnSpPr>
+          <p:cNvPr id="17" name="Straight Arrow Connector 16">
+            <a:extLst>
+              <a:ext uri="{FF2B5EF4-FFF2-40B4-BE49-F238E27FC236}">
+                <a16:creationId xmlns:a16="http://schemas.microsoft.com/office/drawing/2014/main" id="{8D8105A9-31D1-4E2D-8B2B-E936C9D52651}"/>
+              </a:ext>
+            </a:extLst>
+          </p:cNvPr>
+          <p:cNvCxnSpPr>
+            <a:cxnSpLocks/>
+            <a:stCxn id="16" idx="3"/>
+            <a:endCxn id="4" idx="3"/>
+          </p:cNvCxnSpPr>
+          <p:nvPr/>
+        </p:nvCxnSpPr>
+        <p:spPr>
+          <a:xfrm flipV="1">
+            <a:off x="4050362" y="3427719"/>
+            <a:ext cx="1534062" cy="798742"/>
+          </a:xfrm>
+          <a:prstGeom prst="straightConnector1">
+            <a:avLst/>
+          </a:prstGeom>
+          <a:ln w="31750">
+            <a:tailEnd type="triangle"/>
+          </a:ln>
+        </p:spPr>
+        <p:style>
+          <a:lnRef idx="1">
+            <a:schemeClr val="accent1"/>
+          </a:lnRef>
+          <a:fillRef idx="0">
+            <a:schemeClr val="accent1"/>
+          </a:fillRef>
+          <a:effectRef idx="0">
+            <a:schemeClr val="accent1"/>
+          </a:effectRef>
+          <a:fontRef idx="minor">
+            <a:schemeClr val="tx1"/>
+          </a:fontRef>
+        </p:style>
+      </p:cxnSp>
+      <p:sp>
+        <p:nvSpPr>
+          <p:cNvPr id="19" name="TextBox 18">
+            <a:extLst>
+              <a:ext uri="{FF2B5EF4-FFF2-40B4-BE49-F238E27FC236}">
+                <a16:creationId xmlns:a16="http://schemas.microsoft.com/office/drawing/2014/main" id="{B16B5E90-5D9E-4D80-B81C-2841402B34C1}"/>
+              </a:ext>
+            </a:extLst>
+          </p:cNvPr>
+          <p:cNvSpPr txBox="1"/>
+          <p:nvPr/>
+        </p:nvSpPr>
+        <p:spPr>
+          <a:xfrm>
+            <a:off x="3148299" y="2448714"/>
+            <a:ext cx="643095" cy="584775"/>
+          </a:xfrm>
+          <a:prstGeom prst="rect">
+            <a:avLst/>
+          </a:prstGeom>
+          <a:noFill/>
+        </p:spPr>
+        <p:txBody>
+          <a:bodyPr wrap="square" rtlCol="0">
+            <a:spAutoFit/>
+          </a:bodyPr>
+          <a:lstStyle/>
+          <a:p>
+            <a:r>
+              <a:rPr lang="en-US" sz="3200" b="1"/>
+              <a:t>X</a:t>
+            </a:r>
+            <a:r>
+              <a:rPr lang="en-US" sz="3200" b="1" baseline="-25000" dirty="0"/>
+              <a:t>2</a:t>
+            </a:r>
+          </a:p>
+        </p:txBody>
+      </p:sp>
+      <p:cxnSp>
+        <p:nvCxnSpPr>
+          <p:cNvPr id="20" name="Straight Arrow Connector 19">
+            <a:extLst>
+              <a:ext uri="{FF2B5EF4-FFF2-40B4-BE49-F238E27FC236}">
+                <a16:creationId xmlns:a16="http://schemas.microsoft.com/office/drawing/2014/main" id="{F8E97B63-C2BB-4E6B-9BEC-ECB8D4B05667}"/>
+              </a:ext>
+            </a:extLst>
+          </p:cNvPr>
+          <p:cNvCxnSpPr>
+            <a:cxnSpLocks/>
+            <a:endCxn id="4" idx="2"/>
+          </p:cNvCxnSpPr>
+          <p:nvPr/>
+        </p:nvCxnSpPr>
+        <p:spPr>
+          <a:xfrm flipV="1">
+            <a:off x="3850210" y="2741126"/>
+            <a:ext cx="1426465" cy="58842"/>
+          </a:xfrm>
+          <a:prstGeom prst="straightConnector1">
+            <a:avLst/>
+          </a:prstGeom>
+          <a:ln w="31750">
+            <a:tailEnd type="triangle"/>
+          </a:ln>
+        </p:spPr>
+        <p:style>
+          <a:lnRef idx="1">
+            <a:schemeClr val="accent1"/>
+          </a:lnRef>
+          <a:fillRef idx="0">
+            <a:schemeClr val="accent1"/>
+          </a:fillRef>
+          <a:effectRef idx="0">
+            <a:schemeClr val="accent1"/>
+          </a:effectRef>
+          <a:fontRef idx="minor">
+            <a:schemeClr val="tx1"/>
+          </a:fontRef>
+        </p:style>
+      </p:cxnSp>
+      <p:sp>
+        <p:nvSpPr>
+          <p:cNvPr id="12" name="TextBox 11">
+            <a:extLst>
+              <a:ext uri="{FF2B5EF4-FFF2-40B4-BE49-F238E27FC236}">
+                <a16:creationId xmlns:a16="http://schemas.microsoft.com/office/drawing/2014/main" id="{5DD43739-AF60-4011-BAF4-56ADA4EFAEF3}"/>
+              </a:ext>
+            </a:extLst>
+          </p:cNvPr>
+          <p:cNvSpPr txBox="1"/>
+          <p:nvPr/>
+        </p:nvSpPr>
+        <p:spPr>
+          <a:xfrm>
+            <a:off x="4710802" y="1214723"/>
+            <a:ext cx="643095" cy="584775"/>
+          </a:xfrm>
+          <a:prstGeom prst="rect">
+            <a:avLst/>
+          </a:prstGeom>
+          <a:noFill/>
+        </p:spPr>
+        <p:txBody>
+          <a:bodyPr wrap="square" rtlCol="0">
+            <a:spAutoFit/>
+          </a:bodyPr>
+          <a:lstStyle/>
+          <a:p>
+            <a:r>
+              <a:rPr lang="en-US" sz="3200" b="1" dirty="0"/>
+              <a:t>w</a:t>
+            </a:r>
+            <a:r>
+              <a:rPr lang="en-US" sz="3200" b="1" baseline="-25000" dirty="0"/>
+              <a:t>1</a:t>
+            </a:r>
+          </a:p>
+        </p:txBody>
+      </p:sp>
+      <p:sp>
+        <p:nvSpPr>
+          <p:cNvPr id="21" name="TextBox 20">
+            <a:extLst>
+              <a:ext uri="{FF2B5EF4-FFF2-40B4-BE49-F238E27FC236}">
+                <a16:creationId xmlns:a16="http://schemas.microsoft.com/office/drawing/2014/main" id="{06C8F561-519B-4BCC-9EED-6B8768CC0B53}"/>
+              </a:ext>
+            </a:extLst>
+          </p:cNvPr>
+          <p:cNvSpPr txBox="1"/>
+          <p:nvPr/>
+        </p:nvSpPr>
+        <p:spPr>
+          <a:xfrm>
+            <a:off x="4212487" y="2193704"/>
+            <a:ext cx="643095" cy="584775"/>
+          </a:xfrm>
+          <a:prstGeom prst="rect">
+            <a:avLst/>
+          </a:prstGeom>
+          <a:noFill/>
+        </p:spPr>
+        <p:txBody>
+          <a:bodyPr wrap="square" rtlCol="0">
+            <a:spAutoFit/>
+          </a:bodyPr>
+          <a:lstStyle/>
+          <a:p>
+            <a:r>
+              <a:rPr lang="en-US" sz="3200" b="1" dirty="0"/>
+              <a:t>w</a:t>
+            </a:r>
+            <a:r>
+              <a:rPr lang="en-US" sz="3200" b="1" baseline="-25000" dirty="0"/>
+              <a:t>2</a:t>
+            </a:r>
+          </a:p>
+        </p:txBody>
+      </p:sp>
+      <p:sp>
+        <p:nvSpPr>
+          <p:cNvPr id="22" name="TextBox 21">
+            <a:extLst>
+              <a:ext uri="{FF2B5EF4-FFF2-40B4-BE49-F238E27FC236}">
+                <a16:creationId xmlns:a16="http://schemas.microsoft.com/office/drawing/2014/main" id="{F4A6AE4C-45D3-4481-A30E-7B6D8BD4F913}"/>
+              </a:ext>
+            </a:extLst>
+          </p:cNvPr>
+          <p:cNvSpPr txBox="1"/>
+          <p:nvPr/>
+        </p:nvSpPr>
+        <p:spPr>
+          <a:xfrm>
+            <a:off x="4563442" y="3079179"/>
+            <a:ext cx="643095" cy="584775"/>
+          </a:xfrm>
+          <a:prstGeom prst="rect">
+            <a:avLst/>
+          </a:prstGeom>
+          <a:noFill/>
+        </p:spPr>
+        <p:txBody>
+          <a:bodyPr wrap="square" rtlCol="0">
+            <a:spAutoFit/>
+          </a:bodyPr>
+          <a:lstStyle/>
+          <a:p>
+            <a:r>
+              <a:rPr lang="en-US" sz="3200" b="1" dirty="0"/>
+              <a:t>w</a:t>
+            </a:r>
+            <a:r>
+              <a:rPr lang="en-US" sz="3200" b="1" baseline="-25000" dirty="0"/>
+              <a:t>3</a:t>
+            </a:r>
+          </a:p>
+        </p:txBody>
+      </p:sp>
+    </p:spTree>
+    <p:extLst>
+      <p:ext uri="{BB962C8B-B14F-4D97-AF65-F5344CB8AC3E}">
         <p14:creationId xmlns:p14="http://schemas.microsoft.com/office/powerpoint/2010/main" val="1789802455"/>
+      </p:ext>
+    </p:extLst>
+  </p:cSld>
+  <p:clrMapOvr>
+    <a:masterClrMapping/>
+  </p:clrMapOvr>
+</p:sld>
+</file>
+
+<file path=ppt/slides/slide4.xml><?xml version="1.0" encoding="utf-8"?>
+<p:sld xmlns:a="http://schemas.openxmlformats.org/drawingml/2006/main" xmlns:r="http://schemas.openxmlformats.org/officeDocument/2006/relationships" xmlns:p="http://schemas.openxmlformats.org/presentationml/2006/main">
+  <p:cSld>
+    <p:spTree>
+      <p:nvGrpSpPr>
+        <p:cNvPr id="1" name=""/>
+        <p:cNvGrpSpPr/>
+        <p:nvPr/>
+      </p:nvGrpSpPr>
+      <p:grpSpPr>
+        <a:xfrm>
+          <a:off x="0" y="0"/>
+          <a:ext cx="0" cy="0"/>
+          <a:chOff x="0" y="0"/>
+          <a:chExt cx="0" cy="0"/>
+        </a:xfrm>
+      </p:grpSpPr>
+      <p:sp>
+        <p:nvSpPr>
+          <p:cNvPr id="4" name="Oval 3">
+            <a:extLst>
+              <a:ext uri="{FF2B5EF4-FFF2-40B4-BE49-F238E27FC236}">
+                <a16:creationId xmlns:a16="http://schemas.microsoft.com/office/drawing/2014/main" id="{BB8F69CA-2925-4140-840B-FA90B4908F09}"/>
+              </a:ext>
+            </a:extLst>
+          </p:cNvPr>
+          <p:cNvSpPr/>
+          <p:nvPr/>
+        </p:nvSpPr>
+        <p:spPr>
+          <a:xfrm>
+            <a:off x="8200745" y="1895740"/>
+            <a:ext cx="2101442" cy="1941979"/>
+          </a:xfrm>
+          <a:prstGeom prst="ellipse">
+            <a:avLst/>
+          </a:prstGeom>
+          <a:noFill/>
+          <a:ln w="31750"/>
+        </p:spPr>
+        <p:style>
+          <a:lnRef idx="2">
+            <a:schemeClr val="accent1">
+              <a:shade val="50000"/>
+            </a:schemeClr>
+          </a:lnRef>
+          <a:fillRef idx="1">
+            <a:schemeClr val="accent1"/>
+          </a:fillRef>
+          <a:effectRef idx="0">
+            <a:schemeClr val="accent1"/>
+          </a:effectRef>
+          <a:fontRef idx="minor">
+            <a:schemeClr val="lt1"/>
+          </a:fontRef>
+        </p:style>
+        <p:txBody>
+          <a:bodyPr rtlCol="0" anchor="ctr"/>
+          <a:lstStyle/>
+          <a:p>
+            <a:pPr algn="ctr"/>
+            <a:endParaRPr lang="en-US"/>
+          </a:p>
+        </p:txBody>
+      </p:sp>
+      <p:cxnSp>
+        <p:nvCxnSpPr>
+          <p:cNvPr id="6" name="Straight Arrow Connector 5">
+            <a:extLst>
+              <a:ext uri="{FF2B5EF4-FFF2-40B4-BE49-F238E27FC236}">
+                <a16:creationId xmlns:a16="http://schemas.microsoft.com/office/drawing/2014/main" id="{EF8B217E-5999-4BD5-905C-EAC4AC0F57CD}"/>
+              </a:ext>
+            </a:extLst>
+          </p:cNvPr>
+          <p:cNvCxnSpPr>
+            <a:cxnSpLocks/>
+            <a:stCxn id="4" idx="6"/>
+            <a:endCxn id="15" idx="1"/>
+          </p:cNvCxnSpPr>
+          <p:nvPr/>
+        </p:nvCxnSpPr>
+        <p:spPr>
+          <a:xfrm>
+            <a:off x="10302187" y="2866730"/>
+            <a:ext cx="780998" cy="15881"/>
+          </a:xfrm>
+          <a:prstGeom prst="straightConnector1">
+            <a:avLst/>
+          </a:prstGeom>
+          <a:ln w="31750">
+            <a:tailEnd type="triangle"/>
+          </a:ln>
+        </p:spPr>
+        <p:style>
+          <a:lnRef idx="1">
+            <a:schemeClr val="accent1"/>
+          </a:lnRef>
+          <a:fillRef idx="0">
+            <a:schemeClr val="accent1"/>
+          </a:fillRef>
+          <a:effectRef idx="0">
+            <a:schemeClr val="accent1"/>
+          </a:effectRef>
+          <a:fontRef idx="minor">
+            <a:schemeClr val="tx1"/>
+          </a:fontRef>
+        </p:style>
+      </p:cxnSp>
+      <p:sp>
+        <p:nvSpPr>
+          <p:cNvPr id="7" name="TextBox 6">
+            <a:extLst>
+              <a:ext uri="{FF2B5EF4-FFF2-40B4-BE49-F238E27FC236}">
+                <a16:creationId xmlns:a16="http://schemas.microsoft.com/office/drawing/2014/main" id="{093C07B0-9790-4FC9-AD0E-B96F14ADF6E2}"/>
+              </a:ext>
+            </a:extLst>
+          </p:cNvPr>
+          <p:cNvSpPr txBox="1"/>
+          <p:nvPr/>
+        </p:nvSpPr>
+        <p:spPr>
+          <a:xfrm>
+            <a:off x="556966" y="640252"/>
+            <a:ext cx="643095" cy="584775"/>
+          </a:xfrm>
+          <a:prstGeom prst="rect">
+            <a:avLst/>
+          </a:prstGeom>
+          <a:noFill/>
+        </p:spPr>
+        <p:txBody>
+          <a:bodyPr wrap="square" rtlCol="0">
+            <a:spAutoFit/>
+          </a:bodyPr>
+          <a:lstStyle/>
+          <a:p>
+            <a:r>
+              <a:rPr lang="en-US" sz="3200" b="1" dirty="0"/>
+              <a:t>X</a:t>
+            </a:r>
+            <a:r>
+              <a:rPr lang="en-US" sz="3200" b="1" baseline="-25000" dirty="0"/>
+              <a:t>1</a:t>
+            </a:r>
+          </a:p>
+        </p:txBody>
+      </p:sp>
+      <p:sp>
+        <p:nvSpPr>
+          <p:cNvPr id="8" name="TextBox 7">
+            <a:extLst>
+              <a:ext uri="{FF2B5EF4-FFF2-40B4-BE49-F238E27FC236}">
+                <a16:creationId xmlns:a16="http://schemas.microsoft.com/office/drawing/2014/main" id="{55C679DA-96B8-4801-8FB9-6C6B2CACFED2}"/>
+              </a:ext>
+            </a:extLst>
+          </p:cNvPr>
+          <p:cNvSpPr txBox="1"/>
+          <p:nvPr/>
+        </p:nvSpPr>
+        <p:spPr>
+          <a:xfrm>
+            <a:off x="8289289" y="2590223"/>
+            <a:ext cx="1957555" cy="1138773"/>
+          </a:xfrm>
+          <a:prstGeom prst="rect">
+            <a:avLst/>
+          </a:prstGeom>
+          <a:noFill/>
+        </p:spPr>
+        <p:txBody>
+          <a:bodyPr wrap="square" rtlCol="0">
+            <a:spAutoFit/>
+          </a:bodyPr>
+          <a:lstStyle/>
+          <a:p>
+            <a:pPr algn="ctr"/>
+            <a:r>
+              <a:rPr lang="en-US" sz="3200" b="1" dirty="0">
+                <a:latin typeface="Symbol" panose="05050102010706020507" pitchFamily="18" charset="2"/>
+              </a:rPr>
+              <a:t>s</a:t>
+            </a:r>
+            <a:r>
+              <a:rPr lang="en-US" sz="3200" b="1" baseline="-25000" dirty="0">
+                <a:latin typeface="Symbol" panose="05050102010706020507" pitchFamily="18" charset="2"/>
+              </a:rPr>
+              <a:t>o</a:t>
+            </a:r>
+            <a:r>
+              <a:rPr lang="en-US" sz="3200" b="1" dirty="0">
+                <a:latin typeface="Symbol" panose="05050102010706020507" pitchFamily="18" charset="2"/>
+              </a:rPr>
+              <a:t>(S</a:t>
+            </a:r>
+            <a:r>
+              <a:rPr lang="en-US" sz="3200" b="1" dirty="0"/>
+              <a:t> + </a:t>
+            </a:r>
+            <a:r>
+              <a:rPr lang="en-US" sz="3200" b="1" dirty="0" err="1"/>
+              <a:t>b</a:t>
+            </a:r>
+            <a:r>
+              <a:rPr lang="en-US" sz="3200" b="1" baseline="30000" dirty="0" err="1"/>
+              <a:t>o</a:t>
+            </a:r>
+            <a:r>
+              <a:rPr lang="en-US" sz="3200" b="1" dirty="0">
+                <a:latin typeface="Symbol" panose="05050102010706020507" pitchFamily="18" charset="2"/>
+              </a:rPr>
+              <a:t>)</a:t>
+            </a:r>
+            <a:endParaRPr lang="en-US" sz="2800" b="1" dirty="0">
+              <a:latin typeface="Symbol" panose="05050102010706020507" pitchFamily="18" charset="2"/>
+            </a:endParaRPr>
+          </a:p>
+          <a:p>
+            <a:pPr algn="ctr"/>
+            <a:r>
+              <a:rPr lang="en-US" sz="3600" b="1" dirty="0"/>
+              <a:t>o</a:t>
+            </a:r>
+          </a:p>
+        </p:txBody>
+      </p:sp>
+      <p:cxnSp>
+        <p:nvCxnSpPr>
+          <p:cNvPr id="9" name="Straight Arrow Connector 8">
+            <a:extLst>
+              <a:ext uri="{FF2B5EF4-FFF2-40B4-BE49-F238E27FC236}">
+                <a16:creationId xmlns:a16="http://schemas.microsoft.com/office/drawing/2014/main" id="{2BA62E85-2CE6-4124-B74F-6A60D9B42F50}"/>
+              </a:ext>
+            </a:extLst>
+          </p:cNvPr>
+          <p:cNvCxnSpPr>
+            <a:cxnSpLocks/>
+            <a:stCxn id="7" idx="3"/>
+            <a:endCxn id="23" idx="1"/>
+          </p:cNvCxnSpPr>
+          <p:nvPr/>
+        </p:nvCxnSpPr>
+        <p:spPr>
+          <a:xfrm>
+            <a:off x="1200061" y="932640"/>
+            <a:ext cx="3906336" cy="0"/>
+          </a:xfrm>
+          <a:prstGeom prst="straightConnector1">
+            <a:avLst/>
+          </a:prstGeom>
+          <a:ln w="31750">
+            <a:tailEnd type="triangle"/>
+          </a:ln>
+        </p:spPr>
+        <p:style>
+          <a:lnRef idx="1">
+            <a:schemeClr val="accent1"/>
+          </a:lnRef>
+          <a:fillRef idx="0">
+            <a:schemeClr val="accent1"/>
+          </a:fillRef>
+          <a:effectRef idx="0">
+            <a:schemeClr val="accent1"/>
+          </a:effectRef>
+          <a:fontRef idx="minor">
+            <a:schemeClr val="tx1"/>
+          </a:fontRef>
+        </p:style>
+      </p:cxnSp>
+      <p:sp>
+        <p:nvSpPr>
+          <p:cNvPr id="15" name="TextBox 14">
+            <a:extLst>
+              <a:ext uri="{FF2B5EF4-FFF2-40B4-BE49-F238E27FC236}">
+                <a16:creationId xmlns:a16="http://schemas.microsoft.com/office/drawing/2014/main" id="{99CE5695-F6F7-4CB1-89FC-FA1EE42A5171}"/>
+              </a:ext>
+            </a:extLst>
+          </p:cNvPr>
+          <p:cNvSpPr txBox="1"/>
+          <p:nvPr/>
+        </p:nvSpPr>
+        <p:spPr>
+          <a:xfrm>
+            <a:off x="11083185" y="2590223"/>
+            <a:ext cx="527999" cy="584775"/>
+          </a:xfrm>
+          <a:prstGeom prst="rect">
+            <a:avLst/>
+          </a:prstGeom>
+          <a:noFill/>
+        </p:spPr>
+        <p:txBody>
+          <a:bodyPr wrap="square" rtlCol="0">
+            <a:spAutoFit/>
+          </a:bodyPr>
+          <a:lstStyle/>
+          <a:p>
+            <a:r>
+              <a:rPr lang="en-US" sz="3200" b="1" dirty="0"/>
+              <a:t>Y</a:t>
+            </a:r>
+          </a:p>
+        </p:txBody>
+      </p:sp>
+      <p:sp>
+        <p:nvSpPr>
+          <p:cNvPr id="16" name="TextBox 15">
+            <a:extLst>
+              <a:ext uri="{FF2B5EF4-FFF2-40B4-BE49-F238E27FC236}">
+                <a16:creationId xmlns:a16="http://schemas.microsoft.com/office/drawing/2014/main" id="{8D0794AE-53C6-43BD-BC1A-1BBC3F3A924C}"/>
+              </a:ext>
+            </a:extLst>
+          </p:cNvPr>
+          <p:cNvSpPr txBox="1"/>
+          <p:nvPr/>
+        </p:nvSpPr>
+        <p:spPr>
+          <a:xfrm>
+            <a:off x="544764" y="4643803"/>
+            <a:ext cx="643095" cy="584775"/>
+          </a:xfrm>
+          <a:prstGeom prst="rect">
+            <a:avLst/>
+          </a:prstGeom>
+          <a:noFill/>
+        </p:spPr>
+        <p:txBody>
+          <a:bodyPr wrap="square" rtlCol="0">
+            <a:spAutoFit/>
+          </a:bodyPr>
+          <a:lstStyle/>
+          <a:p>
+            <a:r>
+              <a:rPr lang="en-US" sz="3200" b="1" dirty="0"/>
+              <a:t>X</a:t>
+            </a:r>
+            <a:r>
+              <a:rPr lang="en-US" sz="3200" b="1" baseline="-25000" dirty="0"/>
+              <a:t>2</a:t>
+            </a:r>
+          </a:p>
+        </p:txBody>
+      </p:sp>
+      <p:cxnSp>
+        <p:nvCxnSpPr>
+          <p:cNvPr id="17" name="Straight Arrow Connector 16">
+            <a:extLst>
+              <a:ext uri="{FF2B5EF4-FFF2-40B4-BE49-F238E27FC236}">
+                <a16:creationId xmlns:a16="http://schemas.microsoft.com/office/drawing/2014/main" id="{8D8105A9-31D1-4E2D-8B2B-E936C9D52651}"/>
+              </a:ext>
+            </a:extLst>
+          </p:cNvPr>
+          <p:cNvCxnSpPr>
+            <a:cxnSpLocks/>
+            <a:stCxn id="16" idx="3"/>
+            <a:endCxn id="23" idx="3"/>
+          </p:cNvCxnSpPr>
+          <p:nvPr/>
+        </p:nvCxnSpPr>
+        <p:spPr>
+          <a:xfrm flipV="1">
+            <a:off x="1187859" y="2305827"/>
+            <a:ext cx="3918538" cy="2630364"/>
+          </a:xfrm>
+          <a:prstGeom prst="straightConnector1">
+            <a:avLst/>
+          </a:prstGeom>
+          <a:ln w="31750">
+            <a:tailEnd type="triangle"/>
+          </a:ln>
+        </p:spPr>
+        <p:style>
+          <a:lnRef idx="1">
+            <a:schemeClr val="accent1"/>
+          </a:lnRef>
+          <a:fillRef idx="0">
+            <a:schemeClr val="accent1"/>
+          </a:fillRef>
+          <a:effectRef idx="0">
+            <a:schemeClr val="accent1"/>
+          </a:effectRef>
+          <a:fontRef idx="minor">
+            <a:schemeClr val="tx1"/>
+          </a:fontRef>
+        </p:style>
+      </p:cxnSp>
+      <p:sp>
+        <p:nvSpPr>
+          <p:cNvPr id="19" name="TextBox 18">
+            <a:extLst>
+              <a:ext uri="{FF2B5EF4-FFF2-40B4-BE49-F238E27FC236}">
+                <a16:creationId xmlns:a16="http://schemas.microsoft.com/office/drawing/2014/main" id="{B16B5E90-5D9E-4D80-B81C-2841402B34C1}"/>
+              </a:ext>
+            </a:extLst>
+          </p:cNvPr>
+          <p:cNvSpPr txBox="1"/>
+          <p:nvPr/>
+        </p:nvSpPr>
+        <p:spPr>
+          <a:xfrm>
+            <a:off x="612957" y="2547565"/>
+            <a:ext cx="643095" cy="584775"/>
+          </a:xfrm>
+          <a:prstGeom prst="rect">
+            <a:avLst/>
+          </a:prstGeom>
+          <a:noFill/>
+        </p:spPr>
+        <p:txBody>
+          <a:bodyPr wrap="square" rtlCol="0">
+            <a:spAutoFit/>
+          </a:bodyPr>
+          <a:lstStyle/>
+          <a:p>
+            <a:r>
+              <a:rPr lang="en-US" sz="3200" b="1" dirty="0"/>
+              <a:t>X</a:t>
+            </a:r>
+            <a:r>
+              <a:rPr lang="en-US" sz="3200" b="1" baseline="-25000" dirty="0"/>
+              <a:t>2</a:t>
+            </a:r>
+          </a:p>
+        </p:txBody>
+      </p:sp>
+      <p:cxnSp>
+        <p:nvCxnSpPr>
+          <p:cNvPr id="20" name="Straight Arrow Connector 19">
+            <a:extLst>
+              <a:ext uri="{FF2B5EF4-FFF2-40B4-BE49-F238E27FC236}">
+                <a16:creationId xmlns:a16="http://schemas.microsoft.com/office/drawing/2014/main" id="{F8E97B63-C2BB-4E6B-9BEC-ECB8D4B05667}"/>
+              </a:ext>
+            </a:extLst>
+          </p:cNvPr>
+          <p:cNvCxnSpPr>
+            <a:cxnSpLocks/>
+            <a:endCxn id="25" idx="1"/>
+          </p:cNvCxnSpPr>
+          <p:nvPr/>
+        </p:nvCxnSpPr>
+        <p:spPr>
+          <a:xfrm>
+            <a:off x="1187859" y="1162724"/>
+            <a:ext cx="3974474" cy="2226416"/>
+          </a:xfrm>
+          <a:prstGeom prst="straightConnector1">
+            <a:avLst/>
+          </a:prstGeom>
+          <a:ln w="31750">
+            <a:tailEnd type="triangle"/>
+          </a:ln>
+        </p:spPr>
+        <p:style>
+          <a:lnRef idx="1">
+            <a:schemeClr val="accent1"/>
+          </a:lnRef>
+          <a:fillRef idx="0">
+            <a:schemeClr val="accent1"/>
+          </a:fillRef>
+          <a:effectRef idx="0">
+            <a:schemeClr val="accent1"/>
+          </a:effectRef>
+          <a:fontRef idx="minor">
+            <a:schemeClr val="tx1"/>
+          </a:fontRef>
+        </p:style>
+      </p:cxnSp>
+      <p:sp>
+        <p:nvSpPr>
+          <p:cNvPr id="12" name="TextBox 11">
+            <a:extLst>
+              <a:ext uri="{FF2B5EF4-FFF2-40B4-BE49-F238E27FC236}">
+                <a16:creationId xmlns:a16="http://schemas.microsoft.com/office/drawing/2014/main" id="{5DD43739-AF60-4011-BAF4-56ADA4EFAEF3}"/>
+              </a:ext>
+            </a:extLst>
+          </p:cNvPr>
+          <p:cNvSpPr txBox="1"/>
+          <p:nvPr/>
+        </p:nvSpPr>
+        <p:spPr>
+          <a:xfrm>
+            <a:off x="7278434" y="1248609"/>
+            <a:ext cx="922311" cy="584775"/>
+          </a:xfrm>
+          <a:prstGeom prst="rect">
+            <a:avLst/>
+          </a:prstGeom>
+          <a:noFill/>
+        </p:spPr>
+        <p:txBody>
+          <a:bodyPr wrap="square" rtlCol="0">
+            <a:spAutoFit/>
+          </a:bodyPr>
+          <a:lstStyle/>
+          <a:p>
+            <a:r>
+              <a:rPr lang="en-US" sz="3200" b="1" dirty="0"/>
+              <a:t>w</a:t>
+            </a:r>
+            <a:r>
+              <a:rPr lang="en-US" sz="3200" b="1" baseline="30000" dirty="0"/>
+              <a:t>2</a:t>
+            </a:r>
+            <a:r>
+              <a:rPr lang="en-US" sz="3200" b="1" baseline="-25000" dirty="0"/>
+              <a:t>1</a:t>
+            </a:r>
+          </a:p>
+        </p:txBody>
+      </p:sp>
+      <p:sp>
+        <p:nvSpPr>
+          <p:cNvPr id="23" name="Oval 22">
+            <a:extLst>
+              <a:ext uri="{FF2B5EF4-FFF2-40B4-BE49-F238E27FC236}">
+                <a16:creationId xmlns:a16="http://schemas.microsoft.com/office/drawing/2014/main" id="{FDEE81E1-CA82-4978-9204-09DB3526C7E2}"/>
+              </a:ext>
+            </a:extLst>
+          </p:cNvPr>
+          <p:cNvSpPr/>
+          <p:nvPr/>
+        </p:nvSpPr>
+        <p:spPr>
+          <a:xfrm>
+            <a:off x="4798648" y="648244"/>
+            <a:ext cx="2101442" cy="1941979"/>
+          </a:xfrm>
+          <a:prstGeom prst="ellipse">
+            <a:avLst/>
+          </a:prstGeom>
+          <a:noFill/>
+          <a:ln w="31750"/>
+        </p:spPr>
+        <p:style>
+          <a:lnRef idx="2">
+            <a:schemeClr val="accent1">
+              <a:shade val="50000"/>
+            </a:schemeClr>
+          </a:lnRef>
+          <a:fillRef idx="1">
+            <a:schemeClr val="accent1"/>
+          </a:fillRef>
+          <a:effectRef idx="0">
+            <a:schemeClr val="accent1"/>
+          </a:effectRef>
+          <a:fontRef idx="minor">
+            <a:schemeClr val="lt1"/>
+          </a:fontRef>
+        </p:style>
+        <p:txBody>
+          <a:bodyPr rtlCol="0" anchor="ctr"/>
+          <a:lstStyle/>
+          <a:p>
+            <a:pPr algn="ctr"/>
+            <a:endParaRPr lang="en-US"/>
+          </a:p>
+        </p:txBody>
+      </p:sp>
+      <p:sp>
+        <p:nvSpPr>
+          <p:cNvPr id="24" name="TextBox 23">
+            <a:extLst>
+              <a:ext uri="{FF2B5EF4-FFF2-40B4-BE49-F238E27FC236}">
+                <a16:creationId xmlns:a16="http://schemas.microsoft.com/office/drawing/2014/main" id="{B13E7420-A6E2-4A44-8B0E-7008920594E7}"/>
+              </a:ext>
+            </a:extLst>
+          </p:cNvPr>
+          <p:cNvSpPr txBox="1"/>
+          <p:nvPr/>
+        </p:nvSpPr>
+        <p:spPr>
+          <a:xfrm>
+            <a:off x="4887192" y="1342727"/>
+            <a:ext cx="1957555" cy="1138773"/>
+          </a:xfrm>
+          <a:prstGeom prst="rect">
+            <a:avLst/>
+          </a:prstGeom>
+          <a:noFill/>
+        </p:spPr>
+        <p:txBody>
+          <a:bodyPr wrap="square" rtlCol="0">
+            <a:spAutoFit/>
+          </a:bodyPr>
+          <a:lstStyle/>
+          <a:p>
+            <a:pPr algn="ctr"/>
+            <a:r>
+              <a:rPr lang="en-US" sz="3200" b="1" dirty="0" err="1">
+                <a:latin typeface="Symbol" panose="05050102010706020507" pitchFamily="18" charset="2"/>
+              </a:rPr>
+              <a:t>s</a:t>
+            </a:r>
+            <a:r>
+              <a:rPr lang="en-US" sz="3200" b="1" baseline="-25000" dirty="0" err="1"/>
+              <a:t>h</a:t>
+            </a:r>
+            <a:r>
+              <a:rPr lang="en-US" sz="3200" b="1" dirty="0">
+                <a:latin typeface="Symbol" panose="05050102010706020507" pitchFamily="18" charset="2"/>
+              </a:rPr>
+              <a:t>(S</a:t>
+            </a:r>
+            <a:r>
+              <a:rPr lang="en-US" sz="3200" b="1" dirty="0"/>
+              <a:t> + </a:t>
+            </a:r>
+            <a:r>
+              <a:rPr lang="en-US" sz="3200" b="1" dirty="0" err="1"/>
+              <a:t>b</a:t>
+            </a:r>
+            <a:r>
+              <a:rPr lang="en-US" sz="3200" b="1" baseline="-25000" dirty="0" err="1"/>
+              <a:t>h</a:t>
+            </a:r>
+            <a:r>
+              <a:rPr lang="en-US" sz="3200" b="1" dirty="0">
+                <a:latin typeface="Symbol" panose="05050102010706020507" pitchFamily="18" charset="2"/>
+              </a:rPr>
+              <a:t>) </a:t>
+            </a:r>
+          </a:p>
+          <a:p>
+            <a:pPr algn="ctr"/>
+            <a:r>
+              <a:rPr lang="en-US" sz="3600" b="1" dirty="0"/>
+              <a:t>h</a:t>
+            </a:r>
+            <a:r>
+              <a:rPr lang="en-US" sz="3600" b="1" baseline="30000" dirty="0">
+                <a:latin typeface="Symbol" panose="05050102010706020507" pitchFamily="18" charset="2"/>
+              </a:rPr>
+              <a:t>1</a:t>
+            </a:r>
+            <a:r>
+              <a:rPr lang="en-US" sz="3600" b="1" baseline="-25000" dirty="0">
+                <a:latin typeface="Symbol" panose="05050102010706020507" pitchFamily="18" charset="2"/>
+              </a:rPr>
+              <a:t>1</a:t>
+            </a:r>
+          </a:p>
+        </p:txBody>
+      </p:sp>
+      <p:sp>
+        <p:nvSpPr>
+          <p:cNvPr id="25" name="Oval 24">
+            <a:extLst>
+              <a:ext uri="{FF2B5EF4-FFF2-40B4-BE49-F238E27FC236}">
+                <a16:creationId xmlns:a16="http://schemas.microsoft.com/office/drawing/2014/main" id="{C0261D15-2FE3-4F64-8A26-8891028D75B7}"/>
+              </a:ext>
+            </a:extLst>
+          </p:cNvPr>
+          <p:cNvSpPr/>
+          <p:nvPr/>
+        </p:nvSpPr>
+        <p:spPr>
+          <a:xfrm>
+            <a:off x="4854584" y="3104744"/>
+            <a:ext cx="2101442" cy="1941979"/>
+          </a:xfrm>
+          <a:prstGeom prst="ellipse">
+            <a:avLst/>
+          </a:prstGeom>
+          <a:noFill/>
+          <a:ln w="31750"/>
+        </p:spPr>
+        <p:style>
+          <a:lnRef idx="2">
+            <a:schemeClr val="accent1">
+              <a:shade val="50000"/>
+            </a:schemeClr>
+          </a:lnRef>
+          <a:fillRef idx="1">
+            <a:schemeClr val="accent1"/>
+          </a:fillRef>
+          <a:effectRef idx="0">
+            <a:schemeClr val="accent1"/>
+          </a:effectRef>
+          <a:fontRef idx="minor">
+            <a:schemeClr val="lt1"/>
+          </a:fontRef>
+        </p:style>
+        <p:txBody>
+          <a:bodyPr rtlCol="0" anchor="ctr"/>
+          <a:lstStyle/>
+          <a:p>
+            <a:pPr algn="ctr"/>
+            <a:endParaRPr lang="en-US"/>
+          </a:p>
+        </p:txBody>
+      </p:sp>
+      <p:sp>
+        <p:nvSpPr>
+          <p:cNvPr id="26" name="TextBox 25">
+            <a:extLst>
+              <a:ext uri="{FF2B5EF4-FFF2-40B4-BE49-F238E27FC236}">
+                <a16:creationId xmlns:a16="http://schemas.microsoft.com/office/drawing/2014/main" id="{8158276B-CF75-4815-BAFD-EEFA043A10DE}"/>
+              </a:ext>
+            </a:extLst>
+          </p:cNvPr>
+          <p:cNvSpPr txBox="1"/>
+          <p:nvPr/>
+        </p:nvSpPr>
+        <p:spPr>
+          <a:xfrm>
+            <a:off x="4943128" y="3799227"/>
+            <a:ext cx="1957555" cy="1138773"/>
+          </a:xfrm>
+          <a:prstGeom prst="rect">
+            <a:avLst/>
+          </a:prstGeom>
+          <a:noFill/>
+        </p:spPr>
+        <p:txBody>
+          <a:bodyPr wrap="square" rtlCol="0">
+            <a:spAutoFit/>
+          </a:bodyPr>
+          <a:lstStyle/>
+          <a:p>
+            <a:pPr algn="ctr"/>
+            <a:r>
+              <a:rPr lang="en-US" sz="3200" b="1" dirty="0" err="1">
+                <a:latin typeface="Symbol" panose="05050102010706020507" pitchFamily="18" charset="2"/>
+              </a:rPr>
+              <a:t>s</a:t>
+            </a:r>
+            <a:r>
+              <a:rPr lang="en-US" sz="3200" b="1" baseline="-25000" dirty="0" err="1"/>
+              <a:t>h</a:t>
+            </a:r>
+            <a:r>
+              <a:rPr lang="en-US" sz="3200" b="1" dirty="0">
+                <a:latin typeface="Symbol" panose="05050102010706020507" pitchFamily="18" charset="2"/>
+              </a:rPr>
+              <a:t>(S</a:t>
+            </a:r>
+            <a:r>
+              <a:rPr lang="en-US" sz="3200" b="1" dirty="0"/>
+              <a:t> + </a:t>
+            </a:r>
+            <a:r>
+              <a:rPr lang="en-US" sz="3200" b="1" dirty="0" err="1"/>
+              <a:t>b</a:t>
+            </a:r>
+            <a:r>
+              <a:rPr lang="en-US" sz="3200" b="1" baseline="-25000" dirty="0" err="1"/>
+              <a:t>h</a:t>
+            </a:r>
+            <a:r>
+              <a:rPr lang="en-US" sz="3200" b="1" dirty="0">
+                <a:latin typeface="Symbol" panose="05050102010706020507" pitchFamily="18" charset="2"/>
+              </a:rPr>
+              <a:t>)</a:t>
+            </a:r>
+          </a:p>
+          <a:p>
+            <a:pPr algn="ctr"/>
+            <a:r>
+              <a:rPr lang="en-US" sz="3600" b="1" dirty="0"/>
+              <a:t>h</a:t>
+            </a:r>
+            <a:r>
+              <a:rPr lang="en-US" sz="3600" b="1" baseline="30000" dirty="0"/>
+              <a:t>1</a:t>
+            </a:r>
+            <a:r>
+              <a:rPr lang="en-US" sz="3600" b="1" baseline="-25000" dirty="0">
+                <a:latin typeface="Symbol" panose="05050102010706020507" pitchFamily="18" charset="2"/>
+              </a:rPr>
+              <a:t>2</a:t>
+            </a:r>
+          </a:p>
+        </p:txBody>
+      </p:sp>
+      <p:cxnSp>
+        <p:nvCxnSpPr>
+          <p:cNvPr id="27" name="Straight Arrow Connector 26">
+            <a:extLst>
+              <a:ext uri="{FF2B5EF4-FFF2-40B4-BE49-F238E27FC236}">
+                <a16:creationId xmlns:a16="http://schemas.microsoft.com/office/drawing/2014/main" id="{680F9380-7E10-4157-B021-0B98DFC9D30D}"/>
+              </a:ext>
+            </a:extLst>
+          </p:cNvPr>
+          <p:cNvCxnSpPr>
+            <a:cxnSpLocks/>
+          </p:cNvCxnSpPr>
+          <p:nvPr/>
+        </p:nvCxnSpPr>
+        <p:spPr>
+          <a:xfrm>
+            <a:off x="6844747" y="1824405"/>
+            <a:ext cx="1512683" cy="624289"/>
+          </a:xfrm>
+          <a:prstGeom prst="straightConnector1">
+            <a:avLst/>
+          </a:prstGeom>
+          <a:ln w="31750">
+            <a:tailEnd type="triangle"/>
+          </a:ln>
+        </p:spPr>
+        <p:style>
+          <a:lnRef idx="1">
+            <a:schemeClr val="accent1"/>
+          </a:lnRef>
+          <a:fillRef idx="0">
+            <a:schemeClr val="accent1"/>
+          </a:fillRef>
+          <a:effectRef idx="0">
+            <a:schemeClr val="accent1"/>
+          </a:effectRef>
+          <a:fontRef idx="minor">
+            <a:schemeClr val="tx1"/>
+          </a:fontRef>
+        </p:style>
+      </p:cxnSp>
+      <p:cxnSp>
+        <p:nvCxnSpPr>
+          <p:cNvPr id="28" name="Straight Arrow Connector 27">
+            <a:extLst>
+              <a:ext uri="{FF2B5EF4-FFF2-40B4-BE49-F238E27FC236}">
+                <a16:creationId xmlns:a16="http://schemas.microsoft.com/office/drawing/2014/main" id="{74C47E0D-070B-4B04-8C88-BC551FFBEA9A}"/>
+              </a:ext>
+            </a:extLst>
+          </p:cNvPr>
+          <p:cNvCxnSpPr>
+            <a:cxnSpLocks/>
+          </p:cNvCxnSpPr>
+          <p:nvPr/>
+        </p:nvCxnSpPr>
+        <p:spPr>
+          <a:xfrm flipV="1">
+            <a:off x="6989227" y="3361174"/>
+            <a:ext cx="1368203" cy="694802"/>
+          </a:xfrm>
+          <a:prstGeom prst="straightConnector1">
+            <a:avLst/>
+          </a:prstGeom>
+          <a:ln w="31750">
+            <a:tailEnd type="triangle"/>
+          </a:ln>
+        </p:spPr>
+        <p:style>
+          <a:lnRef idx="1">
+            <a:schemeClr val="accent1"/>
+          </a:lnRef>
+          <a:fillRef idx="0">
+            <a:schemeClr val="accent1"/>
+          </a:fillRef>
+          <a:effectRef idx="0">
+            <a:schemeClr val="accent1"/>
+          </a:effectRef>
+          <a:fontRef idx="minor">
+            <a:schemeClr val="tx1"/>
+          </a:fontRef>
+        </p:style>
+      </p:cxnSp>
+      <p:sp>
+        <p:nvSpPr>
+          <p:cNvPr id="29" name="TextBox 28">
+            <a:extLst>
+              <a:ext uri="{FF2B5EF4-FFF2-40B4-BE49-F238E27FC236}">
+                <a16:creationId xmlns:a16="http://schemas.microsoft.com/office/drawing/2014/main" id="{13C103A4-0C0D-4986-AE24-C3E0A52E923D}"/>
+              </a:ext>
+            </a:extLst>
+          </p:cNvPr>
+          <p:cNvSpPr txBox="1"/>
+          <p:nvPr/>
+        </p:nvSpPr>
+        <p:spPr>
+          <a:xfrm>
+            <a:off x="7139932" y="3009545"/>
+            <a:ext cx="922311" cy="584775"/>
+          </a:xfrm>
+          <a:prstGeom prst="rect">
+            <a:avLst/>
+          </a:prstGeom>
+          <a:noFill/>
+        </p:spPr>
+        <p:txBody>
+          <a:bodyPr wrap="square" rtlCol="0">
+            <a:spAutoFit/>
+          </a:bodyPr>
+          <a:lstStyle/>
+          <a:p>
+            <a:r>
+              <a:rPr lang="en-US" sz="3200" b="1" dirty="0"/>
+              <a:t>w</a:t>
+            </a:r>
+            <a:r>
+              <a:rPr lang="en-US" sz="3200" b="1" baseline="30000" dirty="0"/>
+              <a:t>2</a:t>
+            </a:r>
+            <a:r>
+              <a:rPr lang="en-US" sz="3200" b="1" baseline="-25000" dirty="0"/>
+              <a:t>2</a:t>
+            </a:r>
+          </a:p>
+        </p:txBody>
+      </p:sp>
+      <p:cxnSp>
+        <p:nvCxnSpPr>
+          <p:cNvPr id="39" name="Straight Arrow Connector 38">
+            <a:extLst>
+              <a:ext uri="{FF2B5EF4-FFF2-40B4-BE49-F238E27FC236}">
+                <a16:creationId xmlns:a16="http://schemas.microsoft.com/office/drawing/2014/main" id="{A05D1AC6-AD34-4880-9DF4-A2B168FE56E7}"/>
+              </a:ext>
+            </a:extLst>
+          </p:cNvPr>
+          <p:cNvCxnSpPr>
+            <a:cxnSpLocks/>
+            <a:endCxn id="25" idx="3"/>
+          </p:cNvCxnSpPr>
+          <p:nvPr/>
+        </p:nvCxnSpPr>
+        <p:spPr>
+          <a:xfrm flipV="1">
+            <a:off x="1221060" y="4762327"/>
+            <a:ext cx="3941273" cy="357308"/>
+          </a:xfrm>
+          <a:prstGeom prst="straightConnector1">
+            <a:avLst/>
+          </a:prstGeom>
+          <a:ln w="31750">
+            <a:tailEnd type="triangle"/>
+          </a:ln>
+        </p:spPr>
+        <p:style>
+          <a:lnRef idx="1">
+            <a:schemeClr val="accent1"/>
+          </a:lnRef>
+          <a:fillRef idx="0">
+            <a:schemeClr val="accent1"/>
+          </a:fillRef>
+          <a:effectRef idx="0">
+            <a:schemeClr val="accent1"/>
+          </a:effectRef>
+          <a:fontRef idx="minor">
+            <a:schemeClr val="tx1"/>
+          </a:fontRef>
+        </p:style>
+      </p:cxnSp>
+      <p:cxnSp>
+        <p:nvCxnSpPr>
+          <p:cNvPr id="42" name="Straight Arrow Connector 41">
+            <a:extLst>
+              <a:ext uri="{FF2B5EF4-FFF2-40B4-BE49-F238E27FC236}">
+                <a16:creationId xmlns:a16="http://schemas.microsoft.com/office/drawing/2014/main" id="{16EF692A-73DB-47AE-A493-CBEAC4A229BE}"/>
+              </a:ext>
+            </a:extLst>
+          </p:cNvPr>
+          <p:cNvCxnSpPr>
+            <a:cxnSpLocks/>
+            <a:stCxn id="19" idx="3"/>
+            <a:endCxn id="23" idx="2"/>
+          </p:cNvCxnSpPr>
+          <p:nvPr/>
+        </p:nvCxnSpPr>
+        <p:spPr>
+          <a:xfrm flipV="1">
+            <a:off x="1256052" y="1619234"/>
+            <a:ext cx="3542596" cy="1220719"/>
+          </a:xfrm>
+          <a:prstGeom prst="straightConnector1">
+            <a:avLst/>
+          </a:prstGeom>
+          <a:ln w="31750">
+            <a:tailEnd type="triangle"/>
+          </a:ln>
+        </p:spPr>
+        <p:style>
+          <a:lnRef idx="1">
+            <a:schemeClr val="accent1"/>
+          </a:lnRef>
+          <a:fillRef idx="0">
+            <a:schemeClr val="accent1"/>
+          </a:fillRef>
+          <a:effectRef idx="0">
+            <a:schemeClr val="accent1"/>
+          </a:effectRef>
+          <a:fontRef idx="minor">
+            <a:schemeClr val="tx1"/>
+          </a:fontRef>
+        </p:style>
+      </p:cxnSp>
+      <p:cxnSp>
+        <p:nvCxnSpPr>
+          <p:cNvPr id="47" name="Straight Arrow Connector 46">
+            <a:extLst>
+              <a:ext uri="{FF2B5EF4-FFF2-40B4-BE49-F238E27FC236}">
+                <a16:creationId xmlns:a16="http://schemas.microsoft.com/office/drawing/2014/main" id="{13ACB8DA-EB03-4C05-9967-E73881EFB4A6}"/>
+              </a:ext>
+            </a:extLst>
+          </p:cNvPr>
+          <p:cNvCxnSpPr>
+            <a:cxnSpLocks/>
+            <a:endCxn id="25" idx="2"/>
+          </p:cNvCxnSpPr>
+          <p:nvPr/>
+        </p:nvCxnSpPr>
+        <p:spPr>
+          <a:xfrm>
+            <a:off x="1221060" y="3077342"/>
+            <a:ext cx="3633524" cy="998392"/>
+          </a:xfrm>
+          <a:prstGeom prst="straightConnector1">
+            <a:avLst/>
+          </a:prstGeom>
+          <a:ln w="31750">
+            <a:tailEnd type="triangle"/>
+          </a:ln>
+        </p:spPr>
+        <p:style>
+          <a:lnRef idx="1">
+            <a:schemeClr val="accent1"/>
+          </a:lnRef>
+          <a:fillRef idx="0">
+            <a:schemeClr val="accent1"/>
+          </a:fillRef>
+          <a:effectRef idx="0">
+            <a:schemeClr val="accent1"/>
+          </a:effectRef>
+          <a:fontRef idx="minor">
+            <a:schemeClr val="tx1"/>
+          </a:fontRef>
+        </p:style>
+      </p:cxnSp>
+      <p:sp>
+        <p:nvSpPr>
+          <p:cNvPr id="51" name="TextBox 50">
+            <a:extLst>
+              <a:ext uri="{FF2B5EF4-FFF2-40B4-BE49-F238E27FC236}">
+                <a16:creationId xmlns:a16="http://schemas.microsoft.com/office/drawing/2014/main" id="{52B398FB-B354-4288-A74C-4B6E45ABB363}"/>
+              </a:ext>
+            </a:extLst>
+          </p:cNvPr>
+          <p:cNvSpPr txBox="1"/>
+          <p:nvPr/>
+        </p:nvSpPr>
+        <p:spPr>
+          <a:xfrm>
+            <a:off x="1903007" y="260522"/>
+            <a:ext cx="922311" cy="584775"/>
+          </a:xfrm>
+          <a:prstGeom prst="rect">
+            <a:avLst/>
+          </a:prstGeom>
+          <a:noFill/>
+        </p:spPr>
+        <p:txBody>
+          <a:bodyPr wrap="square" rtlCol="0">
+            <a:spAutoFit/>
+          </a:bodyPr>
+          <a:lstStyle/>
+          <a:p>
+            <a:r>
+              <a:rPr lang="en-US" sz="3200" b="1" dirty="0"/>
+              <a:t>w</a:t>
+            </a:r>
+            <a:r>
+              <a:rPr lang="en-US" sz="3200" b="1" baseline="30000" dirty="0"/>
+              <a:t>1</a:t>
+            </a:r>
+            <a:r>
+              <a:rPr lang="en-US" sz="3200" b="1" baseline="-25000" dirty="0"/>
+              <a:t>11</a:t>
+            </a:r>
+          </a:p>
+        </p:txBody>
+      </p:sp>
+      <p:sp>
+        <p:nvSpPr>
+          <p:cNvPr id="52" name="TextBox 51">
+            <a:extLst>
+              <a:ext uri="{FF2B5EF4-FFF2-40B4-BE49-F238E27FC236}">
+                <a16:creationId xmlns:a16="http://schemas.microsoft.com/office/drawing/2014/main" id="{0C8BA541-0439-4E61-9124-2B7FEF72AED4}"/>
+              </a:ext>
+            </a:extLst>
+          </p:cNvPr>
+          <p:cNvSpPr txBox="1"/>
+          <p:nvPr/>
+        </p:nvSpPr>
+        <p:spPr>
+          <a:xfrm>
+            <a:off x="1898738" y="1050339"/>
+            <a:ext cx="922311" cy="584775"/>
+          </a:xfrm>
+          <a:prstGeom prst="rect">
+            <a:avLst/>
+          </a:prstGeom>
+          <a:noFill/>
+        </p:spPr>
+        <p:txBody>
+          <a:bodyPr wrap="square" rtlCol="0">
+            <a:spAutoFit/>
+          </a:bodyPr>
+          <a:lstStyle/>
+          <a:p>
+            <a:r>
+              <a:rPr lang="en-US" sz="3200" b="1" dirty="0"/>
+              <a:t>w</a:t>
+            </a:r>
+            <a:r>
+              <a:rPr lang="en-US" sz="3200" b="1" baseline="30000" dirty="0"/>
+              <a:t>1</a:t>
+            </a:r>
+            <a:r>
+              <a:rPr lang="en-US" sz="3200" b="1" baseline="-25000" dirty="0"/>
+              <a:t>12</a:t>
+            </a:r>
+          </a:p>
+        </p:txBody>
+      </p:sp>
+      <p:sp>
+        <p:nvSpPr>
+          <p:cNvPr id="53" name="TextBox 52">
+            <a:extLst>
+              <a:ext uri="{FF2B5EF4-FFF2-40B4-BE49-F238E27FC236}">
+                <a16:creationId xmlns:a16="http://schemas.microsoft.com/office/drawing/2014/main" id="{41FFC3E6-3C2C-44C1-88AE-19EB3430D42F}"/>
+              </a:ext>
+            </a:extLst>
+          </p:cNvPr>
+          <p:cNvSpPr txBox="1"/>
+          <p:nvPr/>
+        </p:nvSpPr>
+        <p:spPr>
+          <a:xfrm>
+            <a:off x="1486551" y="1799236"/>
+            <a:ext cx="922311" cy="584775"/>
+          </a:xfrm>
+          <a:prstGeom prst="rect">
+            <a:avLst/>
+          </a:prstGeom>
+          <a:noFill/>
+        </p:spPr>
+        <p:txBody>
+          <a:bodyPr wrap="square" rtlCol="0">
+            <a:spAutoFit/>
+          </a:bodyPr>
+          <a:lstStyle/>
+          <a:p>
+            <a:r>
+              <a:rPr lang="en-US" sz="3200" b="1" dirty="0"/>
+              <a:t>w</a:t>
+            </a:r>
+            <a:r>
+              <a:rPr lang="en-US" sz="3200" b="1" baseline="30000" dirty="0"/>
+              <a:t>1</a:t>
+            </a:r>
+            <a:r>
+              <a:rPr lang="en-US" sz="3200" b="1" baseline="-25000" dirty="0"/>
+              <a:t>21</a:t>
+            </a:r>
+          </a:p>
+        </p:txBody>
+      </p:sp>
+      <p:sp>
+        <p:nvSpPr>
+          <p:cNvPr id="54" name="TextBox 53">
+            <a:extLst>
+              <a:ext uri="{FF2B5EF4-FFF2-40B4-BE49-F238E27FC236}">
+                <a16:creationId xmlns:a16="http://schemas.microsoft.com/office/drawing/2014/main" id="{32891961-5F50-41E8-8A51-7E5F87BFCC2F}"/>
+              </a:ext>
+            </a:extLst>
+          </p:cNvPr>
+          <p:cNvSpPr txBox="1"/>
+          <p:nvPr/>
+        </p:nvSpPr>
+        <p:spPr>
+          <a:xfrm>
+            <a:off x="1702225" y="2630672"/>
+            <a:ext cx="922311" cy="584775"/>
+          </a:xfrm>
+          <a:prstGeom prst="rect">
+            <a:avLst/>
+          </a:prstGeom>
+          <a:noFill/>
+        </p:spPr>
+        <p:txBody>
+          <a:bodyPr wrap="square" rtlCol="0">
+            <a:spAutoFit/>
+          </a:bodyPr>
+          <a:lstStyle/>
+          <a:p>
+            <a:r>
+              <a:rPr lang="en-US" sz="3200" b="1" dirty="0"/>
+              <a:t>w</a:t>
+            </a:r>
+            <a:r>
+              <a:rPr lang="en-US" sz="3200" b="1" baseline="30000" dirty="0"/>
+              <a:t>1</a:t>
+            </a:r>
+            <a:r>
+              <a:rPr lang="en-US" sz="3200" b="1" baseline="-25000" dirty="0"/>
+              <a:t>22</a:t>
+            </a:r>
+          </a:p>
+        </p:txBody>
+      </p:sp>
+      <p:sp>
+        <p:nvSpPr>
+          <p:cNvPr id="55" name="TextBox 54">
+            <a:extLst>
+              <a:ext uri="{FF2B5EF4-FFF2-40B4-BE49-F238E27FC236}">
+                <a16:creationId xmlns:a16="http://schemas.microsoft.com/office/drawing/2014/main" id="{15C8E774-295C-4AC1-A375-B799B43B9568}"/>
+              </a:ext>
+            </a:extLst>
+          </p:cNvPr>
+          <p:cNvSpPr txBox="1"/>
+          <p:nvPr/>
+        </p:nvSpPr>
+        <p:spPr>
+          <a:xfrm>
+            <a:off x="1486551" y="3572217"/>
+            <a:ext cx="922311" cy="584775"/>
+          </a:xfrm>
+          <a:prstGeom prst="rect">
+            <a:avLst/>
+          </a:prstGeom>
+          <a:noFill/>
+        </p:spPr>
+        <p:txBody>
+          <a:bodyPr wrap="square" rtlCol="0">
+            <a:spAutoFit/>
+          </a:bodyPr>
+          <a:lstStyle/>
+          <a:p>
+            <a:r>
+              <a:rPr lang="en-US" sz="3200" b="1" dirty="0"/>
+              <a:t>w</a:t>
+            </a:r>
+            <a:r>
+              <a:rPr lang="en-US" sz="3200" b="1" baseline="30000" dirty="0"/>
+              <a:t>1</a:t>
+            </a:r>
+            <a:r>
+              <a:rPr lang="en-US" sz="3200" b="1" baseline="-25000" dirty="0"/>
+              <a:t>31</a:t>
+            </a:r>
+          </a:p>
+        </p:txBody>
+      </p:sp>
+      <p:sp>
+        <p:nvSpPr>
+          <p:cNvPr id="59" name="TextBox 58">
+            <a:extLst>
+              <a:ext uri="{FF2B5EF4-FFF2-40B4-BE49-F238E27FC236}">
+                <a16:creationId xmlns:a16="http://schemas.microsoft.com/office/drawing/2014/main" id="{208264F8-54AC-4999-9C78-B5F23F2428D2}"/>
+              </a:ext>
+            </a:extLst>
+          </p:cNvPr>
+          <p:cNvSpPr txBox="1"/>
+          <p:nvPr/>
+        </p:nvSpPr>
+        <p:spPr>
+          <a:xfrm>
+            <a:off x="2030837" y="4351415"/>
+            <a:ext cx="922311" cy="584775"/>
+          </a:xfrm>
+          <a:prstGeom prst="rect">
+            <a:avLst/>
+          </a:prstGeom>
+          <a:noFill/>
+        </p:spPr>
+        <p:txBody>
+          <a:bodyPr wrap="square" rtlCol="0">
+            <a:spAutoFit/>
+          </a:bodyPr>
+          <a:lstStyle/>
+          <a:p>
+            <a:r>
+              <a:rPr lang="en-US" sz="3200" b="1" dirty="0"/>
+              <a:t>w</a:t>
+            </a:r>
+            <a:r>
+              <a:rPr lang="en-US" sz="3200" b="1" baseline="30000" dirty="0"/>
+              <a:t>1</a:t>
+            </a:r>
+            <a:r>
+              <a:rPr lang="en-US" sz="3200" b="1" baseline="-25000" dirty="0"/>
+              <a:t>32</a:t>
+            </a:r>
+          </a:p>
+        </p:txBody>
+      </p:sp>
+      <p:sp>
+        <p:nvSpPr>
+          <p:cNvPr id="2" name="Right Brace 1">
+            <a:extLst>
+              <a:ext uri="{FF2B5EF4-FFF2-40B4-BE49-F238E27FC236}">
+                <a16:creationId xmlns:a16="http://schemas.microsoft.com/office/drawing/2014/main" id="{6495FDCD-DCB2-4BFF-8756-FCB4CF568A51}"/>
+              </a:ext>
+            </a:extLst>
+          </p:cNvPr>
+          <p:cNvSpPr/>
+          <p:nvPr/>
+        </p:nvSpPr>
+        <p:spPr>
+          <a:xfrm rot="5400000">
+            <a:off x="5742955" y="4253663"/>
+            <a:ext cx="426408" cy="2456822"/>
+          </a:xfrm>
+          <a:prstGeom prst="rightBrace">
+            <a:avLst>
+              <a:gd name="adj1" fmla="val 0"/>
+              <a:gd name="adj2" fmla="val 50000"/>
+            </a:avLst>
+          </a:prstGeom>
+          <a:ln w="31750"/>
+        </p:spPr>
+        <p:style>
+          <a:lnRef idx="1">
+            <a:schemeClr val="accent1"/>
+          </a:lnRef>
+          <a:fillRef idx="0">
+            <a:schemeClr val="accent1"/>
+          </a:fillRef>
+          <a:effectRef idx="0">
+            <a:schemeClr val="accent1"/>
+          </a:effectRef>
+          <a:fontRef idx="minor">
+            <a:schemeClr val="tx1"/>
+          </a:fontRef>
+        </p:style>
+        <p:txBody>
+          <a:bodyPr rtlCol="0" anchor="ctr"/>
+          <a:lstStyle/>
+          <a:p>
+            <a:pPr algn="ctr"/>
+            <a:endParaRPr lang="en-US"/>
+          </a:p>
+        </p:txBody>
+      </p:sp>
+      <p:sp>
+        <p:nvSpPr>
+          <p:cNvPr id="30" name="TextBox 29">
+            <a:extLst>
+              <a:ext uri="{FF2B5EF4-FFF2-40B4-BE49-F238E27FC236}">
+                <a16:creationId xmlns:a16="http://schemas.microsoft.com/office/drawing/2014/main" id="{AD3627E2-A584-4589-B096-2BF48786A134}"/>
+              </a:ext>
+            </a:extLst>
+          </p:cNvPr>
+          <p:cNvSpPr txBox="1"/>
+          <p:nvPr/>
+        </p:nvSpPr>
+        <p:spPr>
+          <a:xfrm>
+            <a:off x="5048178" y="5744803"/>
+            <a:ext cx="1860064" cy="420628"/>
+          </a:xfrm>
+          <a:prstGeom prst="rect">
+            <a:avLst/>
+          </a:prstGeom>
+          <a:noFill/>
+        </p:spPr>
+        <p:txBody>
+          <a:bodyPr wrap="square" rtlCol="0">
+            <a:spAutoFit/>
+          </a:bodyPr>
+          <a:lstStyle/>
+          <a:p>
+            <a:pPr algn="ctr"/>
+            <a:r>
+              <a:rPr lang="en-US" sz="3200" b="1" baseline="-25000" dirty="0"/>
+              <a:t>Hidden Layer</a:t>
+            </a:r>
+          </a:p>
+        </p:txBody>
+      </p:sp>
+      <p:sp>
+        <p:nvSpPr>
+          <p:cNvPr id="31" name="Right Brace 30">
+            <a:extLst>
+              <a:ext uri="{FF2B5EF4-FFF2-40B4-BE49-F238E27FC236}">
+                <a16:creationId xmlns:a16="http://schemas.microsoft.com/office/drawing/2014/main" id="{9173B771-E8DD-40E0-B54E-911C022A304D}"/>
+              </a:ext>
+            </a:extLst>
+          </p:cNvPr>
+          <p:cNvSpPr/>
+          <p:nvPr/>
+        </p:nvSpPr>
+        <p:spPr>
+          <a:xfrm rot="5400000">
+            <a:off x="8985223" y="4253200"/>
+            <a:ext cx="426408" cy="2456822"/>
+          </a:xfrm>
+          <a:prstGeom prst="rightBrace">
+            <a:avLst>
+              <a:gd name="adj1" fmla="val 0"/>
+              <a:gd name="adj2" fmla="val 50000"/>
+            </a:avLst>
+          </a:prstGeom>
+          <a:ln w="31750"/>
+        </p:spPr>
+        <p:style>
+          <a:lnRef idx="1">
+            <a:schemeClr val="accent1"/>
+          </a:lnRef>
+          <a:fillRef idx="0">
+            <a:schemeClr val="accent1"/>
+          </a:fillRef>
+          <a:effectRef idx="0">
+            <a:schemeClr val="accent1"/>
+          </a:effectRef>
+          <a:fontRef idx="minor">
+            <a:schemeClr val="tx1"/>
+          </a:fontRef>
+        </p:style>
+        <p:txBody>
+          <a:bodyPr rtlCol="0" anchor="ctr"/>
+          <a:lstStyle/>
+          <a:p>
+            <a:pPr algn="ctr"/>
+            <a:endParaRPr lang="en-US"/>
+          </a:p>
+        </p:txBody>
+      </p:sp>
+      <p:sp>
+        <p:nvSpPr>
+          <p:cNvPr id="32" name="TextBox 31">
+            <a:extLst>
+              <a:ext uri="{FF2B5EF4-FFF2-40B4-BE49-F238E27FC236}">
+                <a16:creationId xmlns:a16="http://schemas.microsoft.com/office/drawing/2014/main" id="{6DDE0CB4-B8D8-4D0D-93A1-3A167835B00B}"/>
+              </a:ext>
+            </a:extLst>
+          </p:cNvPr>
+          <p:cNvSpPr txBox="1"/>
+          <p:nvPr/>
+        </p:nvSpPr>
+        <p:spPr>
+          <a:xfrm>
+            <a:off x="8290446" y="5744340"/>
+            <a:ext cx="1860064" cy="420628"/>
+          </a:xfrm>
+          <a:prstGeom prst="rect">
+            <a:avLst/>
+          </a:prstGeom>
+          <a:noFill/>
+        </p:spPr>
+        <p:txBody>
+          <a:bodyPr wrap="square" rtlCol="0">
+            <a:spAutoFit/>
+          </a:bodyPr>
+          <a:lstStyle/>
+          <a:p>
+            <a:pPr algn="ctr"/>
+            <a:r>
+              <a:rPr lang="en-US" sz="3200" b="1" baseline="-25000" dirty="0"/>
+              <a:t>Output Layer</a:t>
+            </a:r>
+          </a:p>
+        </p:txBody>
+      </p:sp>
+      <p:sp>
+        <p:nvSpPr>
+          <p:cNvPr id="33" name="Right Brace 32">
+            <a:extLst>
+              <a:ext uri="{FF2B5EF4-FFF2-40B4-BE49-F238E27FC236}">
+                <a16:creationId xmlns:a16="http://schemas.microsoft.com/office/drawing/2014/main" id="{579D474D-BA2C-4B6A-A39C-3CB68B398441}"/>
+              </a:ext>
+            </a:extLst>
+          </p:cNvPr>
+          <p:cNvSpPr/>
+          <p:nvPr/>
+        </p:nvSpPr>
+        <p:spPr>
+          <a:xfrm rot="5400000">
+            <a:off x="665309" y="5017934"/>
+            <a:ext cx="426408" cy="1015746"/>
+          </a:xfrm>
+          <a:prstGeom prst="rightBrace">
+            <a:avLst>
+              <a:gd name="adj1" fmla="val 0"/>
+              <a:gd name="adj2" fmla="val 50000"/>
+            </a:avLst>
+          </a:prstGeom>
+          <a:ln w="31750"/>
+        </p:spPr>
+        <p:style>
+          <a:lnRef idx="1">
+            <a:schemeClr val="accent1"/>
+          </a:lnRef>
+          <a:fillRef idx="0">
+            <a:schemeClr val="accent1"/>
+          </a:fillRef>
+          <a:effectRef idx="0">
+            <a:schemeClr val="accent1"/>
+          </a:effectRef>
+          <a:fontRef idx="minor">
+            <a:schemeClr val="tx1"/>
+          </a:fontRef>
+        </p:style>
+        <p:txBody>
+          <a:bodyPr rtlCol="0" anchor="ctr"/>
+          <a:lstStyle/>
+          <a:p>
+            <a:pPr algn="ctr"/>
+            <a:endParaRPr lang="en-US" dirty="0"/>
+          </a:p>
+        </p:txBody>
+      </p:sp>
+      <p:sp>
+        <p:nvSpPr>
+          <p:cNvPr id="34" name="TextBox 33">
+            <a:extLst>
+              <a:ext uri="{FF2B5EF4-FFF2-40B4-BE49-F238E27FC236}">
+                <a16:creationId xmlns:a16="http://schemas.microsoft.com/office/drawing/2014/main" id="{DB1FF568-C283-41F9-A5AF-7F0B093CD811}"/>
+              </a:ext>
+            </a:extLst>
+          </p:cNvPr>
+          <p:cNvSpPr txBox="1"/>
+          <p:nvPr/>
+        </p:nvSpPr>
+        <p:spPr>
+          <a:xfrm>
+            <a:off x="42896" y="5779823"/>
+            <a:ext cx="1671234" cy="420628"/>
+          </a:xfrm>
+          <a:prstGeom prst="rect">
+            <a:avLst/>
+          </a:prstGeom>
+          <a:noFill/>
+        </p:spPr>
+        <p:txBody>
+          <a:bodyPr wrap="square" rtlCol="0">
+            <a:spAutoFit/>
+          </a:bodyPr>
+          <a:lstStyle/>
+          <a:p>
+            <a:pPr algn="ctr"/>
+            <a:r>
+              <a:rPr lang="en-US" sz="3200" b="1" baseline="-25000" dirty="0"/>
+              <a:t>Input Layer</a:t>
+            </a:r>
+          </a:p>
+        </p:txBody>
+      </p:sp>
+    </p:spTree>
+    <p:extLst>
+      <p:ext uri="{BB962C8B-B14F-4D97-AF65-F5344CB8AC3E}">
+        <p14:creationId xmlns:p14="http://schemas.microsoft.com/office/powerpoint/2010/main" val="2415833012"/>
+      </p:ext>
+    </p:extLst>
+  </p:cSld>
+  <p:clrMapOvr>
+    <a:masterClrMapping/>
+  </p:clrMapOvr>
+</p:sld>
+</file>
+
+<file path=ppt/slides/slide5.xml><?xml version="1.0" encoding="utf-8"?>
+<p:sld xmlns:a="http://schemas.openxmlformats.org/drawingml/2006/main" xmlns:r="http://schemas.openxmlformats.org/officeDocument/2006/relationships" xmlns:p="http://schemas.openxmlformats.org/presentationml/2006/main">
+  <p:cSld>
+    <p:spTree>
+      <p:nvGrpSpPr>
+        <p:cNvPr id="1" name=""/>
+        <p:cNvGrpSpPr/>
+        <p:nvPr/>
+      </p:nvGrpSpPr>
+      <p:grpSpPr>
+        <a:xfrm>
+          <a:off x="0" y="0"/>
+          <a:ext cx="0" cy="0"/>
+          <a:chOff x="0" y="0"/>
+          <a:chExt cx="0" cy="0"/>
+        </a:xfrm>
+      </p:grpSpPr>
+      <p:sp>
+        <p:nvSpPr>
+          <p:cNvPr id="2" name="Oval 1">
+            <a:extLst>
+              <a:ext uri="{FF2B5EF4-FFF2-40B4-BE49-F238E27FC236}">
+                <a16:creationId xmlns:a16="http://schemas.microsoft.com/office/drawing/2014/main" id="{82122B13-483D-491B-B2CA-198D7F53817E}"/>
+              </a:ext>
+            </a:extLst>
+          </p:cNvPr>
+          <p:cNvSpPr/>
+          <p:nvPr/>
+        </p:nvSpPr>
+        <p:spPr>
+          <a:xfrm>
+            <a:off x="1459684" y="4886586"/>
+            <a:ext cx="946896" cy="874467"/>
+          </a:xfrm>
+          <a:prstGeom prst="ellipse">
+            <a:avLst/>
+          </a:prstGeom>
+          <a:noFill/>
+          <a:ln w="31750"/>
+        </p:spPr>
+        <p:style>
+          <a:lnRef idx="2">
+            <a:schemeClr val="accent1">
+              <a:shade val="50000"/>
+            </a:schemeClr>
+          </a:lnRef>
+          <a:fillRef idx="1">
+            <a:schemeClr val="accent1"/>
+          </a:fillRef>
+          <a:effectRef idx="0">
+            <a:schemeClr val="accent1"/>
+          </a:effectRef>
+          <a:fontRef idx="minor">
+            <a:schemeClr val="lt1"/>
+          </a:fontRef>
+        </p:style>
+        <p:txBody>
+          <a:bodyPr rtlCol="0" anchor="ctr"/>
+          <a:lstStyle/>
+          <a:p>
+            <a:pPr algn="ctr"/>
+            <a:r>
+              <a:rPr lang="en-US" sz="2800" b="1" dirty="0">
+                <a:solidFill>
+                  <a:schemeClr val="tx1"/>
+                </a:solidFill>
+              </a:rPr>
+              <a:t>X</a:t>
+            </a:r>
+          </a:p>
+        </p:txBody>
+      </p:sp>
+      <p:sp>
+        <p:nvSpPr>
+          <p:cNvPr id="3" name="Oval 2">
+            <a:extLst>
+              <a:ext uri="{FF2B5EF4-FFF2-40B4-BE49-F238E27FC236}">
+                <a16:creationId xmlns:a16="http://schemas.microsoft.com/office/drawing/2014/main" id="{B90772B7-F4DB-47C5-83D1-3EC996870B62}"/>
+              </a:ext>
+            </a:extLst>
+          </p:cNvPr>
+          <p:cNvSpPr/>
+          <p:nvPr/>
+        </p:nvSpPr>
+        <p:spPr>
+          <a:xfrm>
+            <a:off x="1459682" y="2991766"/>
+            <a:ext cx="946897" cy="874468"/>
+          </a:xfrm>
+          <a:prstGeom prst="ellipse">
+            <a:avLst/>
+          </a:prstGeom>
+          <a:noFill/>
+          <a:ln w="31750"/>
+        </p:spPr>
+        <p:style>
+          <a:lnRef idx="2">
+            <a:schemeClr val="accent1">
+              <a:shade val="50000"/>
+            </a:schemeClr>
+          </a:lnRef>
+          <a:fillRef idx="1">
+            <a:schemeClr val="accent1"/>
+          </a:fillRef>
+          <a:effectRef idx="0">
+            <a:schemeClr val="accent1"/>
+          </a:effectRef>
+          <a:fontRef idx="minor">
+            <a:schemeClr val="lt1"/>
+          </a:fontRef>
+        </p:style>
+        <p:txBody>
+          <a:bodyPr rtlCol="0" anchor="ctr"/>
+          <a:lstStyle/>
+          <a:p>
+            <a:pPr algn="ctr"/>
+            <a:r>
+              <a:rPr lang="en-US" sz="2800" b="1" dirty="0">
+                <a:solidFill>
+                  <a:schemeClr val="tx1"/>
+                </a:solidFill>
+              </a:rPr>
+              <a:t>W</a:t>
+            </a:r>
+            <a:r>
+              <a:rPr lang="en-US" sz="2800" b="1" baseline="30000" dirty="0">
+                <a:solidFill>
+                  <a:schemeClr val="tx1"/>
+                </a:solidFill>
+              </a:rPr>
+              <a:t>1</a:t>
+            </a:r>
+          </a:p>
+        </p:txBody>
+      </p:sp>
+      <p:sp>
+        <p:nvSpPr>
+          <p:cNvPr id="4" name="Oval 3">
+            <a:extLst>
+              <a:ext uri="{FF2B5EF4-FFF2-40B4-BE49-F238E27FC236}">
+                <a16:creationId xmlns:a16="http://schemas.microsoft.com/office/drawing/2014/main" id="{69C34212-D8C4-4730-AD76-0B113DD125E6}"/>
+              </a:ext>
+            </a:extLst>
+          </p:cNvPr>
+          <p:cNvSpPr/>
+          <p:nvPr/>
+        </p:nvSpPr>
+        <p:spPr>
+          <a:xfrm>
+            <a:off x="2963587" y="4012119"/>
+            <a:ext cx="946896" cy="874467"/>
+          </a:xfrm>
+          <a:prstGeom prst="ellipse">
+            <a:avLst/>
+          </a:prstGeom>
+          <a:noFill/>
+          <a:ln w="31750"/>
+        </p:spPr>
+        <p:style>
+          <a:lnRef idx="2">
+            <a:schemeClr val="accent1">
+              <a:shade val="50000"/>
+            </a:schemeClr>
+          </a:lnRef>
+          <a:fillRef idx="1">
+            <a:schemeClr val="accent1"/>
+          </a:fillRef>
+          <a:effectRef idx="0">
+            <a:schemeClr val="accent1"/>
+          </a:effectRef>
+          <a:fontRef idx="minor">
+            <a:schemeClr val="lt1"/>
+          </a:fontRef>
+        </p:style>
+        <p:txBody>
+          <a:bodyPr rtlCol="0" anchor="ctr"/>
+          <a:lstStyle/>
+          <a:p>
+            <a:pPr algn="ctr"/>
+            <a:r>
+              <a:rPr lang="en-US" sz="2800" b="1" dirty="0">
+                <a:solidFill>
+                  <a:schemeClr val="tx1"/>
+                </a:solidFill>
+              </a:rPr>
+              <a:t>U</a:t>
+            </a:r>
+            <a:r>
+              <a:rPr lang="en-US" sz="2800" b="1" baseline="30000" dirty="0">
+                <a:solidFill>
+                  <a:schemeClr val="tx1"/>
+                </a:solidFill>
+              </a:rPr>
+              <a:t>1</a:t>
+            </a:r>
+          </a:p>
+        </p:txBody>
+      </p:sp>
+      <p:cxnSp>
+        <p:nvCxnSpPr>
+          <p:cNvPr id="5" name="Straight Arrow Connector 4">
+            <a:extLst>
+              <a:ext uri="{FF2B5EF4-FFF2-40B4-BE49-F238E27FC236}">
+                <a16:creationId xmlns:a16="http://schemas.microsoft.com/office/drawing/2014/main" id="{5AAE57A1-20C4-4050-8E7B-A3368BECA438}"/>
+              </a:ext>
+            </a:extLst>
+          </p:cNvPr>
+          <p:cNvCxnSpPr>
+            <a:cxnSpLocks/>
+            <a:stCxn id="3" idx="6"/>
+            <a:endCxn id="4" idx="1"/>
+          </p:cNvCxnSpPr>
+          <p:nvPr/>
+        </p:nvCxnSpPr>
+        <p:spPr>
+          <a:xfrm>
+            <a:off x="2406579" y="3429000"/>
+            <a:ext cx="695678" cy="711182"/>
+          </a:xfrm>
+          <a:prstGeom prst="straightConnector1">
+            <a:avLst/>
+          </a:prstGeom>
+          <a:ln w="31750">
+            <a:tailEnd type="triangle"/>
+          </a:ln>
+        </p:spPr>
+        <p:style>
+          <a:lnRef idx="1">
+            <a:schemeClr val="accent1"/>
+          </a:lnRef>
+          <a:fillRef idx="0">
+            <a:schemeClr val="accent1"/>
+          </a:fillRef>
+          <a:effectRef idx="0">
+            <a:schemeClr val="accent1"/>
+          </a:effectRef>
+          <a:fontRef idx="minor">
+            <a:schemeClr val="tx1"/>
+          </a:fontRef>
+        </p:style>
+      </p:cxnSp>
+      <p:cxnSp>
+        <p:nvCxnSpPr>
+          <p:cNvPr id="6" name="Straight Arrow Connector 5">
+            <a:extLst>
+              <a:ext uri="{FF2B5EF4-FFF2-40B4-BE49-F238E27FC236}">
+                <a16:creationId xmlns:a16="http://schemas.microsoft.com/office/drawing/2014/main" id="{0964FB36-97B0-4E28-8F23-B8BC7D0A8157}"/>
+              </a:ext>
+            </a:extLst>
+          </p:cNvPr>
+          <p:cNvCxnSpPr>
+            <a:cxnSpLocks/>
+            <a:stCxn id="2" idx="6"/>
+            <a:endCxn id="4" idx="3"/>
+          </p:cNvCxnSpPr>
+          <p:nvPr/>
+        </p:nvCxnSpPr>
+        <p:spPr>
+          <a:xfrm flipV="1">
+            <a:off x="2406580" y="4758523"/>
+            <a:ext cx="695677" cy="565297"/>
+          </a:xfrm>
+          <a:prstGeom prst="straightConnector1">
+            <a:avLst/>
+          </a:prstGeom>
+          <a:ln w="31750">
+            <a:tailEnd type="triangle"/>
+          </a:ln>
+        </p:spPr>
+        <p:style>
+          <a:lnRef idx="1">
+            <a:schemeClr val="accent1"/>
+          </a:lnRef>
+          <a:fillRef idx="0">
+            <a:schemeClr val="accent1"/>
+          </a:fillRef>
+          <a:effectRef idx="0">
+            <a:schemeClr val="accent1"/>
+          </a:effectRef>
+          <a:fontRef idx="minor">
+            <a:schemeClr val="tx1"/>
+          </a:fontRef>
+        </p:style>
+      </p:cxnSp>
+      <p:sp>
+        <p:nvSpPr>
+          <p:cNvPr id="14" name="TextBox 13">
+            <a:extLst>
+              <a:ext uri="{FF2B5EF4-FFF2-40B4-BE49-F238E27FC236}">
+                <a16:creationId xmlns:a16="http://schemas.microsoft.com/office/drawing/2014/main" id="{D5A6ABA5-D034-4524-B11C-E0684700730E}"/>
+              </a:ext>
+            </a:extLst>
+          </p:cNvPr>
+          <p:cNvSpPr txBox="1"/>
+          <p:nvPr/>
+        </p:nvSpPr>
+        <p:spPr>
+          <a:xfrm>
+            <a:off x="2172460" y="3943300"/>
+            <a:ext cx="1025247" cy="830997"/>
+          </a:xfrm>
+          <a:prstGeom prst="rect">
+            <a:avLst/>
+          </a:prstGeom>
+          <a:noFill/>
+        </p:spPr>
+        <p:txBody>
+          <a:bodyPr wrap="square" rtlCol="0">
+            <a:spAutoFit/>
+          </a:bodyPr>
+          <a:lstStyle/>
+          <a:p>
+            <a:r>
+              <a:rPr lang="en-US" sz="2400" b="1" dirty="0"/>
+              <a:t>Mat</a:t>
+            </a:r>
+          </a:p>
+          <a:p>
+            <a:r>
+              <a:rPr lang="en-US" sz="2400" b="1" dirty="0" err="1"/>
+              <a:t>Mult</a:t>
+            </a:r>
+            <a:endParaRPr lang="en-US" sz="2400" b="1" dirty="0"/>
+          </a:p>
+        </p:txBody>
+      </p:sp>
+      <p:sp>
+        <p:nvSpPr>
+          <p:cNvPr id="15" name="Oval 14">
+            <a:extLst>
+              <a:ext uri="{FF2B5EF4-FFF2-40B4-BE49-F238E27FC236}">
+                <a16:creationId xmlns:a16="http://schemas.microsoft.com/office/drawing/2014/main" id="{07816EDD-1103-49D9-9C6F-9C8E81D8D40F}"/>
+              </a:ext>
+            </a:extLst>
+          </p:cNvPr>
+          <p:cNvSpPr/>
+          <p:nvPr/>
+        </p:nvSpPr>
+        <p:spPr>
+          <a:xfrm>
+            <a:off x="3626776" y="2554532"/>
+            <a:ext cx="946897" cy="874468"/>
+          </a:xfrm>
+          <a:prstGeom prst="ellipse">
+            <a:avLst/>
+          </a:prstGeom>
+          <a:noFill/>
+          <a:ln w="31750"/>
+        </p:spPr>
+        <p:style>
+          <a:lnRef idx="2">
+            <a:schemeClr val="accent1">
+              <a:shade val="50000"/>
+            </a:schemeClr>
+          </a:lnRef>
+          <a:fillRef idx="1">
+            <a:schemeClr val="accent1"/>
+          </a:fillRef>
+          <a:effectRef idx="0">
+            <a:schemeClr val="accent1"/>
+          </a:effectRef>
+          <a:fontRef idx="minor">
+            <a:schemeClr val="lt1"/>
+          </a:fontRef>
+        </p:style>
+        <p:txBody>
+          <a:bodyPr rtlCol="0" anchor="ctr"/>
+          <a:lstStyle/>
+          <a:p>
+            <a:pPr algn="ctr"/>
+            <a:r>
+              <a:rPr lang="en-US" sz="2800" b="1" dirty="0">
+                <a:solidFill>
+                  <a:schemeClr val="tx1"/>
+                </a:solidFill>
+              </a:rPr>
+              <a:t>b</a:t>
+            </a:r>
+            <a:r>
+              <a:rPr lang="en-US" sz="2800" b="1" baseline="30000" dirty="0">
+                <a:solidFill>
+                  <a:schemeClr val="tx1"/>
+                </a:solidFill>
+              </a:rPr>
+              <a:t>1</a:t>
+            </a:r>
+          </a:p>
+        </p:txBody>
+      </p:sp>
+      <p:sp>
+        <p:nvSpPr>
+          <p:cNvPr id="16" name="Oval 15">
+            <a:extLst>
+              <a:ext uri="{FF2B5EF4-FFF2-40B4-BE49-F238E27FC236}">
+                <a16:creationId xmlns:a16="http://schemas.microsoft.com/office/drawing/2014/main" id="{ED0FB66C-0181-4F45-A3D1-4447C414C55C}"/>
+              </a:ext>
+            </a:extLst>
+          </p:cNvPr>
+          <p:cNvSpPr/>
+          <p:nvPr/>
+        </p:nvSpPr>
+        <p:spPr>
+          <a:xfrm>
+            <a:off x="4884496" y="3404140"/>
+            <a:ext cx="946896" cy="874467"/>
+          </a:xfrm>
+          <a:prstGeom prst="ellipse">
+            <a:avLst/>
+          </a:prstGeom>
+          <a:noFill/>
+          <a:ln w="31750"/>
+        </p:spPr>
+        <p:style>
+          <a:lnRef idx="2">
+            <a:schemeClr val="accent1">
+              <a:shade val="50000"/>
+            </a:schemeClr>
+          </a:lnRef>
+          <a:fillRef idx="1">
+            <a:schemeClr val="accent1"/>
+          </a:fillRef>
+          <a:effectRef idx="0">
+            <a:schemeClr val="accent1"/>
+          </a:effectRef>
+          <a:fontRef idx="minor">
+            <a:schemeClr val="lt1"/>
+          </a:fontRef>
+        </p:style>
+        <p:txBody>
+          <a:bodyPr rtlCol="0" anchor="ctr"/>
+          <a:lstStyle/>
+          <a:p>
+            <a:pPr algn="ctr"/>
+            <a:r>
+              <a:rPr lang="en-US" sz="2800" b="1" dirty="0">
+                <a:solidFill>
+                  <a:schemeClr val="tx1"/>
+                </a:solidFill>
+              </a:rPr>
+              <a:t>U</a:t>
+            </a:r>
+            <a:r>
+              <a:rPr lang="en-US" sz="2800" b="1" baseline="30000" dirty="0">
+                <a:solidFill>
+                  <a:schemeClr val="tx1"/>
+                </a:solidFill>
+              </a:rPr>
+              <a:t>2</a:t>
+            </a:r>
+          </a:p>
+        </p:txBody>
+      </p:sp>
+      <p:cxnSp>
+        <p:nvCxnSpPr>
+          <p:cNvPr id="17" name="Straight Arrow Connector 16">
+            <a:extLst>
+              <a:ext uri="{FF2B5EF4-FFF2-40B4-BE49-F238E27FC236}">
+                <a16:creationId xmlns:a16="http://schemas.microsoft.com/office/drawing/2014/main" id="{BB0195B7-8019-4502-9043-81A6B3DFD8F3}"/>
+              </a:ext>
+            </a:extLst>
+          </p:cNvPr>
+          <p:cNvCxnSpPr>
+            <a:cxnSpLocks/>
+            <a:endCxn id="16" idx="3"/>
+          </p:cNvCxnSpPr>
+          <p:nvPr/>
+        </p:nvCxnSpPr>
+        <p:spPr>
+          <a:xfrm flipV="1">
+            <a:off x="3910483" y="4150544"/>
+            <a:ext cx="1112683" cy="272288"/>
+          </a:xfrm>
+          <a:prstGeom prst="straightConnector1">
+            <a:avLst/>
+          </a:prstGeom>
+          <a:ln w="31750">
+            <a:tailEnd type="triangle"/>
+          </a:ln>
+        </p:spPr>
+        <p:style>
+          <a:lnRef idx="1">
+            <a:schemeClr val="accent1"/>
+          </a:lnRef>
+          <a:fillRef idx="0">
+            <a:schemeClr val="accent1"/>
+          </a:fillRef>
+          <a:effectRef idx="0">
+            <a:schemeClr val="accent1"/>
+          </a:effectRef>
+          <a:fontRef idx="minor">
+            <a:schemeClr val="tx1"/>
+          </a:fontRef>
+        </p:style>
+      </p:cxnSp>
+      <p:cxnSp>
+        <p:nvCxnSpPr>
+          <p:cNvPr id="19" name="Straight Arrow Connector 18">
+            <a:extLst>
+              <a:ext uri="{FF2B5EF4-FFF2-40B4-BE49-F238E27FC236}">
+                <a16:creationId xmlns:a16="http://schemas.microsoft.com/office/drawing/2014/main" id="{9F6D41F8-4903-4BF9-8355-5DE5DA57498A}"/>
+              </a:ext>
+            </a:extLst>
+          </p:cNvPr>
+          <p:cNvCxnSpPr>
+            <a:cxnSpLocks/>
+            <a:stCxn id="15" idx="5"/>
+            <a:endCxn id="16" idx="1"/>
+          </p:cNvCxnSpPr>
+          <p:nvPr/>
+        </p:nvCxnSpPr>
+        <p:spPr>
+          <a:xfrm>
+            <a:off x="4435003" y="3300937"/>
+            <a:ext cx="588163" cy="231266"/>
+          </a:xfrm>
+          <a:prstGeom prst="straightConnector1">
+            <a:avLst/>
+          </a:prstGeom>
+          <a:ln w="31750">
+            <a:tailEnd type="triangle"/>
+          </a:ln>
+        </p:spPr>
+        <p:style>
+          <a:lnRef idx="1">
+            <a:schemeClr val="accent1"/>
+          </a:lnRef>
+          <a:fillRef idx="0">
+            <a:schemeClr val="accent1"/>
+          </a:fillRef>
+          <a:effectRef idx="0">
+            <a:schemeClr val="accent1"/>
+          </a:effectRef>
+          <a:fontRef idx="minor">
+            <a:schemeClr val="tx1"/>
+          </a:fontRef>
+        </p:style>
+      </p:cxnSp>
+      <p:sp>
+        <p:nvSpPr>
+          <p:cNvPr id="22" name="TextBox 21">
+            <a:extLst>
+              <a:ext uri="{FF2B5EF4-FFF2-40B4-BE49-F238E27FC236}">
+                <a16:creationId xmlns:a16="http://schemas.microsoft.com/office/drawing/2014/main" id="{2ED464D2-CD1F-4381-8174-BE52E371C297}"/>
+              </a:ext>
+            </a:extLst>
+          </p:cNvPr>
+          <p:cNvSpPr txBox="1"/>
+          <p:nvPr/>
+        </p:nvSpPr>
+        <p:spPr>
+          <a:xfrm>
+            <a:off x="6126827" y="3131373"/>
+            <a:ext cx="362058" cy="584775"/>
+          </a:xfrm>
+          <a:prstGeom prst="rect">
+            <a:avLst/>
+          </a:prstGeom>
+          <a:noFill/>
+        </p:spPr>
+        <p:txBody>
+          <a:bodyPr wrap="square" rtlCol="0">
+            <a:spAutoFit/>
+          </a:bodyPr>
+          <a:lstStyle/>
+          <a:p>
+            <a:r>
+              <a:rPr lang="en-US" sz="3200" b="1" dirty="0">
+                <a:latin typeface="Symbol" panose="05050102010706020507" pitchFamily="18" charset="2"/>
+              </a:rPr>
+              <a:t>s</a:t>
+            </a:r>
+          </a:p>
+        </p:txBody>
+      </p:sp>
+      <p:sp>
+        <p:nvSpPr>
+          <p:cNvPr id="23" name="Oval 22">
+            <a:extLst>
+              <a:ext uri="{FF2B5EF4-FFF2-40B4-BE49-F238E27FC236}">
+                <a16:creationId xmlns:a16="http://schemas.microsoft.com/office/drawing/2014/main" id="{CA836706-7466-47DB-8E71-9DABED5D1094}"/>
+              </a:ext>
+            </a:extLst>
+          </p:cNvPr>
+          <p:cNvSpPr/>
+          <p:nvPr/>
+        </p:nvSpPr>
+        <p:spPr>
+          <a:xfrm>
+            <a:off x="6988614" y="1413601"/>
+            <a:ext cx="946897" cy="874468"/>
+          </a:xfrm>
+          <a:prstGeom prst="ellipse">
+            <a:avLst/>
+          </a:prstGeom>
+          <a:noFill/>
+          <a:ln w="31750"/>
+        </p:spPr>
+        <p:style>
+          <a:lnRef idx="2">
+            <a:schemeClr val="accent1">
+              <a:shade val="50000"/>
+            </a:schemeClr>
+          </a:lnRef>
+          <a:fillRef idx="1">
+            <a:schemeClr val="accent1"/>
+          </a:fillRef>
+          <a:effectRef idx="0">
+            <a:schemeClr val="accent1"/>
+          </a:effectRef>
+          <a:fontRef idx="minor">
+            <a:schemeClr val="lt1"/>
+          </a:fontRef>
+        </p:style>
+        <p:txBody>
+          <a:bodyPr rtlCol="0" anchor="ctr"/>
+          <a:lstStyle/>
+          <a:p>
+            <a:pPr algn="ctr"/>
+            <a:r>
+              <a:rPr lang="en-US" sz="2800" b="1" dirty="0">
+                <a:solidFill>
+                  <a:schemeClr val="tx1"/>
+                </a:solidFill>
+              </a:rPr>
+              <a:t>W</a:t>
+            </a:r>
+            <a:r>
+              <a:rPr lang="en-US" sz="2800" b="1" baseline="30000" dirty="0">
+                <a:solidFill>
+                  <a:schemeClr val="tx1"/>
+                </a:solidFill>
+              </a:rPr>
+              <a:t>2</a:t>
+            </a:r>
+          </a:p>
+        </p:txBody>
+      </p:sp>
+      <p:sp>
+        <p:nvSpPr>
+          <p:cNvPr id="24" name="Oval 23">
+            <a:extLst>
+              <a:ext uri="{FF2B5EF4-FFF2-40B4-BE49-F238E27FC236}">
+                <a16:creationId xmlns:a16="http://schemas.microsoft.com/office/drawing/2014/main" id="{F1767E37-04E1-4950-98F8-ADD02106515B}"/>
+              </a:ext>
+            </a:extLst>
+          </p:cNvPr>
+          <p:cNvSpPr/>
+          <p:nvPr/>
+        </p:nvSpPr>
+        <p:spPr>
+          <a:xfrm>
+            <a:off x="8492519" y="2433954"/>
+            <a:ext cx="946896" cy="874467"/>
+          </a:xfrm>
+          <a:prstGeom prst="ellipse">
+            <a:avLst/>
+          </a:prstGeom>
+          <a:noFill/>
+          <a:ln w="31750"/>
+        </p:spPr>
+        <p:style>
+          <a:lnRef idx="2">
+            <a:schemeClr val="accent1">
+              <a:shade val="50000"/>
+            </a:schemeClr>
+          </a:lnRef>
+          <a:fillRef idx="1">
+            <a:schemeClr val="accent1"/>
+          </a:fillRef>
+          <a:effectRef idx="0">
+            <a:schemeClr val="accent1"/>
+          </a:effectRef>
+          <a:fontRef idx="minor">
+            <a:schemeClr val="lt1"/>
+          </a:fontRef>
+        </p:style>
+        <p:txBody>
+          <a:bodyPr rtlCol="0" anchor="ctr"/>
+          <a:lstStyle/>
+          <a:p>
+            <a:pPr algn="ctr"/>
+            <a:r>
+              <a:rPr lang="en-US" sz="2800" b="1" dirty="0">
+                <a:solidFill>
+                  <a:schemeClr val="tx1"/>
+                </a:solidFill>
+              </a:rPr>
+              <a:t>U</a:t>
+            </a:r>
+            <a:r>
+              <a:rPr lang="en-US" sz="2800" b="1" baseline="30000" dirty="0">
+                <a:solidFill>
+                  <a:schemeClr val="tx1"/>
+                </a:solidFill>
+              </a:rPr>
+              <a:t>4</a:t>
+            </a:r>
+          </a:p>
+        </p:txBody>
+      </p:sp>
+      <p:cxnSp>
+        <p:nvCxnSpPr>
+          <p:cNvPr id="25" name="Straight Arrow Connector 24">
+            <a:extLst>
+              <a:ext uri="{FF2B5EF4-FFF2-40B4-BE49-F238E27FC236}">
+                <a16:creationId xmlns:a16="http://schemas.microsoft.com/office/drawing/2014/main" id="{1011A4C1-8867-42BC-91B9-7ACDFDE11F18}"/>
+              </a:ext>
+            </a:extLst>
+          </p:cNvPr>
+          <p:cNvCxnSpPr>
+            <a:cxnSpLocks/>
+            <a:stCxn id="23" idx="6"/>
+            <a:endCxn id="24" idx="1"/>
+          </p:cNvCxnSpPr>
+          <p:nvPr/>
+        </p:nvCxnSpPr>
+        <p:spPr>
+          <a:xfrm>
+            <a:off x="7935511" y="1850835"/>
+            <a:ext cx="695678" cy="711182"/>
+          </a:xfrm>
+          <a:prstGeom prst="straightConnector1">
+            <a:avLst/>
+          </a:prstGeom>
+          <a:ln w="31750">
+            <a:tailEnd type="triangle"/>
+          </a:ln>
+        </p:spPr>
+        <p:style>
+          <a:lnRef idx="1">
+            <a:schemeClr val="accent1"/>
+          </a:lnRef>
+          <a:fillRef idx="0">
+            <a:schemeClr val="accent1"/>
+          </a:fillRef>
+          <a:effectRef idx="0">
+            <a:schemeClr val="accent1"/>
+          </a:effectRef>
+          <a:fontRef idx="minor">
+            <a:schemeClr val="tx1"/>
+          </a:fontRef>
+        </p:style>
+      </p:cxnSp>
+      <p:cxnSp>
+        <p:nvCxnSpPr>
+          <p:cNvPr id="26" name="Straight Arrow Connector 25">
+            <a:extLst>
+              <a:ext uri="{FF2B5EF4-FFF2-40B4-BE49-F238E27FC236}">
+                <a16:creationId xmlns:a16="http://schemas.microsoft.com/office/drawing/2014/main" id="{20F1441D-471B-4772-952F-C5E0E938640D}"/>
+              </a:ext>
+            </a:extLst>
+          </p:cNvPr>
+          <p:cNvCxnSpPr>
+            <a:cxnSpLocks/>
+            <a:stCxn id="33" idx="6"/>
+            <a:endCxn id="24" idx="3"/>
+          </p:cNvCxnSpPr>
+          <p:nvPr/>
+        </p:nvCxnSpPr>
+        <p:spPr>
+          <a:xfrm flipV="1">
+            <a:off x="7752301" y="3180358"/>
+            <a:ext cx="878888" cy="465151"/>
+          </a:xfrm>
+          <a:prstGeom prst="straightConnector1">
+            <a:avLst/>
+          </a:prstGeom>
+          <a:ln w="31750">
+            <a:tailEnd type="triangle"/>
+          </a:ln>
+        </p:spPr>
+        <p:style>
+          <a:lnRef idx="1">
+            <a:schemeClr val="accent1"/>
+          </a:lnRef>
+          <a:fillRef idx="0">
+            <a:schemeClr val="accent1"/>
+          </a:fillRef>
+          <a:effectRef idx="0">
+            <a:schemeClr val="accent1"/>
+          </a:effectRef>
+          <a:fontRef idx="minor">
+            <a:schemeClr val="tx1"/>
+          </a:fontRef>
+        </p:style>
+      </p:cxnSp>
+      <p:sp>
+        <p:nvSpPr>
+          <p:cNvPr id="27" name="TextBox 26">
+            <a:extLst>
+              <a:ext uri="{FF2B5EF4-FFF2-40B4-BE49-F238E27FC236}">
+                <a16:creationId xmlns:a16="http://schemas.microsoft.com/office/drawing/2014/main" id="{43A90FAE-4E81-4F10-9C47-A0E2A5BB773F}"/>
+              </a:ext>
+            </a:extLst>
+          </p:cNvPr>
+          <p:cNvSpPr txBox="1"/>
+          <p:nvPr/>
+        </p:nvSpPr>
+        <p:spPr>
+          <a:xfrm>
+            <a:off x="7814108" y="2642734"/>
+            <a:ext cx="1025247" cy="461665"/>
+          </a:xfrm>
+          <a:prstGeom prst="rect">
+            <a:avLst/>
+          </a:prstGeom>
+          <a:noFill/>
+        </p:spPr>
+        <p:txBody>
+          <a:bodyPr wrap="square" rtlCol="0">
+            <a:spAutoFit/>
+          </a:bodyPr>
+          <a:lstStyle/>
+          <a:p>
+            <a:r>
+              <a:rPr lang="en-US" sz="2400" b="1" dirty="0"/>
+              <a:t>dot</a:t>
+            </a:r>
+          </a:p>
+        </p:txBody>
+      </p:sp>
+      <p:sp>
+        <p:nvSpPr>
+          <p:cNvPr id="28" name="Oval 27">
+            <a:extLst>
+              <a:ext uri="{FF2B5EF4-FFF2-40B4-BE49-F238E27FC236}">
+                <a16:creationId xmlns:a16="http://schemas.microsoft.com/office/drawing/2014/main" id="{73670B0D-3282-478C-81F7-F69A6D663497}"/>
+              </a:ext>
+            </a:extLst>
+          </p:cNvPr>
+          <p:cNvSpPr/>
+          <p:nvPr/>
+        </p:nvSpPr>
+        <p:spPr>
+          <a:xfrm>
+            <a:off x="9143984" y="868813"/>
+            <a:ext cx="946897" cy="874468"/>
+          </a:xfrm>
+          <a:prstGeom prst="ellipse">
+            <a:avLst/>
+          </a:prstGeom>
+          <a:noFill/>
+          <a:ln w="31750"/>
+        </p:spPr>
+        <p:style>
+          <a:lnRef idx="2">
+            <a:schemeClr val="accent1">
+              <a:shade val="50000"/>
+            </a:schemeClr>
+          </a:lnRef>
+          <a:fillRef idx="1">
+            <a:schemeClr val="accent1"/>
+          </a:fillRef>
+          <a:effectRef idx="0">
+            <a:schemeClr val="accent1"/>
+          </a:effectRef>
+          <a:fontRef idx="minor">
+            <a:schemeClr val="lt1"/>
+          </a:fontRef>
+        </p:style>
+        <p:txBody>
+          <a:bodyPr rtlCol="0" anchor="ctr"/>
+          <a:lstStyle/>
+          <a:p>
+            <a:pPr algn="ctr"/>
+            <a:r>
+              <a:rPr lang="en-US" sz="2800" b="1" dirty="0">
+                <a:solidFill>
+                  <a:schemeClr val="tx1"/>
+                </a:solidFill>
+              </a:rPr>
+              <a:t>b</a:t>
+            </a:r>
+            <a:r>
+              <a:rPr lang="en-US" sz="2800" b="1" baseline="30000" dirty="0">
+                <a:solidFill>
+                  <a:schemeClr val="tx1"/>
+                </a:solidFill>
+              </a:rPr>
+              <a:t>2</a:t>
+            </a:r>
+          </a:p>
+        </p:txBody>
+      </p:sp>
+      <p:sp>
+        <p:nvSpPr>
+          <p:cNvPr id="29" name="Oval 28">
+            <a:extLst>
+              <a:ext uri="{FF2B5EF4-FFF2-40B4-BE49-F238E27FC236}">
+                <a16:creationId xmlns:a16="http://schemas.microsoft.com/office/drawing/2014/main" id="{5B9C692A-0A59-4442-9AF1-209BB7944985}"/>
+              </a:ext>
+            </a:extLst>
+          </p:cNvPr>
+          <p:cNvSpPr/>
+          <p:nvPr/>
+        </p:nvSpPr>
+        <p:spPr>
+          <a:xfrm>
+            <a:off x="10401704" y="1718421"/>
+            <a:ext cx="946896" cy="874467"/>
+          </a:xfrm>
+          <a:prstGeom prst="ellipse">
+            <a:avLst/>
+          </a:prstGeom>
+          <a:noFill/>
+          <a:ln w="31750"/>
+        </p:spPr>
+        <p:style>
+          <a:lnRef idx="2">
+            <a:schemeClr val="accent1">
+              <a:shade val="50000"/>
+            </a:schemeClr>
+          </a:lnRef>
+          <a:fillRef idx="1">
+            <a:schemeClr val="accent1"/>
+          </a:fillRef>
+          <a:effectRef idx="0">
+            <a:schemeClr val="accent1"/>
+          </a:effectRef>
+          <a:fontRef idx="minor">
+            <a:schemeClr val="lt1"/>
+          </a:fontRef>
+        </p:style>
+        <p:txBody>
+          <a:bodyPr rtlCol="0" anchor="ctr"/>
+          <a:lstStyle/>
+          <a:p>
+            <a:pPr algn="ctr"/>
+            <a:r>
+              <a:rPr lang="en-US" sz="2800" b="1" dirty="0">
+                <a:solidFill>
+                  <a:schemeClr val="tx1"/>
+                </a:solidFill>
+              </a:rPr>
+              <a:t>Y</a:t>
+            </a:r>
+          </a:p>
+        </p:txBody>
+      </p:sp>
+      <p:cxnSp>
+        <p:nvCxnSpPr>
+          <p:cNvPr id="30" name="Straight Arrow Connector 29">
+            <a:extLst>
+              <a:ext uri="{FF2B5EF4-FFF2-40B4-BE49-F238E27FC236}">
+                <a16:creationId xmlns:a16="http://schemas.microsoft.com/office/drawing/2014/main" id="{754AB27B-95F1-4CEE-892C-FF910AB56C1F}"/>
+              </a:ext>
+            </a:extLst>
+          </p:cNvPr>
+          <p:cNvCxnSpPr>
+            <a:cxnSpLocks/>
+            <a:endCxn id="29" idx="3"/>
+          </p:cNvCxnSpPr>
+          <p:nvPr/>
+        </p:nvCxnSpPr>
+        <p:spPr>
+          <a:xfrm flipV="1">
+            <a:off x="9427691" y="2464825"/>
+            <a:ext cx="1112683" cy="272288"/>
+          </a:xfrm>
+          <a:prstGeom prst="straightConnector1">
+            <a:avLst/>
+          </a:prstGeom>
+          <a:ln w="31750">
+            <a:tailEnd type="triangle"/>
+          </a:ln>
+        </p:spPr>
+        <p:style>
+          <a:lnRef idx="1">
+            <a:schemeClr val="accent1"/>
+          </a:lnRef>
+          <a:fillRef idx="0">
+            <a:schemeClr val="accent1"/>
+          </a:fillRef>
+          <a:effectRef idx="0">
+            <a:schemeClr val="accent1"/>
+          </a:effectRef>
+          <a:fontRef idx="minor">
+            <a:schemeClr val="tx1"/>
+          </a:fontRef>
+        </p:style>
+      </p:cxnSp>
+      <p:cxnSp>
+        <p:nvCxnSpPr>
+          <p:cNvPr id="31" name="Straight Arrow Connector 30">
+            <a:extLst>
+              <a:ext uri="{FF2B5EF4-FFF2-40B4-BE49-F238E27FC236}">
+                <a16:creationId xmlns:a16="http://schemas.microsoft.com/office/drawing/2014/main" id="{96993ADB-DB7B-4C1B-8EDC-77CCD3436536}"/>
+              </a:ext>
+            </a:extLst>
+          </p:cNvPr>
+          <p:cNvCxnSpPr>
+            <a:cxnSpLocks/>
+            <a:stCxn id="28" idx="5"/>
+            <a:endCxn id="29" idx="1"/>
+          </p:cNvCxnSpPr>
+          <p:nvPr/>
+        </p:nvCxnSpPr>
+        <p:spPr>
+          <a:xfrm>
+            <a:off x="9952211" y="1615218"/>
+            <a:ext cx="588163" cy="231266"/>
+          </a:xfrm>
+          <a:prstGeom prst="straightConnector1">
+            <a:avLst/>
+          </a:prstGeom>
+          <a:ln w="31750">
+            <a:tailEnd type="triangle"/>
+          </a:ln>
+        </p:spPr>
+        <p:style>
+          <a:lnRef idx="1">
+            <a:schemeClr val="accent1"/>
+          </a:lnRef>
+          <a:fillRef idx="0">
+            <a:schemeClr val="accent1"/>
+          </a:fillRef>
+          <a:effectRef idx="0">
+            <a:schemeClr val="accent1"/>
+          </a:effectRef>
+          <a:fontRef idx="minor">
+            <a:schemeClr val="tx1"/>
+          </a:fontRef>
+        </p:style>
+      </p:cxnSp>
+      <p:sp>
+        <p:nvSpPr>
+          <p:cNvPr id="32" name="TextBox 31">
+            <a:extLst>
+              <a:ext uri="{FF2B5EF4-FFF2-40B4-BE49-F238E27FC236}">
+                <a16:creationId xmlns:a16="http://schemas.microsoft.com/office/drawing/2014/main" id="{E2B4D6DB-B6A6-4644-BDB1-1C44AE2FB978}"/>
+              </a:ext>
+            </a:extLst>
+          </p:cNvPr>
+          <p:cNvSpPr txBox="1"/>
+          <p:nvPr/>
+        </p:nvSpPr>
+        <p:spPr>
+          <a:xfrm>
+            <a:off x="9944196" y="1846484"/>
+            <a:ext cx="362058" cy="584775"/>
+          </a:xfrm>
+          <a:prstGeom prst="rect">
+            <a:avLst/>
+          </a:prstGeom>
+          <a:noFill/>
+        </p:spPr>
+        <p:txBody>
+          <a:bodyPr wrap="square" rtlCol="0">
+            <a:spAutoFit/>
+          </a:bodyPr>
+          <a:lstStyle/>
+          <a:p>
+            <a:r>
+              <a:rPr lang="en-US" sz="3200" b="1" dirty="0"/>
+              <a:t>+</a:t>
+            </a:r>
+          </a:p>
+        </p:txBody>
+      </p:sp>
+      <p:sp>
+        <p:nvSpPr>
+          <p:cNvPr id="33" name="Oval 32">
+            <a:extLst>
+              <a:ext uri="{FF2B5EF4-FFF2-40B4-BE49-F238E27FC236}">
+                <a16:creationId xmlns:a16="http://schemas.microsoft.com/office/drawing/2014/main" id="{060AB016-1596-4A32-8766-DED513FFB7CD}"/>
+              </a:ext>
+            </a:extLst>
+          </p:cNvPr>
+          <p:cNvSpPr/>
+          <p:nvPr/>
+        </p:nvSpPr>
+        <p:spPr>
+          <a:xfrm>
+            <a:off x="6805405" y="3208275"/>
+            <a:ext cx="946896" cy="874467"/>
+          </a:xfrm>
+          <a:prstGeom prst="ellipse">
+            <a:avLst/>
+          </a:prstGeom>
+          <a:noFill/>
+          <a:ln w="31750"/>
+        </p:spPr>
+        <p:style>
+          <a:lnRef idx="2">
+            <a:schemeClr val="accent1">
+              <a:shade val="50000"/>
+            </a:schemeClr>
+          </a:lnRef>
+          <a:fillRef idx="1">
+            <a:schemeClr val="accent1"/>
+          </a:fillRef>
+          <a:effectRef idx="0">
+            <a:schemeClr val="accent1"/>
+          </a:effectRef>
+          <a:fontRef idx="minor">
+            <a:schemeClr val="lt1"/>
+          </a:fontRef>
+        </p:style>
+        <p:txBody>
+          <a:bodyPr rtlCol="0" anchor="ctr"/>
+          <a:lstStyle/>
+          <a:p>
+            <a:pPr algn="ctr"/>
+            <a:r>
+              <a:rPr lang="en-US" sz="2800" b="1" dirty="0">
+                <a:solidFill>
+                  <a:schemeClr val="tx1"/>
+                </a:solidFill>
+              </a:rPr>
+              <a:t>U</a:t>
+            </a:r>
+            <a:r>
+              <a:rPr lang="en-US" sz="2800" b="1" baseline="30000" dirty="0">
+                <a:solidFill>
+                  <a:schemeClr val="tx1"/>
+                </a:solidFill>
+              </a:rPr>
+              <a:t>3</a:t>
+            </a:r>
+          </a:p>
+        </p:txBody>
+      </p:sp>
+      <p:cxnSp>
+        <p:nvCxnSpPr>
+          <p:cNvPr id="34" name="Straight Arrow Connector 33">
+            <a:extLst>
+              <a:ext uri="{FF2B5EF4-FFF2-40B4-BE49-F238E27FC236}">
+                <a16:creationId xmlns:a16="http://schemas.microsoft.com/office/drawing/2014/main" id="{6A666B90-F1AF-468F-B163-CA40E2C365BD}"/>
+              </a:ext>
+            </a:extLst>
+          </p:cNvPr>
+          <p:cNvCxnSpPr>
+            <a:cxnSpLocks/>
+            <a:endCxn id="33" idx="2"/>
+          </p:cNvCxnSpPr>
+          <p:nvPr/>
+        </p:nvCxnSpPr>
+        <p:spPr>
+          <a:xfrm flipV="1">
+            <a:off x="5822678" y="3645509"/>
+            <a:ext cx="982727" cy="195864"/>
+          </a:xfrm>
+          <a:prstGeom prst="straightConnector1">
+            <a:avLst/>
+          </a:prstGeom>
+          <a:ln w="31750">
+            <a:tailEnd type="triangle"/>
+          </a:ln>
+        </p:spPr>
+        <p:style>
+          <a:lnRef idx="1">
+            <a:schemeClr val="accent1"/>
+          </a:lnRef>
+          <a:fillRef idx="0">
+            <a:schemeClr val="accent1"/>
+          </a:fillRef>
+          <a:effectRef idx="0">
+            <a:schemeClr val="accent1"/>
+          </a:effectRef>
+          <a:fontRef idx="minor">
+            <a:schemeClr val="tx1"/>
+          </a:fontRef>
+        </p:style>
+      </p:cxnSp>
+      <p:sp>
+        <p:nvSpPr>
+          <p:cNvPr id="39" name="TextBox 38">
+            <a:extLst>
+              <a:ext uri="{FF2B5EF4-FFF2-40B4-BE49-F238E27FC236}">
+                <a16:creationId xmlns:a16="http://schemas.microsoft.com/office/drawing/2014/main" id="{8A59D4FC-EBD4-4229-8E84-636D9EB10FDD}"/>
+              </a:ext>
+            </a:extLst>
+          </p:cNvPr>
+          <p:cNvSpPr txBox="1"/>
+          <p:nvPr/>
+        </p:nvSpPr>
+        <p:spPr>
+          <a:xfrm>
+            <a:off x="4425811" y="3532203"/>
+            <a:ext cx="362058" cy="584775"/>
+          </a:xfrm>
+          <a:prstGeom prst="rect">
+            <a:avLst/>
+          </a:prstGeom>
+          <a:noFill/>
+        </p:spPr>
+        <p:txBody>
+          <a:bodyPr wrap="square" rtlCol="0">
+            <a:spAutoFit/>
+          </a:bodyPr>
+          <a:lstStyle/>
+          <a:p>
+            <a:r>
+              <a:rPr lang="en-US" sz="3200" b="1" dirty="0"/>
+              <a:t>+</a:t>
+            </a:r>
+          </a:p>
+        </p:txBody>
+      </p:sp>
+    </p:spTree>
+    <p:extLst>
+      <p:ext uri="{BB962C8B-B14F-4D97-AF65-F5344CB8AC3E}">
+        <p14:creationId xmlns:p14="http://schemas.microsoft.com/office/powerpoint/2010/main" val="2821755574"/>
       </p:ext>
     </p:extLst>
   </p:cSld>

</xml_diff>

<commit_message>
Added figures for noebook
</commit_message>
<xml_diff>
--- a/Lesson1/Figures/Lesson1Figures.pptx
+++ b/Lesson1/Figures/Lesson1Figures.pptx
@@ -263,7 +263,7 @@
           <a:p>
             <a:fld id="{A2EECDC0-4DBF-47B0-8F9E-98A50DA8BD3F}" type="datetimeFigureOut">
               <a:rPr lang="en-US" smtClean="0"/>
-              <a:t>3/19/2018</a:t>
+              <a:t>3/21/2018</a:t>
             </a:fld>
             <a:endParaRPr lang="en-US"/>
           </a:p>
@@ -461,7 +461,7 @@
           <a:p>
             <a:fld id="{A2EECDC0-4DBF-47B0-8F9E-98A50DA8BD3F}" type="datetimeFigureOut">
               <a:rPr lang="en-US" smtClean="0"/>
-              <a:t>3/19/2018</a:t>
+              <a:t>3/21/2018</a:t>
             </a:fld>
             <a:endParaRPr lang="en-US"/>
           </a:p>
@@ -669,7 +669,7 @@
           <a:p>
             <a:fld id="{A2EECDC0-4DBF-47B0-8F9E-98A50DA8BD3F}" type="datetimeFigureOut">
               <a:rPr lang="en-US" smtClean="0"/>
-              <a:t>3/19/2018</a:t>
+              <a:t>3/21/2018</a:t>
             </a:fld>
             <a:endParaRPr lang="en-US"/>
           </a:p>
@@ -867,7 +867,7 @@
           <a:p>
             <a:fld id="{A2EECDC0-4DBF-47B0-8F9E-98A50DA8BD3F}" type="datetimeFigureOut">
               <a:rPr lang="en-US" smtClean="0"/>
-              <a:t>3/19/2018</a:t>
+              <a:t>3/21/2018</a:t>
             </a:fld>
             <a:endParaRPr lang="en-US"/>
           </a:p>
@@ -1142,7 +1142,7 @@
           <a:p>
             <a:fld id="{A2EECDC0-4DBF-47B0-8F9E-98A50DA8BD3F}" type="datetimeFigureOut">
               <a:rPr lang="en-US" smtClean="0"/>
-              <a:t>3/19/2018</a:t>
+              <a:t>3/21/2018</a:t>
             </a:fld>
             <a:endParaRPr lang="en-US"/>
           </a:p>
@@ -1407,7 +1407,7 @@
           <a:p>
             <a:fld id="{A2EECDC0-4DBF-47B0-8F9E-98A50DA8BD3F}" type="datetimeFigureOut">
               <a:rPr lang="en-US" smtClean="0"/>
-              <a:t>3/19/2018</a:t>
+              <a:t>3/21/2018</a:t>
             </a:fld>
             <a:endParaRPr lang="en-US"/>
           </a:p>
@@ -1819,7 +1819,7 @@
           <a:p>
             <a:fld id="{A2EECDC0-4DBF-47B0-8F9E-98A50DA8BD3F}" type="datetimeFigureOut">
               <a:rPr lang="en-US" smtClean="0"/>
-              <a:t>3/19/2018</a:t>
+              <a:t>3/21/2018</a:t>
             </a:fld>
             <a:endParaRPr lang="en-US"/>
           </a:p>
@@ -1960,7 +1960,7 @@
           <a:p>
             <a:fld id="{A2EECDC0-4DBF-47B0-8F9E-98A50DA8BD3F}" type="datetimeFigureOut">
               <a:rPr lang="en-US" smtClean="0"/>
-              <a:t>3/19/2018</a:t>
+              <a:t>3/21/2018</a:t>
             </a:fld>
             <a:endParaRPr lang="en-US"/>
           </a:p>
@@ -2073,7 +2073,7 @@
           <a:p>
             <a:fld id="{A2EECDC0-4DBF-47B0-8F9E-98A50DA8BD3F}" type="datetimeFigureOut">
               <a:rPr lang="en-US" smtClean="0"/>
-              <a:t>3/19/2018</a:t>
+              <a:t>3/21/2018</a:t>
             </a:fld>
             <a:endParaRPr lang="en-US"/>
           </a:p>
@@ -2384,7 +2384,7 @@
           <a:p>
             <a:fld id="{A2EECDC0-4DBF-47B0-8F9E-98A50DA8BD3F}" type="datetimeFigureOut">
               <a:rPr lang="en-US" smtClean="0"/>
-              <a:t>3/19/2018</a:t>
+              <a:t>3/21/2018</a:t>
             </a:fld>
             <a:endParaRPr lang="en-US"/>
           </a:p>
@@ -2672,7 +2672,7 @@
           <a:p>
             <a:fld id="{A2EECDC0-4DBF-47B0-8F9E-98A50DA8BD3F}" type="datetimeFigureOut">
               <a:rPr lang="en-US" smtClean="0"/>
-              <a:t>3/19/2018</a:t>
+              <a:t>3/21/2018</a:t>
             </a:fld>
             <a:endParaRPr lang="en-US"/>
           </a:p>
@@ -2913,7 +2913,7 @@
           <a:p>
             <a:fld id="{A2EECDC0-4DBF-47B0-8F9E-98A50DA8BD3F}" type="datetimeFigureOut">
               <a:rPr lang="en-US" smtClean="0"/>
-              <a:t>3/19/2018</a:t>
+              <a:t>3/21/2018</a:t>
             </a:fld>
             <a:endParaRPr lang="en-US"/>
           </a:p>
@@ -6587,7 +6587,7 @@
         </p:nvSpPr>
         <p:spPr>
           <a:xfrm>
-            <a:off x="1459684" y="4886586"/>
+            <a:off x="218113" y="5335397"/>
             <a:ext cx="946896" cy="874467"/>
           </a:xfrm>
           <a:prstGeom prst="ellipse">
@@ -6642,7 +6642,7 @@
         </p:nvSpPr>
         <p:spPr>
           <a:xfrm>
-            <a:off x="1459682" y="2991766"/>
+            <a:off x="218111" y="3440577"/>
             <a:ext cx="946897" cy="874468"/>
           </a:xfrm>
           <a:prstGeom prst="ellipse">
@@ -6705,7 +6705,7 @@
         </p:nvSpPr>
         <p:spPr>
           <a:xfrm>
-            <a:off x="2963587" y="4012119"/>
+            <a:off x="1722016" y="4460930"/>
             <a:ext cx="946896" cy="874467"/>
           </a:xfrm>
           <a:prstGeom prst="ellipse">
@@ -6772,7 +6772,7 @@
         </p:nvCxnSpPr>
         <p:spPr>
           <a:xfrm>
-            <a:off x="2406579" y="3429000"/>
+            <a:off x="1165008" y="3877811"/>
             <a:ext cx="695678" cy="711182"/>
           </a:xfrm>
           <a:prstGeom prst="straightConnector1">
@@ -6815,7 +6815,7 @@
         </p:nvCxnSpPr>
         <p:spPr>
           <a:xfrm flipV="1">
-            <a:off x="2406580" y="4758523"/>
+            <a:off x="1165009" y="5207334"/>
             <a:ext cx="695677" cy="565297"/>
           </a:xfrm>
           <a:prstGeom prst="straightConnector1">
@@ -6854,7 +6854,7 @@
         </p:nvSpPr>
         <p:spPr>
           <a:xfrm>
-            <a:off x="2172460" y="3943300"/>
+            <a:off x="930889" y="4392111"/>
             <a:ext cx="1025247" cy="830997"/>
           </a:xfrm>
           <a:prstGeom prst="rect">
@@ -6896,7 +6896,7 @@
         </p:nvSpPr>
         <p:spPr>
           <a:xfrm>
-            <a:off x="3626776" y="2554532"/>
+            <a:off x="2385205" y="3003343"/>
             <a:ext cx="946897" cy="874468"/>
           </a:xfrm>
           <a:prstGeom prst="ellipse">
@@ -6959,7 +6959,7 @@
         </p:nvSpPr>
         <p:spPr>
           <a:xfrm>
-            <a:off x="4884496" y="3404140"/>
+            <a:off x="3642925" y="3852951"/>
             <a:ext cx="946896" cy="874467"/>
           </a:xfrm>
           <a:prstGeom prst="ellipse">
@@ -7025,7 +7025,7 @@
         </p:nvCxnSpPr>
         <p:spPr>
           <a:xfrm flipV="1">
-            <a:off x="3910483" y="4150544"/>
+            <a:off x="2668912" y="4599355"/>
             <a:ext cx="1112683" cy="272288"/>
           </a:xfrm>
           <a:prstGeom prst="straightConnector1">
@@ -7068,7 +7068,7 @@
         </p:nvCxnSpPr>
         <p:spPr>
           <a:xfrm>
-            <a:off x="4435003" y="3300937"/>
+            <a:off x="3193432" y="3749748"/>
             <a:ext cx="588163" cy="231266"/>
           </a:xfrm>
           <a:prstGeom prst="straightConnector1">
@@ -7107,8 +7107,8 @@
         </p:nvSpPr>
         <p:spPr>
           <a:xfrm>
-            <a:off x="6126827" y="3131373"/>
-            <a:ext cx="362058" cy="584775"/>
+            <a:off x="4885256" y="3580184"/>
+            <a:ext cx="746586" cy="584775"/>
           </a:xfrm>
           <a:prstGeom prst="rect">
             <a:avLst/>
@@ -7122,11 +7122,16 @@
           <a:lstStyle/>
           <a:p>
             <a:r>
-              <a:rPr lang="en-US" sz="3200" b="1" dirty="0">
+              <a:rPr lang="en-US" sz="3200" b="1" dirty="0" err="1">
                 <a:latin typeface="Symbol" panose="05050102010706020507" pitchFamily="18" charset="2"/>
               </a:rPr>
               <a:t>s</a:t>
             </a:r>
+            <a:r>
+              <a:rPr lang="en-US" sz="3200" b="1" baseline="-25000" dirty="0" err="1"/>
+              <a:t>h</a:t>
+            </a:r>
+            <a:endParaRPr lang="en-US" sz="3200" b="1" baseline="-25000" dirty="0"/>
           </a:p>
         </p:txBody>
       </p:sp>
@@ -7144,7 +7149,7 @@
         </p:nvSpPr>
         <p:spPr>
           <a:xfrm>
-            <a:off x="6988614" y="1413601"/>
+            <a:off x="5747043" y="1862412"/>
             <a:ext cx="946897" cy="874468"/>
           </a:xfrm>
           <a:prstGeom prst="ellipse">
@@ -7207,7 +7212,7 @@
         </p:nvSpPr>
         <p:spPr>
           <a:xfrm>
-            <a:off x="8492519" y="2433954"/>
+            <a:off x="7250948" y="2882765"/>
             <a:ext cx="946896" cy="874467"/>
           </a:xfrm>
           <a:prstGeom prst="ellipse">
@@ -7274,7 +7279,7 @@
         </p:nvCxnSpPr>
         <p:spPr>
           <a:xfrm>
-            <a:off x="7935511" y="1850835"/>
+            <a:off x="6693940" y="2299646"/>
             <a:ext cx="695678" cy="711182"/>
           </a:xfrm>
           <a:prstGeom prst="straightConnector1">
@@ -7317,7 +7322,7 @@
         </p:nvCxnSpPr>
         <p:spPr>
           <a:xfrm flipV="1">
-            <a:off x="7752301" y="3180358"/>
+            <a:off x="6510730" y="3629169"/>
             <a:ext cx="878888" cy="465151"/>
           </a:xfrm>
           <a:prstGeom prst="straightConnector1">
@@ -7356,7 +7361,7 @@
         </p:nvSpPr>
         <p:spPr>
           <a:xfrm>
-            <a:off x="7814108" y="2642734"/>
+            <a:off x="6572537" y="3091545"/>
             <a:ext cx="1025247" cy="461665"/>
           </a:xfrm>
           <a:prstGeom prst="rect">
@@ -7391,7 +7396,7 @@
         </p:nvSpPr>
         <p:spPr>
           <a:xfrm>
-            <a:off x="9143984" y="868813"/>
+            <a:off x="7902413" y="1317624"/>
             <a:ext cx="946897" cy="874468"/>
           </a:xfrm>
           <a:prstGeom prst="ellipse">
@@ -7454,7 +7459,7 @@
         </p:nvSpPr>
         <p:spPr>
           <a:xfrm>
-            <a:off x="10401704" y="1718421"/>
+            <a:off x="11013146" y="1780770"/>
             <a:ext cx="946896" cy="874467"/>
           </a:xfrm>
           <a:prstGeom prst="ellipse">
@@ -7506,13 +7511,12 @@
           </p:cNvPr>
           <p:cNvCxnSpPr>
             <a:cxnSpLocks/>
-            <a:endCxn id="29" idx="3"/>
           </p:cNvCxnSpPr>
           <p:nvPr/>
         </p:nvCxnSpPr>
         <p:spPr>
           <a:xfrm flipV="1">
-            <a:off x="9427691" y="2464825"/>
+            <a:off x="8186120" y="2913636"/>
             <a:ext cx="1112683" cy="272288"/>
           </a:xfrm>
           <a:prstGeom prst="straightConnector1">
@@ -7549,13 +7553,12 @@
           <p:cNvCxnSpPr>
             <a:cxnSpLocks/>
             <a:stCxn id="28" idx="5"/>
-            <a:endCxn id="29" idx="1"/>
           </p:cNvCxnSpPr>
           <p:nvPr/>
         </p:nvCxnSpPr>
         <p:spPr>
           <a:xfrm>
-            <a:off x="9952211" y="1615218"/>
+            <a:off x="8710640" y="2064029"/>
             <a:ext cx="588163" cy="231266"/>
           </a:xfrm>
           <a:prstGeom prst="straightConnector1">
@@ -7594,7 +7597,7 @@
         </p:nvSpPr>
         <p:spPr>
           <a:xfrm>
-            <a:off x="9944196" y="1846484"/>
+            <a:off x="8702625" y="2295295"/>
             <a:ext cx="362058" cy="584775"/>
           </a:xfrm>
           <a:prstGeom prst="rect">
@@ -7629,7 +7632,7 @@
         </p:nvSpPr>
         <p:spPr>
           <a:xfrm>
-            <a:off x="6805405" y="3208275"/>
+            <a:off x="5563834" y="3657086"/>
             <a:ext cx="946896" cy="874467"/>
           </a:xfrm>
           <a:prstGeom prst="ellipse">
@@ -7695,7 +7698,7 @@
         </p:nvCxnSpPr>
         <p:spPr>
           <a:xfrm flipV="1">
-            <a:off x="5822678" y="3645509"/>
+            <a:off x="4581107" y="4094320"/>
             <a:ext cx="982727" cy="195864"/>
           </a:xfrm>
           <a:prstGeom prst="straightConnector1">
@@ -7734,7 +7737,7 @@
         </p:nvSpPr>
         <p:spPr>
           <a:xfrm>
-            <a:off x="4425811" y="3532203"/>
+            <a:off x="3184240" y="3981014"/>
             <a:ext cx="362058" cy="584775"/>
           </a:xfrm>
           <a:prstGeom prst="rect">
@@ -7755,6 +7758,154 @@
           </a:p>
         </p:txBody>
       </p:sp>
+      <p:sp>
+        <p:nvSpPr>
+          <p:cNvPr id="35" name="Oval 34">
+            <a:extLst>
+              <a:ext uri="{FF2B5EF4-FFF2-40B4-BE49-F238E27FC236}">
+                <a16:creationId xmlns:a16="http://schemas.microsoft.com/office/drawing/2014/main" id="{BF205658-02C2-4BEC-8CE1-6AC18BBD3427}"/>
+              </a:ext>
+            </a:extLst>
+          </p:cNvPr>
+          <p:cNvSpPr/>
+          <p:nvPr/>
+        </p:nvSpPr>
+        <p:spPr>
+          <a:xfrm>
+            <a:off x="9137903" y="2175313"/>
+            <a:ext cx="946896" cy="874467"/>
+          </a:xfrm>
+          <a:prstGeom prst="ellipse">
+            <a:avLst/>
+          </a:prstGeom>
+          <a:noFill/>
+          <a:ln w="31750"/>
+        </p:spPr>
+        <p:style>
+          <a:lnRef idx="2">
+            <a:schemeClr val="accent1">
+              <a:shade val="50000"/>
+            </a:schemeClr>
+          </a:lnRef>
+          <a:fillRef idx="1">
+            <a:schemeClr val="accent1"/>
+          </a:fillRef>
+          <a:effectRef idx="0">
+            <a:schemeClr val="accent1"/>
+          </a:effectRef>
+          <a:fontRef idx="minor">
+            <a:schemeClr val="lt1"/>
+          </a:fontRef>
+        </p:style>
+        <p:txBody>
+          <a:bodyPr rtlCol="0" anchor="ctr"/>
+          <a:lstStyle/>
+          <a:p>
+            <a:pPr algn="ctr"/>
+            <a:r>
+              <a:rPr lang="en-US" sz="2800" b="1" dirty="0">
+                <a:solidFill>
+                  <a:schemeClr val="tx1"/>
+                </a:solidFill>
+              </a:rPr>
+              <a:t>U</a:t>
+            </a:r>
+            <a:r>
+              <a:rPr lang="en-US" sz="2800" b="1" baseline="30000" dirty="0">
+                <a:solidFill>
+                  <a:schemeClr val="tx1"/>
+                </a:solidFill>
+              </a:rPr>
+              <a:t>5</a:t>
+            </a:r>
+          </a:p>
+        </p:txBody>
+      </p:sp>
+      <p:sp>
+        <p:nvSpPr>
+          <p:cNvPr id="36" name="TextBox 35">
+            <a:extLst>
+              <a:ext uri="{FF2B5EF4-FFF2-40B4-BE49-F238E27FC236}">
+                <a16:creationId xmlns:a16="http://schemas.microsoft.com/office/drawing/2014/main" id="{DCB949CF-5C09-4C7E-803F-8F7B97D67457}"/>
+              </a:ext>
+            </a:extLst>
+          </p:cNvPr>
+          <p:cNvSpPr txBox="1"/>
+          <p:nvPr/>
+        </p:nvSpPr>
+        <p:spPr>
+          <a:xfrm>
+            <a:off x="10346280" y="1781159"/>
+            <a:ext cx="746586" cy="584775"/>
+          </a:xfrm>
+          <a:prstGeom prst="rect">
+            <a:avLst/>
+          </a:prstGeom>
+          <a:noFill/>
+        </p:spPr>
+        <p:txBody>
+          <a:bodyPr wrap="square" rtlCol="0">
+            <a:spAutoFit/>
+          </a:bodyPr>
+          <a:lstStyle/>
+          <a:p>
+            <a:r>
+              <a:rPr lang="en-US" sz="3200" b="1" dirty="0">
+                <a:latin typeface="Symbol" panose="05050102010706020507" pitchFamily="18" charset="2"/>
+              </a:rPr>
+              <a:t>S</a:t>
+            </a:r>
+            <a:r>
+              <a:rPr lang="en-US" sz="3200" b="1" baseline="-25000" dirty="0">
+                <a:latin typeface="Symbol" panose="05050102010706020507" pitchFamily="18" charset="2"/>
+              </a:rPr>
+              <a:t>o</a:t>
+            </a:r>
+            <a:endParaRPr lang="en-US" sz="3200" b="1" baseline="-25000" dirty="0"/>
+          </a:p>
+        </p:txBody>
+      </p:sp>
+      <p:cxnSp>
+        <p:nvCxnSpPr>
+          <p:cNvPr id="37" name="Straight Arrow Connector 36">
+            <a:extLst>
+              <a:ext uri="{FF2B5EF4-FFF2-40B4-BE49-F238E27FC236}">
+                <a16:creationId xmlns:a16="http://schemas.microsoft.com/office/drawing/2014/main" id="{49ADE0A5-6BD8-495E-9C15-53DF3928C182}"/>
+              </a:ext>
+            </a:extLst>
+          </p:cNvPr>
+          <p:cNvCxnSpPr>
+            <a:cxnSpLocks/>
+          </p:cNvCxnSpPr>
+          <p:nvPr/>
+        </p:nvCxnSpPr>
+        <p:spPr>
+          <a:xfrm flipV="1">
+            <a:off x="10042131" y="2295295"/>
+            <a:ext cx="982727" cy="195864"/>
+          </a:xfrm>
+          <a:prstGeom prst="straightConnector1">
+            <a:avLst/>
+          </a:prstGeom>
+          <a:ln w="31750">
+            <a:tailEnd type="triangle"/>
+          </a:ln>
+        </p:spPr>
+        <p:style>
+          <a:lnRef idx="1">
+            <a:schemeClr val="accent1"/>
+          </a:lnRef>
+          <a:fillRef idx="0">
+            <a:schemeClr val="accent1"/>
+          </a:fillRef>
+          <a:effectRef idx="0">
+            <a:schemeClr val="accent1"/>
+          </a:effectRef>
+          <a:fontRef idx="minor">
+            <a:schemeClr val="tx1"/>
+          </a:fontRef>
+        </p:style>
+      </p:cxnSp>
     </p:spTree>
     <p:extLst>
       <p:ext uri="{BB962C8B-B14F-4D97-AF65-F5344CB8AC3E}">

</xml_diff>

<commit_message>
Added compuational graph of loss function
</commit_message>
<xml_diff>
--- a/Lesson1/Figures/Lesson1Figures.pptx
+++ b/Lesson1/Figures/Lesson1Figures.pptx
@@ -10,6 +10,8 @@
     <p:sldId id="257" r:id="rId4"/>
     <p:sldId id="259" r:id="rId5"/>
     <p:sldId id="260" r:id="rId6"/>
+    <p:sldId id="261" r:id="rId7"/>
+    <p:sldId id="262" r:id="rId8"/>
   </p:sldIdLst>
   <p:sldSz cx="12192000" cy="6858000"/>
   <p:notesSz cx="6858000" cy="9144000"/>
@@ -263,7 +265,7 @@
           <a:p>
             <a:fld id="{A2EECDC0-4DBF-47B0-8F9E-98A50DA8BD3F}" type="datetimeFigureOut">
               <a:rPr lang="en-US" smtClean="0"/>
-              <a:t>3/21/2018</a:t>
+              <a:t>3/23/2018</a:t>
             </a:fld>
             <a:endParaRPr lang="en-US"/>
           </a:p>
@@ -461,7 +463,7 @@
           <a:p>
             <a:fld id="{A2EECDC0-4DBF-47B0-8F9E-98A50DA8BD3F}" type="datetimeFigureOut">
               <a:rPr lang="en-US" smtClean="0"/>
-              <a:t>3/21/2018</a:t>
+              <a:t>3/23/2018</a:t>
             </a:fld>
             <a:endParaRPr lang="en-US"/>
           </a:p>
@@ -669,7 +671,7 @@
           <a:p>
             <a:fld id="{A2EECDC0-4DBF-47B0-8F9E-98A50DA8BD3F}" type="datetimeFigureOut">
               <a:rPr lang="en-US" smtClean="0"/>
-              <a:t>3/21/2018</a:t>
+              <a:t>3/23/2018</a:t>
             </a:fld>
             <a:endParaRPr lang="en-US"/>
           </a:p>
@@ -867,7 +869,7 @@
           <a:p>
             <a:fld id="{A2EECDC0-4DBF-47B0-8F9E-98A50DA8BD3F}" type="datetimeFigureOut">
               <a:rPr lang="en-US" smtClean="0"/>
-              <a:t>3/21/2018</a:t>
+              <a:t>3/23/2018</a:t>
             </a:fld>
             <a:endParaRPr lang="en-US"/>
           </a:p>
@@ -1142,7 +1144,7 @@
           <a:p>
             <a:fld id="{A2EECDC0-4DBF-47B0-8F9E-98A50DA8BD3F}" type="datetimeFigureOut">
               <a:rPr lang="en-US" smtClean="0"/>
-              <a:t>3/21/2018</a:t>
+              <a:t>3/23/2018</a:t>
             </a:fld>
             <a:endParaRPr lang="en-US"/>
           </a:p>
@@ -1407,7 +1409,7 @@
           <a:p>
             <a:fld id="{A2EECDC0-4DBF-47B0-8F9E-98A50DA8BD3F}" type="datetimeFigureOut">
               <a:rPr lang="en-US" smtClean="0"/>
-              <a:t>3/21/2018</a:t>
+              <a:t>3/23/2018</a:t>
             </a:fld>
             <a:endParaRPr lang="en-US"/>
           </a:p>
@@ -1819,7 +1821,7 @@
           <a:p>
             <a:fld id="{A2EECDC0-4DBF-47B0-8F9E-98A50DA8BD3F}" type="datetimeFigureOut">
               <a:rPr lang="en-US" smtClean="0"/>
-              <a:t>3/21/2018</a:t>
+              <a:t>3/23/2018</a:t>
             </a:fld>
             <a:endParaRPr lang="en-US"/>
           </a:p>
@@ -1960,7 +1962,7 @@
           <a:p>
             <a:fld id="{A2EECDC0-4DBF-47B0-8F9E-98A50DA8BD3F}" type="datetimeFigureOut">
               <a:rPr lang="en-US" smtClean="0"/>
-              <a:t>3/21/2018</a:t>
+              <a:t>3/23/2018</a:t>
             </a:fld>
             <a:endParaRPr lang="en-US"/>
           </a:p>
@@ -2073,7 +2075,7 @@
           <a:p>
             <a:fld id="{A2EECDC0-4DBF-47B0-8F9E-98A50DA8BD3F}" type="datetimeFigureOut">
               <a:rPr lang="en-US" smtClean="0"/>
-              <a:t>3/21/2018</a:t>
+              <a:t>3/23/2018</a:t>
             </a:fld>
             <a:endParaRPr lang="en-US"/>
           </a:p>
@@ -2384,7 +2386,7 @@
           <a:p>
             <a:fld id="{A2EECDC0-4DBF-47B0-8F9E-98A50DA8BD3F}" type="datetimeFigureOut">
               <a:rPr lang="en-US" smtClean="0"/>
-              <a:t>3/21/2018</a:t>
+              <a:t>3/23/2018</a:t>
             </a:fld>
             <a:endParaRPr lang="en-US"/>
           </a:p>
@@ -2672,7 +2674,7 @@
           <a:p>
             <a:fld id="{A2EECDC0-4DBF-47B0-8F9E-98A50DA8BD3F}" type="datetimeFigureOut">
               <a:rPr lang="en-US" smtClean="0"/>
-              <a:t>3/21/2018</a:t>
+              <a:t>3/23/2018</a:t>
             </a:fld>
             <a:endParaRPr lang="en-US"/>
           </a:p>
@@ -2913,7 +2915,7 @@
           <a:p>
             <a:fld id="{A2EECDC0-4DBF-47B0-8F9E-98A50DA8BD3F}" type="datetimeFigureOut">
               <a:rPr lang="en-US" smtClean="0"/>
-              <a:t>3/21/2018</a:t>
+              <a:t>3/23/2018</a:t>
             </a:fld>
             <a:endParaRPr lang="en-US"/>
           </a:p>
@@ -7853,7 +7855,7 @@
               <a:rPr lang="en-US" sz="3200" b="1" dirty="0">
                 <a:latin typeface="Symbol" panose="05050102010706020507" pitchFamily="18" charset="2"/>
               </a:rPr>
-              <a:t>S</a:t>
+              <a:t>s</a:t>
             </a:r>
             <a:r>
               <a:rPr lang="en-US" sz="3200" b="1" baseline="-25000" dirty="0">
@@ -7910,6 +7912,3180 @@
     <p:extLst>
       <p:ext uri="{BB962C8B-B14F-4D97-AF65-F5344CB8AC3E}">
         <p14:creationId xmlns:p14="http://schemas.microsoft.com/office/powerpoint/2010/main" val="2821755574"/>
+      </p:ext>
+    </p:extLst>
+  </p:cSld>
+  <p:clrMapOvr>
+    <a:masterClrMapping/>
+  </p:clrMapOvr>
+</p:sld>
+</file>
+
+<file path=ppt/slides/slide6.xml><?xml version="1.0" encoding="utf-8"?>
+<p:sld xmlns:a="http://schemas.openxmlformats.org/drawingml/2006/main" xmlns:r="http://schemas.openxmlformats.org/officeDocument/2006/relationships" xmlns:p="http://schemas.openxmlformats.org/presentationml/2006/main">
+  <p:cSld>
+    <p:spTree>
+      <p:nvGrpSpPr>
+        <p:cNvPr id="1" name=""/>
+        <p:cNvGrpSpPr/>
+        <p:nvPr/>
+      </p:nvGrpSpPr>
+      <p:grpSpPr>
+        <a:xfrm>
+          <a:off x="0" y="0"/>
+          <a:ext cx="0" cy="0"/>
+          <a:chOff x="0" y="0"/>
+          <a:chExt cx="0" cy="0"/>
+        </a:xfrm>
+      </p:grpSpPr>
+      <p:sp>
+        <p:nvSpPr>
+          <p:cNvPr id="2" name="Oval 1">
+            <a:extLst>
+              <a:ext uri="{FF2B5EF4-FFF2-40B4-BE49-F238E27FC236}">
+                <a16:creationId xmlns:a16="http://schemas.microsoft.com/office/drawing/2014/main" id="{82122B13-483D-491B-B2CA-198D7F53817E}"/>
+              </a:ext>
+            </a:extLst>
+          </p:cNvPr>
+          <p:cNvSpPr/>
+          <p:nvPr/>
+        </p:nvSpPr>
+        <p:spPr>
+          <a:xfrm>
+            <a:off x="218113" y="5335397"/>
+            <a:ext cx="946896" cy="874467"/>
+          </a:xfrm>
+          <a:prstGeom prst="ellipse">
+            <a:avLst/>
+          </a:prstGeom>
+          <a:noFill/>
+          <a:ln w="31750"/>
+        </p:spPr>
+        <p:style>
+          <a:lnRef idx="2">
+            <a:schemeClr val="accent1">
+              <a:shade val="50000"/>
+            </a:schemeClr>
+          </a:lnRef>
+          <a:fillRef idx="1">
+            <a:schemeClr val="accent1"/>
+          </a:fillRef>
+          <a:effectRef idx="0">
+            <a:schemeClr val="accent1"/>
+          </a:effectRef>
+          <a:fontRef idx="minor">
+            <a:schemeClr val="lt1"/>
+          </a:fontRef>
+        </p:style>
+        <p:txBody>
+          <a:bodyPr rtlCol="0" anchor="ctr"/>
+          <a:lstStyle/>
+          <a:p>
+            <a:pPr algn="ctr"/>
+            <a:r>
+              <a:rPr lang="en-US" sz="2800" b="1" dirty="0">
+                <a:solidFill>
+                  <a:schemeClr val="tx1"/>
+                </a:solidFill>
+              </a:rPr>
+              <a:t>X</a:t>
+            </a:r>
+          </a:p>
+        </p:txBody>
+      </p:sp>
+      <p:sp>
+        <p:nvSpPr>
+          <p:cNvPr id="3" name="Oval 2">
+            <a:extLst>
+              <a:ext uri="{FF2B5EF4-FFF2-40B4-BE49-F238E27FC236}">
+                <a16:creationId xmlns:a16="http://schemas.microsoft.com/office/drawing/2014/main" id="{B90772B7-F4DB-47C5-83D1-3EC996870B62}"/>
+              </a:ext>
+            </a:extLst>
+          </p:cNvPr>
+          <p:cNvSpPr/>
+          <p:nvPr/>
+        </p:nvSpPr>
+        <p:spPr>
+          <a:xfrm>
+            <a:off x="218111" y="3440577"/>
+            <a:ext cx="946897" cy="874468"/>
+          </a:xfrm>
+          <a:prstGeom prst="ellipse">
+            <a:avLst/>
+          </a:prstGeom>
+          <a:noFill/>
+          <a:ln w="31750"/>
+        </p:spPr>
+        <p:style>
+          <a:lnRef idx="2">
+            <a:schemeClr val="accent1">
+              <a:shade val="50000"/>
+            </a:schemeClr>
+          </a:lnRef>
+          <a:fillRef idx="1">
+            <a:schemeClr val="accent1"/>
+          </a:fillRef>
+          <a:effectRef idx="0">
+            <a:schemeClr val="accent1"/>
+          </a:effectRef>
+          <a:fontRef idx="minor">
+            <a:schemeClr val="lt1"/>
+          </a:fontRef>
+        </p:style>
+        <p:txBody>
+          <a:bodyPr rtlCol="0" anchor="ctr"/>
+          <a:lstStyle/>
+          <a:p>
+            <a:pPr algn="ctr"/>
+            <a:r>
+              <a:rPr lang="en-US" sz="2800" b="1" dirty="0">
+                <a:solidFill>
+                  <a:schemeClr val="tx1"/>
+                </a:solidFill>
+              </a:rPr>
+              <a:t>W</a:t>
+            </a:r>
+            <a:r>
+              <a:rPr lang="en-US" sz="2800" b="1" baseline="30000" dirty="0">
+                <a:solidFill>
+                  <a:schemeClr val="tx1"/>
+                </a:solidFill>
+              </a:rPr>
+              <a:t>1</a:t>
+            </a:r>
+          </a:p>
+        </p:txBody>
+      </p:sp>
+      <p:sp>
+        <p:nvSpPr>
+          <p:cNvPr id="4" name="Oval 3">
+            <a:extLst>
+              <a:ext uri="{FF2B5EF4-FFF2-40B4-BE49-F238E27FC236}">
+                <a16:creationId xmlns:a16="http://schemas.microsoft.com/office/drawing/2014/main" id="{69C34212-D8C4-4730-AD76-0B113DD125E6}"/>
+              </a:ext>
+            </a:extLst>
+          </p:cNvPr>
+          <p:cNvSpPr/>
+          <p:nvPr/>
+        </p:nvSpPr>
+        <p:spPr>
+          <a:xfrm>
+            <a:off x="1722016" y="4460930"/>
+            <a:ext cx="946896" cy="874467"/>
+          </a:xfrm>
+          <a:prstGeom prst="ellipse">
+            <a:avLst/>
+          </a:prstGeom>
+          <a:noFill/>
+          <a:ln w="31750"/>
+        </p:spPr>
+        <p:style>
+          <a:lnRef idx="2">
+            <a:schemeClr val="accent1">
+              <a:shade val="50000"/>
+            </a:schemeClr>
+          </a:lnRef>
+          <a:fillRef idx="1">
+            <a:schemeClr val="accent1"/>
+          </a:fillRef>
+          <a:effectRef idx="0">
+            <a:schemeClr val="accent1"/>
+          </a:effectRef>
+          <a:fontRef idx="minor">
+            <a:schemeClr val="lt1"/>
+          </a:fontRef>
+        </p:style>
+        <p:txBody>
+          <a:bodyPr rtlCol="0" anchor="ctr"/>
+          <a:lstStyle/>
+          <a:p>
+            <a:pPr algn="ctr"/>
+            <a:r>
+              <a:rPr lang="en-US" sz="2800" b="1" dirty="0">
+                <a:solidFill>
+                  <a:schemeClr val="tx1"/>
+                </a:solidFill>
+              </a:rPr>
+              <a:t>U</a:t>
+            </a:r>
+            <a:r>
+              <a:rPr lang="en-US" sz="2800" b="1" baseline="30000" dirty="0">
+                <a:solidFill>
+                  <a:schemeClr val="tx1"/>
+                </a:solidFill>
+              </a:rPr>
+              <a:t>1</a:t>
+            </a:r>
+          </a:p>
+        </p:txBody>
+      </p:sp>
+      <p:cxnSp>
+        <p:nvCxnSpPr>
+          <p:cNvPr id="5" name="Straight Arrow Connector 4">
+            <a:extLst>
+              <a:ext uri="{FF2B5EF4-FFF2-40B4-BE49-F238E27FC236}">
+                <a16:creationId xmlns:a16="http://schemas.microsoft.com/office/drawing/2014/main" id="{5AAE57A1-20C4-4050-8E7B-A3368BECA438}"/>
+              </a:ext>
+            </a:extLst>
+          </p:cNvPr>
+          <p:cNvCxnSpPr>
+            <a:cxnSpLocks/>
+            <a:stCxn id="3" idx="6"/>
+            <a:endCxn id="4" idx="1"/>
+          </p:cNvCxnSpPr>
+          <p:nvPr/>
+        </p:nvCxnSpPr>
+        <p:spPr>
+          <a:xfrm>
+            <a:off x="1165008" y="3877811"/>
+            <a:ext cx="695678" cy="711182"/>
+          </a:xfrm>
+          <a:prstGeom prst="straightConnector1">
+            <a:avLst/>
+          </a:prstGeom>
+          <a:ln w="31750">
+            <a:tailEnd type="triangle"/>
+          </a:ln>
+        </p:spPr>
+        <p:style>
+          <a:lnRef idx="1">
+            <a:schemeClr val="accent1"/>
+          </a:lnRef>
+          <a:fillRef idx="0">
+            <a:schemeClr val="accent1"/>
+          </a:fillRef>
+          <a:effectRef idx="0">
+            <a:schemeClr val="accent1"/>
+          </a:effectRef>
+          <a:fontRef idx="minor">
+            <a:schemeClr val="tx1"/>
+          </a:fontRef>
+        </p:style>
+      </p:cxnSp>
+      <p:cxnSp>
+        <p:nvCxnSpPr>
+          <p:cNvPr id="6" name="Straight Arrow Connector 5">
+            <a:extLst>
+              <a:ext uri="{FF2B5EF4-FFF2-40B4-BE49-F238E27FC236}">
+                <a16:creationId xmlns:a16="http://schemas.microsoft.com/office/drawing/2014/main" id="{0964FB36-97B0-4E28-8F23-B8BC7D0A8157}"/>
+              </a:ext>
+            </a:extLst>
+          </p:cNvPr>
+          <p:cNvCxnSpPr>
+            <a:cxnSpLocks/>
+            <a:stCxn id="2" idx="6"/>
+            <a:endCxn id="4" idx="3"/>
+          </p:cNvCxnSpPr>
+          <p:nvPr/>
+        </p:nvCxnSpPr>
+        <p:spPr>
+          <a:xfrm flipV="1">
+            <a:off x="1165009" y="5207334"/>
+            <a:ext cx="695677" cy="565297"/>
+          </a:xfrm>
+          <a:prstGeom prst="straightConnector1">
+            <a:avLst/>
+          </a:prstGeom>
+          <a:ln w="31750">
+            <a:tailEnd type="triangle"/>
+          </a:ln>
+        </p:spPr>
+        <p:style>
+          <a:lnRef idx="1">
+            <a:schemeClr val="accent1"/>
+          </a:lnRef>
+          <a:fillRef idx="0">
+            <a:schemeClr val="accent1"/>
+          </a:fillRef>
+          <a:effectRef idx="0">
+            <a:schemeClr val="accent1"/>
+          </a:effectRef>
+          <a:fontRef idx="minor">
+            <a:schemeClr val="tx1"/>
+          </a:fontRef>
+        </p:style>
+      </p:cxnSp>
+      <p:sp>
+        <p:nvSpPr>
+          <p:cNvPr id="14" name="TextBox 13">
+            <a:extLst>
+              <a:ext uri="{FF2B5EF4-FFF2-40B4-BE49-F238E27FC236}">
+                <a16:creationId xmlns:a16="http://schemas.microsoft.com/office/drawing/2014/main" id="{D5A6ABA5-D034-4524-B11C-E0684700730E}"/>
+              </a:ext>
+            </a:extLst>
+          </p:cNvPr>
+          <p:cNvSpPr txBox="1"/>
+          <p:nvPr/>
+        </p:nvSpPr>
+        <p:spPr>
+          <a:xfrm>
+            <a:off x="930889" y="4392111"/>
+            <a:ext cx="1025247" cy="830997"/>
+          </a:xfrm>
+          <a:prstGeom prst="rect">
+            <a:avLst/>
+          </a:prstGeom>
+          <a:noFill/>
+        </p:spPr>
+        <p:txBody>
+          <a:bodyPr wrap="square" rtlCol="0">
+            <a:spAutoFit/>
+          </a:bodyPr>
+          <a:lstStyle/>
+          <a:p>
+            <a:r>
+              <a:rPr lang="en-US" sz="2400" b="1" dirty="0"/>
+              <a:t>Mat</a:t>
+            </a:r>
+          </a:p>
+          <a:p>
+            <a:r>
+              <a:rPr lang="en-US" sz="2400" b="1" dirty="0" err="1"/>
+              <a:t>Mult</a:t>
+            </a:r>
+            <a:endParaRPr lang="en-US" sz="2400" b="1" dirty="0"/>
+          </a:p>
+        </p:txBody>
+      </p:sp>
+      <p:sp>
+        <p:nvSpPr>
+          <p:cNvPr id="22" name="TextBox 21">
+            <a:extLst>
+              <a:ext uri="{FF2B5EF4-FFF2-40B4-BE49-F238E27FC236}">
+                <a16:creationId xmlns:a16="http://schemas.microsoft.com/office/drawing/2014/main" id="{2ED464D2-CD1F-4381-8174-BE52E371C297}"/>
+              </a:ext>
+            </a:extLst>
+          </p:cNvPr>
+          <p:cNvSpPr txBox="1"/>
+          <p:nvPr/>
+        </p:nvSpPr>
+        <p:spPr>
+          <a:xfrm>
+            <a:off x="2973061" y="4095967"/>
+            <a:ext cx="746586" cy="584775"/>
+          </a:xfrm>
+          <a:prstGeom prst="rect">
+            <a:avLst/>
+          </a:prstGeom>
+          <a:noFill/>
+        </p:spPr>
+        <p:txBody>
+          <a:bodyPr wrap="square" rtlCol="0">
+            <a:spAutoFit/>
+          </a:bodyPr>
+          <a:lstStyle/>
+          <a:p>
+            <a:r>
+              <a:rPr lang="en-US" sz="3200" b="1" dirty="0" err="1">
+                <a:latin typeface="Symbol" panose="05050102010706020507" pitchFamily="18" charset="2"/>
+              </a:rPr>
+              <a:t>s</a:t>
+            </a:r>
+            <a:r>
+              <a:rPr lang="en-US" sz="3200" b="1" baseline="-25000" dirty="0" err="1"/>
+              <a:t>h</a:t>
+            </a:r>
+            <a:endParaRPr lang="en-US" sz="3200" b="1" baseline="-25000" dirty="0"/>
+          </a:p>
+        </p:txBody>
+      </p:sp>
+      <p:sp>
+        <p:nvSpPr>
+          <p:cNvPr id="23" name="Oval 22">
+            <a:extLst>
+              <a:ext uri="{FF2B5EF4-FFF2-40B4-BE49-F238E27FC236}">
+                <a16:creationId xmlns:a16="http://schemas.microsoft.com/office/drawing/2014/main" id="{CA836706-7466-47DB-8E71-9DABED5D1094}"/>
+              </a:ext>
+            </a:extLst>
+          </p:cNvPr>
+          <p:cNvSpPr/>
+          <p:nvPr/>
+        </p:nvSpPr>
+        <p:spPr>
+          <a:xfrm>
+            <a:off x="3834848" y="2378195"/>
+            <a:ext cx="946897" cy="874468"/>
+          </a:xfrm>
+          <a:prstGeom prst="ellipse">
+            <a:avLst/>
+          </a:prstGeom>
+          <a:noFill/>
+          <a:ln w="31750"/>
+        </p:spPr>
+        <p:style>
+          <a:lnRef idx="2">
+            <a:schemeClr val="accent1">
+              <a:shade val="50000"/>
+            </a:schemeClr>
+          </a:lnRef>
+          <a:fillRef idx="1">
+            <a:schemeClr val="accent1"/>
+          </a:fillRef>
+          <a:effectRef idx="0">
+            <a:schemeClr val="accent1"/>
+          </a:effectRef>
+          <a:fontRef idx="minor">
+            <a:schemeClr val="lt1"/>
+          </a:fontRef>
+        </p:style>
+        <p:txBody>
+          <a:bodyPr rtlCol="0" anchor="ctr"/>
+          <a:lstStyle/>
+          <a:p>
+            <a:pPr algn="ctr"/>
+            <a:r>
+              <a:rPr lang="en-US" sz="2800" b="1" dirty="0">
+                <a:solidFill>
+                  <a:schemeClr val="tx1"/>
+                </a:solidFill>
+              </a:rPr>
+              <a:t>W</a:t>
+            </a:r>
+            <a:r>
+              <a:rPr lang="en-US" sz="2800" b="1" baseline="30000" dirty="0">
+                <a:solidFill>
+                  <a:schemeClr val="tx1"/>
+                </a:solidFill>
+              </a:rPr>
+              <a:t>2</a:t>
+            </a:r>
+          </a:p>
+        </p:txBody>
+      </p:sp>
+      <p:sp>
+        <p:nvSpPr>
+          <p:cNvPr id="24" name="Oval 23">
+            <a:extLst>
+              <a:ext uri="{FF2B5EF4-FFF2-40B4-BE49-F238E27FC236}">
+                <a16:creationId xmlns:a16="http://schemas.microsoft.com/office/drawing/2014/main" id="{F1767E37-04E1-4950-98F8-ADD02106515B}"/>
+              </a:ext>
+            </a:extLst>
+          </p:cNvPr>
+          <p:cNvSpPr/>
+          <p:nvPr/>
+        </p:nvSpPr>
+        <p:spPr>
+          <a:xfrm>
+            <a:off x="5338753" y="3398548"/>
+            <a:ext cx="946896" cy="874467"/>
+          </a:xfrm>
+          <a:prstGeom prst="ellipse">
+            <a:avLst/>
+          </a:prstGeom>
+          <a:noFill/>
+          <a:ln w="31750"/>
+        </p:spPr>
+        <p:style>
+          <a:lnRef idx="2">
+            <a:schemeClr val="accent1">
+              <a:shade val="50000"/>
+            </a:schemeClr>
+          </a:lnRef>
+          <a:fillRef idx="1">
+            <a:schemeClr val="accent1"/>
+          </a:fillRef>
+          <a:effectRef idx="0">
+            <a:schemeClr val="accent1"/>
+          </a:effectRef>
+          <a:fontRef idx="minor">
+            <a:schemeClr val="lt1"/>
+          </a:fontRef>
+        </p:style>
+        <p:txBody>
+          <a:bodyPr rtlCol="0" anchor="ctr"/>
+          <a:lstStyle/>
+          <a:p>
+            <a:pPr algn="ctr"/>
+            <a:r>
+              <a:rPr lang="en-US" sz="2800" b="1" dirty="0">
+                <a:solidFill>
+                  <a:schemeClr val="tx1"/>
+                </a:solidFill>
+              </a:rPr>
+              <a:t>U</a:t>
+            </a:r>
+            <a:r>
+              <a:rPr lang="en-US" sz="2800" b="1" baseline="30000" dirty="0">
+                <a:solidFill>
+                  <a:schemeClr val="tx1"/>
+                </a:solidFill>
+              </a:rPr>
+              <a:t>4</a:t>
+            </a:r>
+          </a:p>
+        </p:txBody>
+      </p:sp>
+      <p:cxnSp>
+        <p:nvCxnSpPr>
+          <p:cNvPr id="25" name="Straight Arrow Connector 24">
+            <a:extLst>
+              <a:ext uri="{FF2B5EF4-FFF2-40B4-BE49-F238E27FC236}">
+                <a16:creationId xmlns:a16="http://schemas.microsoft.com/office/drawing/2014/main" id="{1011A4C1-8867-42BC-91B9-7ACDFDE11F18}"/>
+              </a:ext>
+            </a:extLst>
+          </p:cNvPr>
+          <p:cNvCxnSpPr>
+            <a:cxnSpLocks/>
+            <a:stCxn id="23" idx="6"/>
+            <a:endCxn id="24" idx="1"/>
+          </p:cNvCxnSpPr>
+          <p:nvPr/>
+        </p:nvCxnSpPr>
+        <p:spPr>
+          <a:xfrm>
+            <a:off x="4781745" y="2815429"/>
+            <a:ext cx="695678" cy="711182"/>
+          </a:xfrm>
+          <a:prstGeom prst="straightConnector1">
+            <a:avLst/>
+          </a:prstGeom>
+          <a:ln w="31750">
+            <a:tailEnd type="triangle"/>
+          </a:ln>
+        </p:spPr>
+        <p:style>
+          <a:lnRef idx="1">
+            <a:schemeClr val="accent1"/>
+          </a:lnRef>
+          <a:fillRef idx="0">
+            <a:schemeClr val="accent1"/>
+          </a:fillRef>
+          <a:effectRef idx="0">
+            <a:schemeClr val="accent1"/>
+          </a:effectRef>
+          <a:fontRef idx="minor">
+            <a:schemeClr val="tx1"/>
+          </a:fontRef>
+        </p:style>
+      </p:cxnSp>
+      <p:cxnSp>
+        <p:nvCxnSpPr>
+          <p:cNvPr id="26" name="Straight Arrow Connector 25">
+            <a:extLst>
+              <a:ext uri="{FF2B5EF4-FFF2-40B4-BE49-F238E27FC236}">
+                <a16:creationId xmlns:a16="http://schemas.microsoft.com/office/drawing/2014/main" id="{20F1441D-471B-4772-952F-C5E0E938640D}"/>
+              </a:ext>
+            </a:extLst>
+          </p:cNvPr>
+          <p:cNvCxnSpPr>
+            <a:cxnSpLocks/>
+            <a:stCxn id="33" idx="6"/>
+            <a:endCxn id="24" idx="3"/>
+          </p:cNvCxnSpPr>
+          <p:nvPr/>
+        </p:nvCxnSpPr>
+        <p:spPr>
+          <a:xfrm flipV="1">
+            <a:off x="4598535" y="4144952"/>
+            <a:ext cx="878888" cy="465151"/>
+          </a:xfrm>
+          <a:prstGeom prst="straightConnector1">
+            <a:avLst/>
+          </a:prstGeom>
+          <a:ln w="31750">
+            <a:tailEnd type="triangle"/>
+          </a:ln>
+        </p:spPr>
+        <p:style>
+          <a:lnRef idx="1">
+            <a:schemeClr val="accent1"/>
+          </a:lnRef>
+          <a:fillRef idx="0">
+            <a:schemeClr val="accent1"/>
+          </a:fillRef>
+          <a:effectRef idx="0">
+            <a:schemeClr val="accent1"/>
+          </a:effectRef>
+          <a:fontRef idx="minor">
+            <a:schemeClr val="tx1"/>
+          </a:fontRef>
+        </p:style>
+      </p:cxnSp>
+      <p:sp>
+        <p:nvSpPr>
+          <p:cNvPr id="27" name="TextBox 26">
+            <a:extLst>
+              <a:ext uri="{FF2B5EF4-FFF2-40B4-BE49-F238E27FC236}">
+                <a16:creationId xmlns:a16="http://schemas.microsoft.com/office/drawing/2014/main" id="{43A90FAE-4E81-4F10-9C47-A0E2A5BB773F}"/>
+              </a:ext>
+            </a:extLst>
+          </p:cNvPr>
+          <p:cNvSpPr txBox="1"/>
+          <p:nvPr/>
+        </p:nvSpPr>
+        <p:spPr>
+          <a:xfrm>
+            <a:off x="4660342" y="3607328"/>
+            <a:ext cx="1025247" cy="461665"/>
+          </a:xfrm>
+          <a:prstGeom prst="rect">
+            <a:avLst/>
+          </a:prstGeom>
+          <a:noFill/>
+        </p:spPr>
+        <p:txBody>
+          <a:bodyPr wrap="square" rtlCol="0">
+            <a:spAutoFit/>
+          </a:bodyPr>
+          <a:lstStyle/>
+          <a:p>
+            <a:r>
+              <a:rPr lang="en-US" sz="2400" b="1" dirty="0"/>
+              <a:t>dot</a:t>
+            </a:r>
+          </a:p>
+        </p:txBody>
+      </p:sp>
+      <p:sp>
+        <p:nvSpPr>
+          <p:cNvPr id="29" name="Oval 28">
+            <a:extLst>
+              <a:ext uri="{FF2B5EF4-FFF2-40B4-BE49-F238E27FC236}">
+                <a16:creationId xmlns:a16="http://schemas.microsoft.com/office/drawing/2014/main" id="{5B9C692A-0A59-4442-9AF1-209BB7944985}"/>
+              </a:ext>
+            </a:extLst>
+          </p:cNvPr>
+          <p:cNvSpPr/>
+          <p:nvPr/>
+        </p:nvSpPr>
+        <p:spPr>
+          <a:xfrm>
+            <a:off x="7256664" y="2991766"/>
+            <a:ext cx="946896" cy="874467"/>
+          </a:xfrm>
+          <a:prstGeom prst="ellipse">
+            <a:avLst/>
+          </a:prstGeom>
+          <a:noFill/>
+          <a:ln w="31750"/>
+        </p:spPr>
+        <p:style>
+          <a:lnRef idx="2">
+            <a:schemeClr val="accent1">
+              <a:shade val="50000"/>
+            </a:schemeClr>
+          </a:lnRef>
+          <a:fillRef idx="1">
+            <a:schemeClr val="accent1"/>
+          </a:fillRef>
+          <a:effectRef idx="0">
+            <a:schemeClr val="accent1"/>
+          </a:effectRef>
+          <a:fontRef idx="minor">
+            <a:schemeClr val="lt1"/>
+          </a:fontRef>
+        </p:style>
+        <p:txBody>
+          <a:bodyPr rtlCol="0" anchor="ctr"/>
+          <a:lstStyle/>
+          <a:p>
+            <a:pPr algn="ctr"/>
+            <a:r>
+              <a:rPr lang="en-US" sz="2800" b="1" dirty="0">
+                <a:solidFill>
+                  <a:schemeClr val="tx1"/>
+                </a:solidFill>
+              </a:rPr>
+              <a:t>Y</a:t>
+            </a:r>
+          </a:p>
+        </p:txBody>
+      </p:sp>
+      <p:sp>
+        <p:nvSpPr>
+          <p:cNvPr id="33" name="Oval 32">
+            <a:extLst>
+              <a:ext uri="{FF2B5EF4-FFF2-40B4-BE49-F238E27FC236}">
+                <a16:creationId xmlns:a16="http://schemas.microsoft.com/office/drawing/2014/main" id="{060AB016-1596-4A32-8766-DED513FFB7CD}"/>
+              </a:ext>
+            </a:extLst>
+          </p:cNvPr>
+          <p:cNvSpPr/>
+          <p:nvPr/>
+        </p:nvSpPr>
+        <p:spPr>
+          <a:xfrm>
+            <a:off x="3651639" y="4172869"/>
+            <a:ext cx="946896" cy="874467"/>
+          </a:xfrm>
+          <a:prstGeom prst="ellipse">
+            <a:avLst/>
+          </a:prstGeom>
+          <a:noFill/>
+          <a:ln w="31750"/>
+        </p:spPr>
+        <p:style>
+          <a:lnRef idx="2">
+            <a:schemeClr val="accent1">
+              <a:shade val="50000"/>
+            </a:schemeClr>
+          </a:lnRef>
+          <a:fillRef idx="1">
+            <a:schemeClr val="accent1"/>
+          </a:fillRef>
+          <a:effectRef idx="0">
+            <a:schemeClr val="accent1"/>
+          </a:effectRef>
+          <a:fontRef idx="minor">
+            <a:schemeClr val="lt1"/>
+          </a:fontRef>
+        </p:style>
+        <p:txBody>
+          <a:bodyPr rtlCol="0" anchor="ctr"/>
+          <a:lstStyle/>
+          <a:p>
+            <a:pPr algn="ctr"/>
+            <a:r>
+              <a:rPr lang="en-US" sz="2800" b="1" dirty="0">
+                <a:solidFill>
+                  <a:schemeClr val="tx1"/>
+                </a:solidFill>
+              </a:rPr>
+              <a:t>U</a:t>
+            </a:r>
+            <a:r>
+              <a:rPr lang="en-US" sz="2800" b="1" baseline="30000" dirty="0">
+                <a:solidFill>
+                  <a:schemeClr val="tx1"/>
+                </a:solidFill>
+              </a:rPr>
+              <a:t>3</a:t>
+            </a:r>
+          </a:p>
+        </p:txBody>
+      </p:sp>
+      <p:cxnSp>
+        <p:nvCxnSpPr>
+          <p:cNvPr id="34" name="Straight Arrow Connector 33">
+            <a:extLst>
+              <a:ext uri="{FF2B5EF4-FFF2-40B4-BE49-F238E27FC236}">
+                <a16:creationId xmlns:a16="http://schemas.microsoft.com/office/drawing/2014/main" id="{6A666B90-F1AF-468F-B163-CA40E2C365BD}"/>
+              </a:ext>
+            </a:extLst>
+          </p:cNvPr>
+          <p:cNvCxnSpPr>
+            <a:cxnSpLocks/>
+            <a:endCxn id="33" idx="2"/>
+          </p:cNvCxnSpPr>
+          <p:nvPr/>
+        </p:nvCxnSpPr>
+        <p:spPr>
+          <a:xfrm flipV="1">
+            <a:off x="2668912" y="4610103"/>
+            <a:ext cx="982727" cy="195864"/>
+          </a:xfrm>
+          <a:prstGeom prst="straightConnector1">
+            <a:avLst/>
+          </a:prstGeom>
+          <a:ln w="31750">
+            <a:tailEnd type="triangle"/>
+          </a:ln>
+        </p:spPr>
+        <p:style>
+          <a:lnRef idx="1">
+            <a:schemeClr val="accent1"/>
+          </a:lnRef>
+          <a:fillRef idx="0">
+            <a:schemeClr val="accent1"/>
+          </a:fillRef>
+          <a:effectRef idx="0">
+            <a:schemeClr val="accent1"/>
+          </a:effectRef>
+          <a:fontRef idx="minor">
+            <a:schemeClr val="tx1"/>
+          </a:fontRef>
+        </p:style>
+      </p:cxnSp>
+      <p:sp>
+        <p:nvSpPr>
+          <p:cNvPr id="36" name="TextBox 35">
+            <a:extLst>
+              <a:ext uri="{FF2B5EF4-FFF2-40B4-BE49-F238E27FC236}">
+                <a16:creationId xmlns:a16="http://schemas.microsoft.com/office/drawing/2014/main" id="{DCB949CF-5C09-4C7E-803F-8F7B97D67457}"/>
+              </a:ext>
+            </a:extLst>
+          </p:cNvPr>
+          <p:cNvSpPr txBox="1"/>
+          <p:nvPr/>
+        </p:nvSpPr>
+        <p:spPr>
+          <a:xfrm>
+            <a:off x="6589798" y="2992155"/>
+            <a:ext cx="746586" cy="584775"/>
+          </a:xfrm>
+          <a:prstGeom prst="rect">
+            <a:avLst/>
+          </a:prstGeom>
+          <a:noFill/>
+        </p:spPr>
+        <p:txBody>
+          <a:bodyPr wrap="square" rtlCol="0">
+            <a:spAutoFit/>
+          </a:bodyPr>
+          <a:lstStyle/>
+          <a:p>
+            <a:r>
+              <a:rPr lang="en-US" sz="3200" b="1" dirty="0">
+                <a:latin typeface="Symbol" panose="05050102010706020507" pitchFamily="18" charset="2"/>
+              </a:rPr>
+              <a:t>s</a:t>
+            </a:r>
+            <a:r>
+              <a:rPr lang="en-US" sz="3200" b="1" baseline="-25000" dirty="0">
+                <a:latin typeface="Symbol" panose="05050102010706020507" pitchFamily="18" charset="2"/>
+              </a:rPr>
+              <a:t>o</a:t>
+            </a:r>
+            <a:endParaRPr lang="en-US" sz="3200" b="1" baseline="-25000" dirty="0"/>
+          </a:p>
+        </p:txBody>
+      </p:sp>
+      <p:cxnSp>
+        <p:nvCxnSpPr>
+          <p:cNvPr id="37" name="Straight Arrow Connector 36">
+            <a:extLst>
+              <a:ext uri="{FF2B5EF4-FFF2-40B4-BE49-F238E27FC236}">
+                <a16:creationId xmlns:a16="http://schemas.microsoft.com/office/drawing/2014/main" id="{49ADE0A5-6BD8-495E-9C15-53DF3928C182}"/>
+              </a:ext>
+            </a:extLst>
+          </p:cNvPr>
+          <p:cNvCxnSpPr>
+            <a:cxnSpLocks/>
+          </p:cNvCxnSpPr>
+          <p:nvPr/>
+        </p:nvCxnSpPr>
+        <p:spPr>
+          <a:xfrm flipV="1">
+            <a:off x="6285649" y="3506291"/>
+            <a:ext cx="982727" cy="195864"/>
+          </a:xfrm>
+          <a:prstGeom prst="straightConnector1">
+            <a:avLst/>
+          </a:prstGeom>
+          <a:ln w="31750">
+            <a:tailEnd type="triangle"/>
+          </a:ln>
+        </p:spPr>
+        <p:style>
+          <a:lnRef idx="1">
+            <a:schemeClr val="accent1"/>
+          </a:lnRef>
+          <a:fillRef idx="0">
+            <a:schemeClr val="accent1"/>
+          </a:fillRef>
+          <a:effectRef idx="0">
+            <a:schemeClr val="accent1"/>
+          </a:effectRef>
+          <a:fontRef idx="minor">
+            <a:schemeClr val="tx1"/>
+          </a:fontRef>
+        </p:style>
+      </p:cxnSp>
+    </p:spTree>
+    <p:extLst>
+      <p:ext uri="{BB962C8B-B14F-4D97-AF65-F5344CB8AC3E}">
+        <p14:creationId xmlns:p14="http://schemas.microsoft.com/office/powerpoint/2010/main" val="2115998290"/>
+      </p:ext>
+    </p:extLst>
+  </p:cSld>
+  <p:clrMapOvr>
+    <a:masterClrMapping/>
+  </p:clrMapOvr>
+</p:sld>
+</file>
+
+<file path=ppt/slides/slide7.xml><?xml version="1.0" encoding="utf-8"?>
+<p:sld xmlns:a="http://schemas.openxmlformats.org/drawingml/2006/main" xmlns:r="http://schemas.openxmlformats.org/officeDocument/2006/relationships" xmlns:p="http://schemas.openxmlformats.org/presentationml/2006/main">
+  <p:cSld>
+    <p:spTree>
+      <p:nvGrpSpPr>
+        <p:cNvPr id="1" name=""/>
+        <p:cNvGrpSpPr/>
+        <p:nvPr/>
+      </p:nvGrpSpPr>
+      <p:grpSpPr>
+        <a:xfrm>
+          <a:off x="0" y="0"/>
+          <a:ext cx="0" cy="0"/>
+          <a:chOff x="0" y="0"/>
+          <a:chExt cx="0" cy="0"/>
+        </a:xfrm>
+      </p:grpSpPr>
+      <p:sp>
+        <p:nvSpPr>
+          <p:cNvPr id="2" name="Oval 1">
+            <a:extLst>
+              <a:ext uri="{FF2B5EF4-FFF2-40B4-BE49-F238E27FC236}">
+                <a16:creationId xmlns:a16="http://schemas.microsoft.com/office/drawing/2014/main" id="{82122B13-483D-491B-B2CA-198D7F53817E}"/>
+              </a:ext>
+            </a:extLst>
+          </p:cNvPr>
+          <p:cNvSpPr/>
+          <p:nvPr/>
+        </p:nvSpPr>
+        <p:spPr>
+          <a:xfrm>
+            <a:off x="1052817" y="5771540"/>
+            <a:ext cx="946896" cy="874467"/>
+          </a:xfrm>
+          <a:prstGeom prst="ellipse">
+            <a:avLst/>
+          </a:prstGeom>
+          <a:noFill/>
+          <a:ln w="31750"/>
+        </p:spPr>
+        <p:style>
+          <a:lnRef idx="2">
+            <a:schemeClr val="accent1">
+              <a:shade val="50000"/>
+            </a:schemeClr>
+          </a:lnRef>
+          <a:fillRef idx="1">
+            <a:schemeClr val="accent1"/>
+          </a:fillRef>
+          <a:effectRef idx="0">
+            <a:schemeClr val="accent1"/>
+          </a:effectRef>
+          <a:fontRef idx="minor">
+            <a:schemeClr val="lt1"/>
+          </a:fontRef>
+        </p:style>
+        <p:txBody>
+          <a:bodyPr rtlCol="0" anchor="ctr"/>
+          <a:lstStyle/>
+          <a:p>
+            <a:pPr algn="ctr"/>
+            <a:r>
+              <a:rPr lang="en-US" sz="2800" b="1" dirty="0">
+                <a:solidFill>
+                  <a:schemeClr val="tx1"/>
+                </a:solidFill>
+              </a:rPr>
+              <a:t>X</a:t>
+            </a:r>
+          </a:p>
+        </p:txBody>
+      </p:sp>
+      <p:sp>
+        <p:nvSpPr>
+          <p:cNvPr id="3" name="Oval 2">
+            <a:extLst>
+              <a:ext uri="{FF2B5EF4-FFF2-40B4-BE49-F238E27FC236}">
+                <a16:creationId xmlns:a16="http://schemas.microsoft.com/office/drawing/2014/main" id="{B90772B7-F4DB-47C5-83D1-3EC996870B62}"/>
+              </a:ext>
+            </a:extLst>
+          </p:cNvPr>
+          <p:cNvSpPr/>
+          <p:nvPr/>
+        </p:nvSpPr>
+        <p:spPr>
+          <a:xfrm>
+            <a:off x="1126467" y="3377828"/>
+            <a:ext cx="946897" cy="874468"/>
+          </a:xfrm>
+          <a:prstGeom prst="ellipse">
+            <a:avLst/>
+          </a:prstGeom>
+          <a:noFill/>
+          <a:ln w="31750"/>
+        </p:spPr>
+        <p:style>
+          <a:lnRef idx="2">
+            <a:schemeClr val="accent1">
+              <a:shade val="50000"/>
+            </a:schemeClr>
+          </a:lnRef>
+          <a:fillRef idx="1">
+            <a:schemeClr val="accent1"/>
+          </a:fillRef>
+          <a:effectRef idx="0">
+            <a:schemeClr val="accent1"/>
+          </a:effectRef>
+          <a:fontRef idx="minor">
+            <a:schemeClr val="lt1"/>
+          </a:fontRef>
+        </p:style>
+        <p:txBody>
+          <a:bodyPr rtlCol="0" anchor="ctr"/>
+          <a:lstStyle/>
+          <a:p>
+            <a:pPr algn="ctr"/>
+            <a:r>
+              <a:rPr lang="en-US" sz="2800" b="1" dirty="0">
+                <a:solidFill>
+                  <a:schemeClr val="tx1"/>
+                </a:solidFill>
+              </a:rPr>
+              <a:t>W</a:t>
+            </a:r>
+            <a:r>
+              <a:rPr lang="en-US" sz="2800" b="1" baseline="30000" dirty="0">
+                <a:solidFill>
+                  <a:schemeClr val="tx1"/>
+                </a:solidFill>
+              </a:rPr>
+              <a:t>1</a:t>
+            </a:r>
+          </a:p>
+        </p:txBody>
+      </p:sp>
+      <p:sp>
+        <p:nvSpPr>
+          <p:cNvPr id="4" name="Oval 3">
+            <a:extLst>
+              <a:ext uri="{FF2B5EF4-FFF2-40B4-BE49-F238E27FC236}">
+                <a16:creationId xmlns:a16="http://schemas.microsoft.com/office/drawing/2014/main" id="{69C34212-D8C4-4730-AD76-0B113DD125E6}"/>
+              </a:ext>
+            </a:extLst>
+          </p:cNvPr>
+          <p:cNvSpPr/>
+          <p:nvPr/>
+        </p:nvSpPr>
+        <p:spPr>
+          <a:xfrm>
+            <a:off x="2556720" y="4897073"/>
+            <a:ext cx="946896" cy="874467"/>
+          </a:xfrm>
+          <a:prstGeom prst="ellipse">
+            <a:avLst/>
+          </a:prstGeom>
+          <a:noFill/>
+          <a:ln w="31750"/>
+        </p:spPr>
+        <p:style>
+          <a:lnRef idx="2">
+            <a:schemeClr val="accent1">
+              <a:shade val="50000"/>
+            </a:schemeClr>
+          </a:lnRef>
+          <a:fillRef idx="1">
+            <a:schemeClr val="accent1"/>
+          </a:fillRef>
+          <a:effectRef idx="0">
+            <a:schemeClr val="accent1"/>
+          </a:effectRef>
+          <a:fontRef idx="minor">
+            <a:schemeClr val="lt1"/>
+          </a:fontRef>
+        </p:style>
+        <p:txBody>
+          <a:bodyPr rtlCol="0" anchor="ctr"/>
+          <a:lstStyle/>
+          <a:p>
+            <a:pPr algn="ctr"/>
+            <a:r>
+              <a:rPr lang="en-US" sz="2800" b="1" dirty="0">
+                <a:solidFill>
+                  <a:schemeClr val="tx1"/>
+                </a:solidFill>
+              </a:rPr>
+              <a:t>U</a:t>
+            </a:r>
+            <a:r>
+              <a:rPr lang="en-US" sz="2800" b="1" baseline="30000" dirty="0">
+                <a:solidFill>
+                  <a:schemeClr val="tx1"/>
+                </a:solidFill>
+              </a:rPr>
+              <a:t>1</a:t>
+            </a:r>
+          </a:p>
+        </p:txBody>
+      </p:sp>
+      <p:cxnSp>
+        <p:nvCxnSpPr>
+          <p:cNvPr id="5" name="Straight Arrow Connector 4">
+            <a:extLst>
+              <a:ext uri="{FF2B5EF4-FFF2-40B4-BE49-F238E27FC236}">
+                <a16:creationId xmlns:a16="http://schemas.microsoft.com/office/drawing/2014/main" id="{5AAE57A1-20C4-4050-8E7B-A3368BECA438}"/>
+              </a:ext>
+            </a:extLst>
+          </p:cNvPr>
+          <p:cNvCxnSpPr>
+            <a:cxnSpLocks/>
+            <a:stCxn id="3" idx="5"/>
+            <a:endCxn id="4" idx="1"/>
+          </p:cNvCxnSpPr>
+          <p:nvPr/>
+        </p:nvCxnSpPr>
+        <p:spPr>
+          <a:xfrm>
+            <a:off x="1934694" y="4124233"/>
+            <a:ext cx="760696" cy="900903"/>
+          </a:xfrm>
+          <a:prstGeom prst="straightConnector1">
+            <a:avLst/>
+          </a:prstGeom>
+          <a:ln w="31750">
+            <a:tailEnd type="triangle"/>
+          </a:ln>
+        </p:spPr>
+        <p:style>
+          <a:lnRef idx="1">
+            <a:schemeClr val="accent1"/>
+          </a:lnRef>
+          <a:fillRef idx="0">
+            <a:schemeClr val="accent1"/>
+          </a:fillRef>
+          <a:effectRef idx="0">
+            <a:schemeClr val="accent1"/>
+          </a:effectRef>
+          <a:fontRef idx="minor">
+            <a:schemeClr val="tx1"/>
+          </a:fontRef>
+        </p:style>
+      </p:cxnSp>
+      <p:cxnSp>
+        <p:nvCxnSpPr>
+          <p:cNvPr id="6" name="Straight Arrow Connector 5">
+            <a:extLst>
+              <a:ext uri="{FF2B5EF4-FFF2-40B4-BE49-F238E27FC236}">
+                <a16:creationId xmlns:a16="http://schemas.microsoft.com/office/drawing/2014/main" id="{0964FB36-97B0-4E28-8F23-B8BC7D0A8157}"/>
+              </a:ext>
+            </a:extLst>
+          </p:cNvPr>
+          <p:cNvCxnSpPr>
+            <a:cxnSpLocks/>
+            <a:stCxn id="2" idx="6"/>
+            <a:endCxn id="4" idx="3"/>
+          </p:cNvCxnSpPr>
+          <p:nvPr/>
+        </p:nvCxnSpPr>
+        <p:spPr>
+          <a:xfrm flipV="1">
+            <a:off x="1999713" y="5643477"/>
+            <a:ext cx="695677" cy="565297"/>
+          </a:xfrm>
+          <a:prstGeom prst="straightConnector1">
+            <a:avLst/>
+          </a:prstGeom>
+          <a:ln w="31750">
+            <a:tailEnd type="triangle"/>
+          </a:ln>
+        </p:spPr>
+        <p:style>
+          <a:lnRef idx="1">
+            <a:schemeClr val="accent1"/>
+          </a:lnRef>
+          <a:fillRef idx="0">
+            <a:schemeClr val="accent1"/>
+          </a:fillRef>
+          <a:effectRef idx="0">
+            <a:schemeClr val="accent1"/>
+          </a:effectRef>
+          <a:fontRef idx="minor">
+            <a:schemeClr val="tx1"/>
+          </a:fontRef>
+        </p:style>
+      </p:cxnSp>
+      <p:sp>
+        <p:nvSpPr>
+          <p:cNvPr id="14" name="TextBox 13">
+            <a:extLst>
+              <a:ext uri="{FF2B5EF4-FFF2-40B4-BE49-F238E27FC236}">
+                <a16:creationId xmlns:a16="http://schemas.microsoft.com/office/drawing/2014/main" id="{D5A6ABA5-D034-4524-B11C-E0684700730E}"/>
+              </a:ext>
+            </a:extLst>
+          </p:cNvPr>
+          <p:cNvSpPr txBox="1"/>
+          <p:nvPr/>
+        </p:nvSpPr>
+        <p:spPr>
+          <a:xfrm>
+            <a:off x="1765593" y="4828254"/>
+            <a:ext cx="1025247" cy="830997"/>
+          </a:xfrm>
+          <a:prstGeom prst="rect">
+            <a:avLst/>
+          </a:prstGeom>
+          <a:noFill/>
+        </p:spPr>
+        <p:txBody>
+          <a:bodyPr wrap="square" rtlCol="0">
+            <a:spAutoFit/>
+          </a:bodyPr>
+          <a:lstStyle/>
+          <a:p>
+            <a:r>
+              <a:rPr lang="en-US" sz="2400" b="1" dirty="0"/>
+              <a:t>Mat</a:t>
+            </a:r>
+          </a:p>
+          <a:p>
+            <a:r>
+              <a:rPr lang="en-US" sz="2400" b="1" dirty="0" err="1"/>
+              <a:t>Mult</a:t>
+            </a:r>
+            <a:endParaRPr lang="en-US" sz="2400" b="1" dirty="0"/>
+          </a:p>
+        </p:txBody>
+      </p:sp>
+      <p:sp>
+        <p:nvSpPr>
+          <p:cNvPr id="22" name="TextBox 21">
+            <a:extLst>
+              <a:ext uri="{FF2B5EF4-FFF2-40B4-BE49-F238E27FC236}">
+                <a16:creationId xmlns:a16="http://schemas.microsoft.com/office/drawing/2014/main" id="{2ED464D2-CD1F-4381-8174-BE52E371C297}"/>
+              </a:ext>
+            </a:extLst>
+          </p:cNvPr>
+          <p:cNvSpPr txBox="1"/>
+          <p:nvPr/>
+        </p:nvSpPr>
+        <p:spPr>
+          <a:xfrm>
+            <a:off x="3699195" y="4668717"/>
+            <a:ext cx="746586" cy="584775"/>
+          </a:xfrm>
+          <a:prstGeom prst="rect">
+            <a:avLst/>
+          </a:prstGeom>
+          <a:noFill/>
+        </p:spPr>
+        <p:txBody>
+          <a:bodyPr wrap="square" rtlCol="0">
+            <a:spAutoFit/>
+          </a:bodyPr>
+          <a:lstStyle/>
+          <a:p>
+            <a:r>
+              <a:rPr lang="en-US" sz="3200" b="1" dirty="0" err="1">
+                <a:latin typeface="Symbol" panose="05050102010706020507" pitchFamily="18" charset="2"/>
+              </a:rPr>
+              <a:t>s</a:t>
+            </a:r>
+            <a:r>
+              <a:rPr lang="en-US" sz="3200" b="1" baseline="-25000" dirty="0" err="1"/>
+              <a:t>h</a:t>
+            </a:r>
+            <a:endParaRPr lang="en-US" sz="3200" b="1" baseline="-25000" dirty="0"/>
+          </a:p>
+        </p:txBody>
+      </p:sp>
+      <p:sp>
+        <p:nvSpPr>
+          <p:cNvPr id="23" name="Oval 22">
+            <a:extLst>
+              <a:ext uri="{FF2B5EF4-FFF2-40B4-BE49-F238E27FC236}">
+                <a16:creationId xmlns:a16="http://schemas.microsoft.com/office/drawing/2014/main" id="{CA836706-7466-47DB-8E71-9DABED5D1094}"/>
+              </a:ext>
+            </a:extLst>
+          </p:cNvPr>
+          <p:cNvSpPr/>
+          <p:nvPr/>
+        </p:nvSpPr>
+        <p:spPr>
+          <a:xfrm>
+            <a:off x="2899836" y="3485079"/>
+            <a:ext cx="946897" cy="874468"/>
+          </a:xfrm>
+          <a:prstGeom prst="ellipse">
+            <a:avLst/>
+          </a:prstGeom>
+          <a:noFill/>
+          <a:ln w="31750"/>
+        </p:spPr>
+        <p:style>
+          <a:lnRef idx="2">
+            <a:schemeClr val="accent1">
+              <a:shade val="50000"/>
+            </a:schemeClr>
+          </a:lnRef>
+          <a:fillRef idx="1">
+            <a:schemeClr val="accent1"/>
+          </a:fillRef>
+          <a:effectRef idx="0">
+            <a:schemeClr val="accent1"/>
+          </a:effectRef>
+          <a:fontRef idx="minor">
+            <a:schemeClr val="lt1"/>
+          </a:fontRef>
+        </p:style>
+        <p:txBody>
+          <a:bodyPr rtlCol="0" anchor="ctr"/>
+          <a:lstStyle/>
+          <a:p>
+            <a:pPr algn="ctr"/>
+            <a:r>
+              <a:rPr lang="en-US" sz="2800" b="1" dirty="0">
+                <a:solidFill>
+                  <a:schemeClr val="tx1"/>
+                </a:solidFill>
+              </a:rPr>
+              <a:t>W</a:t>
+            </a:r>
+            <a:r>
+              <a:rPr lang="en-US" sz="2800" b="1" baseline="30000" dirty="0">
+                <a:solidFill>
+                  <a:schemeClr val="tx1"/>
+                </a:solidFill>
+              </a:rPr>
+              <a:t>2</a:t>
+            </a:r>
+          </a:p>
+        </p:txBody>
+      </p:sp>
+      <p:sp>
+        <p:nvSpPr>
+          <p:cNvPr id="24" name="Oval 23">
+            <a:extLst>
+              <a:ext uri="{FF2B5EF4-FFF2-40B4-BE49-F238E27FC236}">
+                <a16:creationId xmlns:a16="http://schemas.microsoft.com/office/drawing/2014/main" id="{F1767E37-04E1-4950-98F8-ADD02106515B}"/>
+              </a:ext>
+            </a:extLst>
+          </p:cNvPr>
+          <p:cNvSpPr/>
+          <p:nvPr/>
+        </p:nvSpPr>
+        <p:spPr>
+          <a:xfrm>
+            <a:off x="6125023" y="4459839"/>
+            <a:ext cx="946896" cy="874467"/>
+          </a:xfrm>
+          <a:prstGeom prst="ellipse">
+            <a:avLst/>
+          </a:prstGeom>
+          <a:noFill/>
+          <a:ln w="31750"/>
+        </p:spPr>
+        <p:style>
+          <a:lnRef idx="2">
+            <a:schemeClr val="accent1">
+              <a:shade val="50000"/>
+            </a:schemeClr>
+          </a:lnRef>
+          <a:fillRef idx="1">
+            <a:schemeClr val="accent1"/>
+          </a:fillRef>
+          <a:effectRef idx="0">
+            <a:schemeClr val="accent1"/>
+          </a:effectRef>
+          <a:fontRef idx="minor">
+            <a:schemeClr val="lt1"/>
+          </a:fontRef>
+        </p:style>
+        <p:txBody>
+          <a:bodyPr rtlCol="0" anchor="ctr"/>
+          <a:lstStyle/>
+          <a:p>
+            <a:pPr algn="ctr"/>
+            <a:r>
+              <a:rPr lang="en-US" sz="2800" b="1" dirty="0">
+                <a:solidFill>
+                  <a:schemeClr val="tx1"/>
+                </a:solidFill>
+              </a:rPr>
+              <a:t>U</a:t>
+            </a:r>
+            <a:r>
+              <a:rPr lang="en-US" sz="2800" b="1" baseline="30000" dirty="0">
+                <a:solidFill>
+                  <a:schemeClr val="tx1"/>
+                </a:solidFill>
+              </a:rPr>
+              <a:t>4</a:t>
+            </a:r>
+          </a:p>
+        </p:txBody>
+      </p:sp>
+      <p:cxnSp>
+        <p:nvCxnSpPr>
+          <p:cNvPr id="25" name="Straight Arrow Connector 24">
+            <a:extLst>
+              <a:ext uri="{FF2B5EF4-FFF2-40B4-BE49-F238E27FC236}">
+                <a16:creationId xmlns:a16="http://schemas.microsoft.com/office/drawing/2014/main" id="{1011A4C1-8867-42BC-91B9-7ACDFDE11F18}"/>
+              </a:ext>
+            </a:extLst>
+          </p:cNvPr>
+          <p:cNvCxnSpPr>
+            <a:cxnSpLocks/>
+            <a:stCxn id="23" idx="5"/>
+            <a:endCxn id="24" idx="1"/>
+          </p:cNvCxnSpPr>
+          <p:nvPr/>
+        </p:nvCxnSpPr>
+        <p:spPr>
+          <a:xfrm>
+            <a:off x="3708063" y="4231484"/>
+            <a:ext cx="2555630" cy="356418"/>
+          </a:xfrm>
+          <a:prstGeom prst="straightConnector1">
+            <a:avLst/>
+          </a:prstGeom>
+          <a:ln w="31750">
+            <a:tailEnd type="triangle"/>
+          </a:ln>
+        </p:spPr>
+        <p:style>
+          <a:lnRef idx="1">
+            <a:schemeClr val="accent1"/>
+          </a:lnRef>
+          <a:fillRef idx="0">
+            <a:schemeClr val="accent1"/>
+          </a:fillRef>
+          <a:effectRef idx="0">
+            <a:schemeClr val="accent1"/>
+          </a:effectRef>
+          <a:fontRef idx="minor">
+            <a:schemeClr val="tx1"/>
+          </a:fontRef>
+        </p:style>
+      </p:cxnSp>
+      <p:cxnSp>
+        <p:nvCxnSpPr>
+          <p:cNvPr id="26" name="Straight Arrow Connector 25">
+            <a:extLst>
+              <a:ext uri="{FF2B5EF4-FFF2-40B4-BE49-F238E27FC236}">
+                <a16:creationId xmlns:a16="http://schemas.microsoft.com/office/drawing/2014/main" id="{20F1441D-471B-4772-952F-C5E0E938640D}"/>
+              </a:ext>
+            </a:extLst>
+          </p:cNvPr>
+          <p:cNvCxnSpPr>
+            <a:cxnSpLocks/>
+            <a:stCxn id="33" idx="6"/>
+            <a:endCxn id="24" idx="3"/>
+          </p:cNvCxnSpPr>
+          <p:nvPr/>
+        </p:nvCxnSpPr>
+        <p:spPr>
+          <a:xfrm flipV="1">
+            <a:off x="5478691" y="5206243"/>
+            <a:ext cx="785002" cy="256127"/>
+          </a:xfrm>
+          <a:prstGeom prst="straightConnector1">
+            <a:avLst/>
+          </a:prstGeom>
+          <a:ln w="31750">
+            <a:tailEnd type="triangle"/>
+          </a:ln>
+        </p:spPr>
+        <p:style>
+          <a:lnRef idx="1">
+            <a:schemeClr val="accent1"/>
+          </a:lnRef>
+          <a:fillRef idx="0">
+            <a:schemeClr val="accent1"/>
+          </a:fillRef>
+          <a:effectRef idx="0">
+            <a:schemeClr val="accent1"/>
+          </a:effectRef>
+          <a:fontRef idx="minor">
+            <a:schemeClr val="tx1"/>
+          </a:fontRef>
+        </p:style>
+      </p:cxnSp>
+      <p:sp>
+        <p:nvSpPr>
+          <p:cNvPr id="27" name="TextBox 26">
+            <a:extLst>
+              <a:ext uri="{FF2B5EF4-FFF2-40B4-BE49-F238E27FC236}">
+                <a16:creationId xmlns:a16="http://schemas.microsoft.com/office/drawing/2014/main" id="{43A90FAE-4E81-4F10-9C47-A0E2A5BB773F}"/>
+              </a:ext>
+            </a:extLst>
+          </p:cNvPr>
+          <p:cNvSpPr txBox="1"/>
+          <p:nvPr/>
+        </p:nvSpPr>
+        <p:spPr>
+          <a:xfrm>
+            <a:off x="5495046" y="4043471"/>
+            <a:ext cx="1025247" cy="461665"/>
+          </a:xfrm>
+          <a:prstGeom prst="rect">
+            <a:avLst/>
+          </a:prstGeom>
+          <a:noFill/>
+        </p:spPr>
+        <p:txBody>
+          <a:bodyPr wrap="square" rtlCol="0">
+            <a:spAutoFit/>
+          </a:bodyPr>
+          <a:lstStyle/>
+          <a:p>
+            <a:r>
+              <a:rPr lang="en-US" sz="2400" b="1" dirty="0"/>
+              <a:t>dot</a:t>
+            </a:r>
+          </a:p>
+        </p:txBody>
+      </p:sp>
+      <p:sp>
+        <p:nvSpPr>
+          <p:cNvPr id="29" name="Oval 28">
+            <a:extLst>
+              <a:ext uri="{FF2B5EF4-FFF2-40B4-BE49-F238E27FC236}">
+                <a16:creationId xmlns:a16="http://schemas.microsoft.com/office/drawing/2014/main" id="{5B9C692A-0A59-4442-9AF1-209BB7944985}"/>
+              </a:ext>
+            </a:extLst>
+          </p:cNvPr>
+          <p:cNvSpPr/>
+          <p:nvPr/>
+        </p:nvSpPr>
+        <p:spPr>
+          <a:xfrm>
+            <a:off x="7904998" y="3408506"/>
+            <a:ext cx="946896" cy="874467"/>
+          </a:xfrm>
+          <a:prstGeom prst="ellipse">
+            <a:avLst/>
+          </a:prstGeom>
+          <a:noFill/>
+          <a:ln w="31750"/>
+        </p:spPr>
+        <p:style>
+          <a:lnRef idx="2">
+            <a:schemeClr val="accent1">
+              <a:shade val="50000"/>
+            </a:schemeClr>
+          </a:lnRef>
+          <a:fillRef idx="1">
+            <a:schemeClr val="accent1"/>
+          </a:fillRef>
+          <a:effectRef idx="0">
+            <a:schemeClr val="accent1"/>
+          </a:effectRef>
+          <a:fontRef idx="minor">
+            <a:schemeClr val="lt1"/>
+          </a:fontRef>
+        </p:style>
+        <p:txBody>
+          <a:bodyPr rtlCol="0" anchor="ctr"/>
+          <a:lstStyle/>
+          <a:p>
+            <a:pPr algn="ctr"/>
+            <a:r>
+              <a:rPr lang="en-US" sz="2800" b="1" dirty="0" err="1">
+                <a:solidFill>
+                  <a:schemeClr val="tx1"/>
+                </a:solidFill>
+              </a:rPr>
+              <a:t>Y</a:t>
+            </a:r>
+            <a:r>
+              <a:rPr lang="en-US" sz="2800" b="1" baseline="-25000" dirty="0" err="1">
+                <a:solidFill>
+                  <a:schemeClr val="tx1"/>
+                </a:solidFill>
+              </a:rPr>
+              <a:t>est</a:t>
+            </a:r>
+            <a:endParaRPr lang="en-US" sz="2800" b="1" baseline="-25000" dirty="0">
+              <a:solidFill>
+                <a:schemeClr val="tx1"/>
+              </a:solidFill>
+            </a:endParaRPr>
+          </a:p>
+        </p:txBody>
+      </p:sp>
+      <p:sp>
+        <p:nvSpPr>
+          <p:cNvPr id="33" name="Oval 32">
+            <a:extLst>
+              <a:ext uri="{FF2B5EF4-FFF2-40B4-BE49-F238E27FC236}">
+                <a16:creationId xmlns:a16="http://schemas.microsoft.com/office/drawing/2014/main" id="{060AB016-1596-4A32-8766-DED513FFB7CD}"/>
+              </a:ext>
+            </a:extLst>
+          </p:cNvPr>
+          <p:cNvSpPr/>
+          <p:nvPr/>
+        </p:nvSpPr>
+        <p:spPr>
+          <a:xfrm>
+            <a:off x="4531795" y="5025136"/>
+            <a:ext cx="946896" cy="874467"/>
+          </a:xfrm>
+          <a:prstGeom prst="ellipse">
+            <a:avLst/>
+          </a:prstGeom>
+          <a:noFill/>
+          <a:ln w="31750"/>
+        </p:spPr>
+        <p:style>
+          <a:lnRef idx="2">
+            <a:schemeClr val="accent1">
+              <a:shade val="50000"/>
+            </a:schemeClr>
+          </a:lnRef>
+          <a:fillRef idx="1">
+            <a:schemeClr val="accent1"/>
+          </a:fillRef>
+          <a:effectRef idx="0">
+            <a:schemeClr val="accent1"/>
+          </a:effectRef>
+          <a:fontRef idx="minor">
+            <a:schemeClr val="lt1"/>
+          </a:fontRef>
+        </p:style>
+        <p:txBody>
+          <a:bodyPr rtlCol="0" anchor="ctr"/>
+          <a:lstStyle/>
+          <a:p>
+            <a:pPr algn="ctr"/>
+            <a:r>
+              <a:rPr lang="en-US" sz="2800" b="1" dirty="0">
+                <a:solidFill>
+                  <a:schemeClr val="tx1"/>
+                </a:solidFill>
+              </a:rPr>
+              <a:t>U</a:t>
+            </a:r>
+            <a:r>
+              <a:rPr lang="en-US" sz="2800" b="1" baseline="30000" dirty="0">
+                <a:solidFill>
+                  <a:schemeClr val="tx1"/>
+                </a:solidFill>
+              </a:rPr>
+              <a:t>3</a:t>
+            </a:r>
+          </a:p>
+        </p:txBody>
+      </p:sp>
+      <p:cxnSp>
+        <p:nvCxnSpPr>
+          <p:cNvPr id="34" name="Straight Arrow Connector 33">
+            <a:extLst>
+              <a:ext uri="{FF2B5EF4-FFF2-40B4-BE49-F238E27FC236}">
+                <a16:creationId xmlns:a16="http://schemas.microsoft.com/office/drawing/2014/main" id="{6A666B90-F1AF-468F-B163-CA40E2C365BD}"/>
+              </a:ext>
+            </a:extLst>
+          </p:cNvPr>
+          <p:cNvCxnSpPr>
+            <a:cxnSpLocks/>
+            <a:stCxn id="4" idx="6"/>
+            <a:endCxn id="33" idx="2"/>
+          </p:cNvCxnSpPr>
+          <p:nvPr/>
+        </p:nvCxnSpPr>
+        <p:spPr>
+          <a:xfrm>
+            <a:off x="3503616" y="5334307"/>
+            <a:ext cx="1028179" cy="128063"/>
+          </a:xfrm>
+          <a:prstGeom prst="straightConnector1">
+            <a:avLst/>
+          </a:prstGeom>
+          <a:ln w="31750">
+            <a:tailEnd type="triangle"/>
+          </a:ln>
+        </p:spPr>
+        <p:style>
+          <a:lnRef idx="1">
+            <a:schemeClr val="accent1"/>
+          </a:lnRef>
+          <a:fillRef idx="0">
+            <a:schemeClr val="accent1"/>
+          </a:fillRef>
+          <a:effectRef idx="0">
+            <a:schemeClr val="accent1"/>
+          </a:effectRef>
+          <a:fontRef idx="minor">
+            <a:schemeClr val="tx1"/>
+          </a:fontRef>
+        </p:style>
+      </p:cxnSp>
+      <p:sp>
+        <p:nvSpPr>
+          <p:cNvPr id="36" name="TextBox 35">
+            <a:extLst>
+              <a:ext uri="{FF2B5EF4-FFF2-40B4-BE49-F238E27FC236}">
+                <a16:creationId xmlns:a16="http://schemas.microsoft.com/office/drawing/2014/main" id="{DCB949CF-5C09-4C7E-803F-8F7B97D67457}"/>
+              </a:ext>
+            </a:extLst>
+          </p:cNvPr>
+          <p:cNvSpPr txBox="1"/>
+          <p:nvPr/>
+        </p:nvSpPr>
+        <p:spPr>
+          <a:xfrm>
+            <a:off x="7063572" y="3931145"/>
+            <a:ext cx="746586" cy="584775"/>
+          </a:xfrm>
+          <a:prstGeom prst="rect">
+            <a:avLst/>
+          </a:prstGeom>
+          <a:noFill/>
+        </p:spPr>
+        <p:txBody>
+          <a:bodyPr wrap="square" rtlCol="0">
+            <a:spAutoFit/>
+          </a:bodyPr>
+          <a:lstStyle/>
+          <a:p>
+            <a:r>
+              <a:rPr lang="en-US" sz="3200" b="1" dirty="0">
+                <a:latin typeface="Symbol" panose="05050102010706020507" pitchFamily="18" charset="2"/>
+              </a:rPr>
+              <a:t>s</a:t>
+            </a:r>
+            <a:r>
+              <a:rPr lang="en-US" sz="3200" b="1" baseline="-25000" dirty="0">
+                <a:latin typeface="Symbol" panose="05050102010706020507" pitchFamily="18" charset="2"/>
+              </a:rPr>
+              <a:t>o</a:t>
+            </a:r>
+            <a:endParaRPr lang="en-US" sz="3200" b="1" baseline="-25000" dirty="0"/>
+          </a:p>
+        </p:txBody>
+      </p:sp>
+      <p:cxnSp>
+        <p:nvCxnSpPr>
+          <p:cNvPr id="37" name="Straight Arrow Connector 36">
+            <a:extLst>
+              <a:ext uri="{FF2B5EF4-FFF2-40B4-BE49-F238E27FC236}">
+                <a16:creationId xmlns:a16="http://schemas.microsoft.com/office/drawing/2014/main" id="{49ADE0A5-6BD8-495E-9C15-53DF3928C182}"/>
+              </a:ext>
+            </a:extLst>
+          </p:cNvPr>
+          <p:cNvCxnSpPr>
+            <a:cxnSpLocks/>
+            <a:endCxn id="29" idx="3"/>
+          </p:cNvCxnSpPr>
+          <p:nvPr/>
+        </p:nvCxnSpPr>
+        <p:spPr>
+          <a:xfrm flipV="1">
+            <a:off x="7071919" y="4154910"/>
+            <a:ext cx="971749" cy="643593"/>
+          </a:xfrm>
+          <a:prstGeom prst="straightConnector1">
+            <a:avLst/>
+          </a:prstGeom>
+          <a:ln w="31750">
+            <a:tailEnd type="triangle"/>
+          </a:ln>
+        </p:spPr>
+        <p:style>
+          <a:lnRef idx="1">
+            <a:schemeClr val="accent1"/>
+          </a:lnRef>
+          <a:fillRef idx="0">
+            <a:schemeClr val="accent1"/>
+          </a:fillRef>
+          <a:effectRef idx="0">
+            <a:schemeClr val="accent1"/>
+          </a:effectRef>
+          <a:fontRef idx="minor">
+            <a:schemeClr val="tx1"/>
+          </a:fontRef>
+        </p:style>
+      </p:cxnSp>
+      <p:sp>
+        <p:nvSpPr>
+          <p:cNvPr id="19" name="Oval 18">
+            <a:extLst>
+              <a:ext uri="{FF2B5EF4-FFF2-40B4-BE49-F238E27FC236}">
+                <a16:creationId xmlns:a16="http://schemas.microsoft.com/office/drawing/2014/main" id="{CCD3D789-348E-4365-8EF2-0F8260546AE7}"/>
+              </a:ext>
+            </a:extLst>
+          </p:cNvPr>
+          <p:cNvSpPr/>
+          <p:nvPr/>
+        </p:nvSpPr>
+        <p:spPr>
+          <a:xfrm>
+            <a:off x="2108112" y="1802568"/>
+            <a:ext cx="946896" cy="874467"/>
+          </a:xfrm>
+          <a:prstGeom prst="ellipse">
+            <a:avLst/>
+          </a:prstGeom>
+          <a:noFill/>
+          <a:ln w="31750"/>
+        </p:spPr>
+        <p:style>
+          <a:lnRef idx="2">
+            <a:schemeClr val="accent1">
+              <a:shade val="50000"/>
+            </a:schemeClr>
+          </a:lnRef>
+          <a:fillRef idx="1">
+            <a:schemeClr val="accent1"/>
+          </a:fillRef>
+          <a:effectRef idx="0">
+            <a:schemeClr val="accent1"/>
+          </a:effectRef>
+          <a:fontRef idx="minor">
+            <a:schemeClr val="lt1"/>
+          </a:fontRef>
+        </p:style>
+        <p:txBody>
+          <a:bodyPr rtlCol="0" anchor="ctr"/>
+          <a:lstStyle/>
+          <a:p>
+            <a:pPr algn="ctr"/>
+            <a:r>
+              <a:rPr lang="en-US" sz="2800" b="1" dirty="0">
+                <a:solidFill>
+                  <a:schemeClr val="tx1"/>
+                </a:solidFill>
+              </a:rPr>
+              <a:t>U</a:t>
+            </a:r>
+            <a:r>
+              <a:rPr lang="en-US" sz="2800" b="1" baseline="30000" dirty="0">
+                <a:solidFill>
+                  <a:schemeClr val="tx1"/>
+                </a:solidFill>
+              </a:rPr>
+              <a:t>5</a:t>
+            </a:r>
+          </a:p>
+        </p:txBody>
+      </p:sp>
+      <p:sp>
+        <p:nvSpPr>
+          <p:cNvPr id="20" name="Oval 19">
+            <a:extLst>
+              <a:ext uri="{FF2B5EF4-FFF2-40B4-BE49-F238E27FC236}">
+                <a16:creationId xmlns:a16="http://schemas.microsoft.com/office/drawing/2014/main" id="{14482D25-680A-4D67-821B-D056C54F38F5}"/>
+              </a:ext>
+            </a:extLst>
+          </p:cNvPr>
+          <p:cNvSpPr/>
+          <p:nvPr/>
+        </p:nvSpPr>
+        <p:spPr>
+          <a:xfrm>
+            <a:off x="4320181" y="2664674"/>
+            <a:ext cx="946896" cy="874467"/>
+          </a:xfrm>
+          <a:prstGeom prst="ellipse">
+            <a:avLst/>
+          </a:prstGeom>
+          <a:noFill/>
+          <a:ln w="31750"/>
+        </p:spPr>
+        <p:style>
+          <a:lnRef idx="2">
+            <a:schemeClr val="accent1">
+              <a:shade val="50000"/>
+            </a:schemeClr>
+          </a:lnRef>
+          <a:fillRef idx="1">
+            <a:schemeClr val="accent1"/>
+          </a:fillRef>
+          <a:effectRef idx="0">
+            <a:schemeClr val="accent1"/>
+          </a:effectRef>
+          <a:fontRef idx="minor">
+            <a:schemeClr val="lt1"/>
+          </a:fontRef>
+        </p:style>
+        <p:txBody>
+          <a:bodyPr rtlCol="0" anchor="ctr"/>
+          <a:lstStyle/>
+          <a:p>
+            <a:pPr algn="ctr"/>
+            <a:r>
+              <a:rPr lang="en-US" sz="2800" b="1" dirty="0">
+                <a:solidFill>
+                  <a:schemeClr val="tx1"/>
+                </a:solidFill>
+              </a:rPr>
+              <a:t>U</a:t>
+            </a:r>
+            <a:r>
+              <a:rPr lang="en-US" sz="2800" b="1" baseline="30000" dirty="0">
+                <a:solidFill>
+                  <a:schemeClr val="tx1"/>
+                </a:solidFill>
+              </a:rPr>
+              <a:t>6</a:t>
+            </a:r>
+          </a:p>
+        </p:txBody>
+      </p:sp>
+      <p:sp>
+        <p:nvSpPr>
+          <p:cNvPr id="21" name="Oval 20">
+            <a:extLst>
+              <a:ext uri="{FF2B5EF4-FFF2-40B4-BE49-F238E27FC236}">
+                <a16:creationId xmlns:a16="http://schemas.microsoft.com/office/drawing/2014/main" id="{633E272F-8343-4C4F-B740-F0CD45E83116}"/>
+              </a:ext>
+            </a:extLst>
+          </p:cNvPr>
+          <p:cNvSpPr/>
+          <p:nvPr/>
+        </p:nvSpPr>
+        <p:spPr>
+          <a:xfrm>
+            <a:off x="9635280" y="5534245"/>
+            <a:ext cx="946896" cy="874467"/>
+          </a:xfrm>
+          <a:prstGeom prst="ellipse">
+            <a:avLst/>
+          </a:prstGeom>
+          <a:noFill/>
+          <a:ln w="31750"/>
+        </p:spPr>
+        <p:style>
+          <a:lnRef idx="2">
+            <a:schemeClr val="accent1">
+              <a:shade val="50000"/>
+            </a:schemeClr>
+          </a:lnRef>
+          <a:fillRef idx="1">
+            <a:schemeClr val="accent1"/>
+          </a:fillRef>
+          <a:effectRef idx="0">
+            <a:schemeClr val="accent1"/>
+          </a:effectRef>
+          <a:fontRef idx="minor">
+            <a:schemeClr val="lt1"/>
+          </a:fontRef>
+        </p:style>
+        <p:txBody>
+          <a:bodyPr rtlCol="0" anchor="ctr"/>
+          <a:lstStyle/>
+          <a:p>
+            <a:pPr algn="ctr"/>
+            <a:r>
+              <a:rPr lang="en-US" sz="2800" b="1" dirty="0">
+                <a:solidFill>
+                  <a:schemeClr val="tx1"/>
+                </a:solidFill>
+              </a:rPr>
+              <a:t>Y</a:t>
+            </a:r>
+            <a:endParaRPr lang="en-US" sz="2800" b="1" baseline="-25000" dirty="0">
+              <a:solidFill>
+                <a:schemeClr val="tx1"/>
+              </a:solidFill>
+            </a:endParaRPr>
+          </a:p>
+        </p:txBody>
+      </p:sp>
+      <p:sp>
+        <p:nvSpPr>
+          <p:cNvPr id="30" name="Oval 29">
+            <a:extLst>
+              <a:ext uri="{FF2B5EF4-FFF2-40B4-BE49-F238E27FC236}">
+                <a16:creationId xmlns:a16="http://schemas.microsoft.com/office/drawing/2014/main" id="{B93994A0-938E-47D6-A0B6-343DAB35BEAF}"/>
+              </a:ext>
+            </a:extLst>
+          </p:cNvPr>
+          <p:cNvSpPr/>
+          <p:nvPr/>
+        </p:nvSpPr>
+        <p:spPr>
+          <a:xfrm>
+            <a:off x="10406364" y="2777175"/>
+            <a:ext cx="1030456" cy="948795"/>
+          </a:xfrm>
+          <a:prstGeom prst="ellipse">
+            <a:avLst/>
+          </a:prstGeom>
+          <a:noFill/>
+          <a:ln w="31750"/>
+        </p:spPr>
+        <p:style>
+          <a:lnRef idx="2">
+            <a:schemeClr val="accent1">
+              <a:shade val="50000"/>
+            </a:schemeClr>
+          </a:lnRef>
+          <a:fillRef idx="1">
+            <a:schemeClr val="accent1"/>
+          </a:fillRef>
+          <a:effectRef idx="0">
+            <a:schemeClr val="accent1"/>
+          </a:effectRef>
+          <a:fontRef idx="minor">
+            <a:schemeClr val="lt1"/>
+          </a:fontRef>
+        </p:style>
+        <p:txBody>
+          <a:bodyPr rtlCol="0" anchor="ctr"/>
+          <a:lstStyle/>
+          <a:p>
+            <a:pPr algn="ctr"/>
+            <a:r>
+              <a:rPr lang="en-US" sz="2800" b="1" dirty="0">
+                <a:solidFill>
+                  <a:schemeClr val="tx1"/>
+                </a:solidFill>
+              </a:rPr>
+              <a:t>J</a:t>
+            </a:r>
+            <a:r>
+              <a:rPr lang="en-US" sz="2800" b="1" baseline="-25000" dirty="0">
+                <a:solidFill>
+                  <a:schemeClr val="tx1"/>
+                </a:solidFill>
+              </a:rPr>
+              <a:t>MLE</a:t>
+            </a:r>
+          </a:p>
+        </p:txBody>
+      </p:sp>
+      <p:cxnSp>
+        <p:nvCxnSpPr>
+          <p:cNvPr id="31" name="Straight Arrow Connector 30">
+            <a:extLst>
+              <a:ext uri="{FF2B5EF4-FFF2-40B4-BE49-F238E27FC236}">
+                <a16:creationId xmlns:a16="http://schemas.microsoft.com/office/drawing/2014/main" id="{AED5DE10-0B98-4C8C-ADBA-65D614630AA9}"/>
+              </a:ext>
+            </a:extLst>
+          </p:cNvPr>
+          <p:cNvCxnSpPr>
+            <a:cxnSpLocks/>
+            <a:stCxn id="29" idx="6"/>
+            <a:endCxn id="30" idx="2"/>
+          </p:cNvCxnSpPr>
+          <p:nvPr/>
+        </p:nvCxnSpPr>
+        <p:spPr>
+          <a:xfrm flipV="1">
+            <a:off x="8851894" y="3251573"/>
+            <a:ext cx="1554470" cy="594167"/>
+          </a:xfrm>
+          <a:prstGeom prst="straightConnector1">
+            <a:avLst/>
+          </a:prstGeom>
+          <a:ln w="31750">
+            <a:tailEnd type="triangle"/>
+          </a:ln>
+        </p:spPr>
+        <p:style>
+          <a:lnRef idx="1">
+            <a:schemeClr val="accent1"/>
+          </a:lnRef>
+          <a:fillRef idx="0">
+            <a:schemeClr val="accent1"/>
+          </a:fillRef>
+          <a:effectRef idx="0">
+            <a:schemeClr val="accent1"/>
+          </a:effectRef>
+          <a:fontRef idx="minor">
+            <a:schemeClr val="tx1"/>
+          </a:fontRef>
+        </p:style>
+      </p:cxnSp>
+      <p:cxnSp>
+        <p:nvCxnSpPr>
+          <p:cNvPr id="32" name="Straight Arrow Connector 31">
+            <a:extLst>
+              <a:ext uri="{FF2B5EF4-FFF2-40B4-BE49-F238E27FC236}">
+                <a16:creationId xmlns:a16="http://schemas.microsoft.com/office/drawing/2014/main" id="{530E33BD-3154-47C3-87D8-2EBC371680A5}"/>
+              </a:ext>
+            </a:extLst>
+          </p:cNvPr>
+          <p:cNvCxnSpPr>
+            <a:cxnSpLocks/>
+            <a:stCxn id="21" idx="0"/>
+            <a:endCxn id="30" idx="4"/>
+          </p:cNvCxnSpPr>
+          <p:nvPr/>
+        </p:nvCxnSpPr>
+        <p:spPr>
+          <a:xfrm flipV="1">
+            <a:off x="10108728" y="3725970"/>
+            <a:ext cx="812864" cy="1808275"/>
+          </a:xfrm>
+          <a:prstGeom prst="straightConnector1">
+            <a:avLst/>
+          </a:prstGeom>
+          <a:ln w="31750">
+            <a:tailEnd type="triangle"/>
+          </a:ln>
+        </p:spPr>
+        <p:style>
+          <a:lnRef idx="1">
+            <a:schemeClr val="accent1"/>
+          </a:lnRef>
+          <a:fillRef idx="0">
+            <a:schemeClr val="accent1"/>
+          </a:fillRef>
+          <a:effectRef idx="0">
+            <a:schemeClr val="accent1"/>
+          </a:effectRef>
+          <a:fontRef idx="minor">
+            <a:schemeClr val="tx1"/>
+          </a:fontRef>
+        </p:style>
+      </p:cxnSp>
+      <p:sp>
+        <p:nvSpPr>
+          <p:cNvPr id="35" name="TextBox 34">
+            <a:extLst>
+              <a:ext uri="{FF2B5EF4-FFF2-40B4-BE49-F238E27FC236}">
+                <a16:creationId xmlns:a16="http://schemas.microsoft.com/office/drawing/2014/main" id="{AFAFA1E1-BF1B-43DC-B295-EB8ADBF46FF6}"/>
+              </a:ext>
+            </a:extLst>
+          </p:cNvPr>
+          <p:cNvSpPr txBox="1"/>
+          <p:nvPr/>
+        </p:nvSpPr>
+        <p:spPr>
+          <a:xfrm>
+            <a:off x="8952023" y="3733315"/>
+            <a:ext cx="1553697" cy="1077218"/>
+          </a:xfrm>
+          <a:prstGeom prst="rect">
+            <a:avLst/>
+          </a:prstGeom>
+          <a:noFill/>
+        </p:spPr>
+        <p:txBody>
+          <a:bodyPr wrap="square" rtlCol="0">
+            <a:spAutoFit/>
+          </a:bodyPr>
+          <a:lstStyle/>
+          <a:p>
+            <a:r>
+              <a:rPr lang="en-US" sz="3200" b="1" dirty="0"/>
+              <a:t>Cross-</a:t>
+            </a:r>
+          </a:p>
+          <a:p>
+            <a:r>
+              <a:rPr lang="en-US" sz="3200" b="1" dirty="0"/>
+              <a:t>entropy</a:t>
+            </a:r>
+          </a:p>
+        </p:txBody>
+      </p:sp>
+      <p:sp>
+        <p:nvSpPr>
+          <p:cNvPr id="38" name="Oval 37">
+            <a:extLst>
+              <a:ext uri="{FF2B5EF4-FFF2-40B4-BE49-F238E27FC236}">
+                <a16:creationId xmlns:a16="http://schemas.microsoft.com/office/drawing/2014/main" id="{019EC760-8585-4EBE-94E5-5E2DEF2DC06C}"/>
+              </a:ext>
+            </a:extLst>
+          </p:cNvPr>
+          <p:cNvSpPr/>
+          <p:nvPr/>
+        </p:nvSpPr>
+        <p:spPr>
+          <a:xfrm>
+            <a:off x="6402083" y="854701"/>
+            <a:ext cx="946896" cy="874467"/>
+          </a:xfrm>
+          <a:prstGeom prst="ellipse">
+            <a:avLst/>
+          </a:prstGeom>
+          <a:noFill/>
+          <a:ln w="31750"/>
+        </p:spPr>
+        <p:style>
+          <a:lnRef idx="2">
+            <a:schemeClr val="accent1">
+              <a:shade val="50000"/>
+            </a:schemeClr>
+          </a:lnRef>
+          <a:fillRef idx="1">
+            <a:schemeClr val="accent1"/>
+          </a:fillRef>
+          <a:effectRef idx="0">
+            <a:schemeClr val="accent1"/>
+          </a:effectRef>
+          <a:fontRef idx="minor">
+            <a:schemeClr val="lt1"/>
+          </a:fontRef>
+        </p:style>
+        <p:txBody>
+          <a:bodyPr rtlCol="0" anchor="ctr"/>
+          <a:lstStyle/>
+          <a:p>
+            <a:pPr algn="ctr"/>
+            <a:r>
+              <a:rPr lang="en-US" sz="2800" b="1" dirty="0">
+                <a:solidFill>
+                  <a:schemeClr val="tx1"/>
+                </a:solidFill>
+              </a:rPr>
+              <a:t>U</a:t>
+            </a:r>
+            <a:r>
+              <a:rPr lang="en-US" sz="2800" b="1" baseline="30000" dirty="0">
+                <a:solidFill>
+                  <a:schemeClr val="tx1"/>
+                </a:solidFill>
+              </a:rPr>
+              <a:t>9</a:t>
+            </a:r>
+          </a:p>
+        </p:txBody>
+      </p:sp>
+      <p:sp>
+        <p:nvSpPr>
+          <p:cNvPr id="39" name="Oval 38">
+            <a:extLst>
+              <a:ext uri="{FF2B5EF4-FFF2-40B4-BE49-F238E27FC236}">
+                <a16:creationId xmlns:a16="http://schemas.microsoft.com/office/drawing/2014/main" id="{C846C475-0D1A-49F1-B0D7-0245410ADD33}"/>
+              </a:ext>
+            </a:extLst>
+          </p:cNvPr>
+          <p:cNvSpPr/>
+          <p:nvPr/>
+        </p:nvSpPr>
+        <p:spPr>
+          <a:xfrm>
+            <a:off x="10315543" y="886521"/>
+            <a:ext cx="946896" cy="874467"/>
+          </a:xfrm>
+          <a:prstGeom prst="ellipse">
+            <a:avLst/>
+          </a:prstGeom>
+          <a:noFill/>
+          <a:ln w="31750"/>
+        </p:spPr>
+        <p:style>
+          <a:lnRef idx="2">
+            <a:schemeClr val="accent1">
+              <a:shade val="50000"/>
+            </a:schemeClr>
+          </a:lnRef>
+          <a:fillRef idx="1">
+            <a:schemeClr val="accent1"/>
+          </a:fillRef>
+          <a:effectRef idx="0">
+            <a:schemeClr val="accent1"/>
+          </a:effectRef>
+          <a:fontRef idx="minor">
+            <a:schemeClr val="lt1"/>
+          </a:fontRef>
+        </p:style>
+        <p:txBody>
+          <a:bodyPr rtlCol="0" anchor="ctr"/>
+          <a:lstStyle/>
+          <a:p>
+            <a:pPr algn="ctr"/>
+            <a:r>
+              <a:rPr lang="en-US" sz="2800" b="1" dirty="0">
+                <a:solidFill>
+                  <a:schemeClr val="tx1"/>
+                </a:solidFill>
+              </a:rPr>
+              <a:t>J</a:t>
+            </a:r>
+          </a:p>
+        </p:txBody>
+      </p:sp>
+      <p:cxnSp>
+        <p:nvCxnSpPr>
+          <p:cNvPr id="40" name="Straight Arrow Connector 39">
+            <a:extLst>
+              <a:ext uri="{FF2B5EF4-FFF2-40B4-BE49-F238E27FC236}">
+                <a16:creationId xmlns:a16="http://schemas.microsoft.com/office/drawing/2014/main" id="{075255CD-639A-4646-8DD1-F761E8E706B7}"/>
+              </a:ext>
+            </a:extLst>
+          </p:cNvPr>
+          <p:cNvCxnSpPr>
+            <a:cxnSpLocks/>
+            <a:stCxn id="23" idx="7"/>
+          </p:cNvCxnSpPr>
+          <p:nvPr/>
+        </p:nvCxnSpPr>
+        <p:spPr>
+          <a:xfrm flipV="1">
+            <a:off x="3708063" y="3251722"/>
+            <a:ext cx="608296" cy="361420"/>
+          </a:xfrm>
+          <a:prstGeom prst="straightConnector1">
+            <a:avLst/>
+          </a:prstGeom>
+          <a:ln w="31750">
+            <a:tailEnd type="triangle"/>
+          </a:ln>
+        </p:spPr>
+        <p:style>
+          <a:lnRef idx="1">
+            <a:schemeClr val="accent1"/>
+          </a:lnRef>
+          <a:fillRef idx="0">
+            <a:schemeClr val="accent1"/>
+          </a:fillRef>
+          <a:effectRef idx="0">
+            <a:schemeClr val="accent1"/>
+          </a:effectRef>
+          <a:fontRef idx="minor">
+            <a:schemeClr val="tx1"/>
+          </a:fontRef>
+        </p:style>
+      </p:cxnSp>
+      <p:cxnSp>
+        <p:nvCxnSpPr>
+          <p:cNvPr id="41" name="Straight Arrow Connector 40">
+            <a:extLst>
+              <a:ext uri="{FF2B5EF4-FFF2-40B4-BE49-F238E27FC236}">
+                <a16:creationId xmlns:a16="http://schemas.microsoft.com/office/drawing/2014/main" id="{6EBB9F32-59AB-4C12-81A4-B2B33F2436AB}"/>
+              </a:ext>
+            </a:extLst>
+          </p:cNvPr>
+          <p:cNvCxnSpPr>
+            <a:cxnSpLocks/>
+            <a:stCxn id="3" idx="0"/>
+            <a:endCxn id="19" idx="3"/>
+          </p:cNvCxnSpPr>
+          <p:nvPr/>
+        </p:nvCxnSpPr>
+        <p:spPr>
+          <a:xfrm flipV="1">
+            <a:off x="1599916" y="2548972"/>
+            <a:ext cx="646866" cy="828856"/>
+          </a:xfrm>
+          <a:prstGeom prst="straightConnector1">
+            <a:avLst/>
+          </a:prstGeom>
+          <a:ln w="31750">
+            <a:tailEnd type="triangle"/>
+          </a:ln>
+        </p:spPr>
+        <p:style>
+          <a:lnRef idx="1">
+            <a:schemeClr val="accent1"/>
+          </a:lnRef>
+          <a:fillRef idx="0">
+            <a:schemeClr val="accent1"/>
+          </a:fillRef>
+          <a:effectRef idx="0">
+            <a:schemeClr val="accent1"/>
+          </a:effectRef>
+          <a:fontRef idx="minor">
+            <a:schemeClr val="tx1"/>
+          </a:fontRef>
+        </p:style>
+      </p:cxnSp>
+      <p:cxnSp>
+        <p:nvCxnSpPr>
+          <p:cNvPr id="42" name="Straight Arrow Connector 41">
+            <a:extLst>
+              <a:ext uri="{FF2B5EF4-FFF2-40B4-BE49-F238E27FC236}">
+                <a16:creationId xmlns:a16="http://schemas.microsoft.com/office/drawing/2014/main" id="{3157BCD9-1DDE-4480-8291-97C078BC77F6}"/>
+              </a:ext>
+            </a:extLst>
+          </p:cNvPr>
+          <p:cNvCxnSpPr>
+            <a:cxnSpLocks/>
+            <a:stCxn id="73" idx="6"/>
+            <a:endCxn id="38" idx="2"/>
+          </p:cNvCxnSpPr>
+          <p:nvPr/>
+        </p:nvCxnSpPr>
+        <p:spPr>
+          <a:xfrm flipV="1">
+            <a:off x="5131216" y="1291935"/>
+            <a:ext cx="1270867" cy="312012"/>
+          </a:xfrm>
+          <a:prstGeom prst="straightConnector1">
+            <a:avLst/>
+          </a:prstGeom>
+          <a:ln w="31750">
+            <a:tailEnd type="triangle"/>
+          </a:ln>
+        </p:spPr>
+        <p:style>
+          <a:lnRef idx="1">
+            <a:schemeClr val="accent1"/>
+          </a:lnRef>
+          <a:fillRef idx="0">
+            <a:schemeClr val="accent1"/>
+          </a:fillRef>
+          <a:effectRef idx="0">
+            <a:schemeClr val="accent1"/>
+          </a:effectRef>
+          <a:fontRef idx="minor">
+            <a:schemeClr val="tx1"/>
+          </a:fontRef>
+        </p:style>
+      </p:cxnSp>
+      <p:cxnSp>
+        <p:nvCxnSpPr>
+          <p:cNvPr id="43" name="Straight Arrow Connector 42">
+            <a:extLst>
+              <a:ext uri="{FF2B5EF4-FFF2-40B4-BE49-F238E27FC236}">
+                <a16:creationId xmlns:a16="http://schemas.microsoft.com/office/drawing/2014/main" id="{AC4F3F3C-D0AC-45F1-BC83-01D789F382B0}"/>
+              </a:ext>
+            </a:extLst>
+          </p:cNvPr>
+          <p:cNvCxnSpPr>
+            <a:cxnSpLocks/>
+            <a:stCxn id="78" idx="0"/>
+            <a:endCxn id="38" idx="4"/>
+          </p:cNvCxnSpPr>
+          <p:nvPr/>
+        </p:nvCxnSpPr>
+        <p:spPr>
+          <a:xfrm flipV="1">
+            <a:off x="6696923" y="1729168"/>
+            <a:ext cx="178608" cy="839978"/>
+          </a:xfrm>
+          <a:prstGeom prst="straightConnector1">
+            <a:avLst/>
+          </a:prstGeom>
+          <a:ln w="31750">
+            <a:tailEnd type="triangle"/>
+          </a:ln>
+        </p:spPr>
+        <p:style>
+          <a:lnRef idx="1">
+            <a:schemeClr val="accent1"/>
+          </a:lnRef>
+          <a:fillRef idx="0">
+            <a:schemeClr val="accent1"/>
+          </a:fillRef>
+          <a:effectRef idx="0">
+            <a:schemeClr val="accent1"/>
+          </a:effectRef>
+          <a:fontRef idx="minor">
+            <a:schemeClr val="tx1"/>
+          </a:fontRef>
+        </p:style>
+      </p:cxnSp>
+      <p:cxnSp>
+        <p:nvCxnSpPr>
+          <p:cNvPr id="44" name="Straight Arrow Connector 43">
+            <a:extLst>
+              <a:ext uri="{FF2B5EF4-FFF2-40B4-BE49-F238E27FC236}">
+                <a16:creationId xmlns:a16="http://schemas.microsoft.com/office/drawing/2014/main" id="{C02DD504-95C0-4183-81D7-5985ACCC1615}"/>
+              </a:ext>
+            </a:extLst>
+          </p:cNvPr>
+          <p:cNvCxnSpPr>
+            <a:cxnSpLocks/>
+            <a:endCxn id="39" idx="2"/>
+          </p:cNvCxnSpPr>
+          <p:nvPr/>
+        </p:nvCxnSpPr>
+        <p:spPr>
+          <a:xfrm>
+            <a:off x="9208879" y="1321285"/>
+            <a:ext cx="1106664" cy="2470"/>
+          </a:xfrm>
+          <a:prstGeom prst="straightConnector1">
+            <a:avLst/>
+          </a:prstGeom>
+          <a:ln w="31750">
+            <a:tailEnd type="triangle"/>
+          </a:ln>
+        </p:spPr>
+        <p:style>
+          <a:lnRef idx="1">
+            <a:schemeClr val="accent1"/>
+          </a:lnRef>
+          <a:fillRef idx="0">
+            <a:schemeClr val="accent1"/>
+          </a:fillRef>
+          <a:effectRef idx="0">
+            <a:schemeClr val="accent1"/>
+          </a:effectRef>
+          <a:fontRef idx="minor">
+            <a:schemeClr val="tx1"/>
+          </a:fontRef>
+        </p:style>
+      </p:cxnSp>
+      <p:cxnSp>
+        <p:nvCxnSpPr>
+          <p:cNvPr id="46" name="Straight Arrow Connector 45">
+            <a:extLst>
+              <a:ext uri="{FF2B5EF4-FFF2-40B4-BE49-F238E27FC236}">
+                <a16:creationId xmlns:a16="http://schemas.microsoft.com/office/drawing/2014/main" id="{EB0D09C8-AB5E-457C-AD7B-2540AE944B18}"/>
+              </a:ext>
+            </a:extLst>
+          </p:cNvPr>
+          <p:cNvCxnSpPr>
+            <a:cxnSpLocks/>
+            <a:stCxn id="30" idx="0"/>
+            <a:endCxn id="39" idx="4"/>
+          </p:cNvCxnSpPr>
+          <p:nvPr/>
+        </p:nvCxnSpPr>
+        <p:spPr>
+          <a:xfrm flipH="1" flipV="1">
+            <a:off x="10788991" y="1760988"/>
+            <a:ext cx="132601" cy="1016187"/>
+          </a:xfrm>
+          <a:prstGeom prst="straightConnector1">
+            <a:avLst/>
+          </a:prstGeom>
+          <a:ln w="31750">
+            <a:tailEnd type="triangle"/>
+          </a:ln>
+        </p:spPr>
+        <p:style>
+          <a:lnRef idx="1">
+            <a:schemeClr val="accent1"/>
+          </a:lnRef>
+          <a:fillRef idx="0">
+            <a:schemeClr val="accent1"/>
+          </a:fillRef>
+          <a:effectRef idx="0">
+            <a:schemeClr val="accent1"/>
+          </a:effectRef>
+          <a:fontRef idx="minor">
+            <a:schemeClr val="tx1"/>
+          </a:fontRef>
+        </p:style>
+      </p:cxnSp>
+      <p:sp>
+        <p:nvSpPr>
+          <p:cNvPr id="49" name="TextBox 48">
+            <a:extLst>
+              <a:ext uri="{FF2B5EF4-FFF2-40B4-BE49-F238E27FC236}">
+                <a16:creationId xmlns:a16="http://schemas.microsoft.com/office/drawing/2014/main" id="{CECC821E-43FC-4974-B244-55E7B02DEDC1}"/>
+              </a:ext>
+            </a:extLst>
+          </p:cNvPr>
+          <p:cNvSpPr txBox="1"/>
+          <p:nvPr/>
+        </p:nvSpPr>
+        <p:spPr>
+          <a:xfrm>
+            <a:off x="10121842" y="1476400"/>
+            <a:ext cx="362058" cy="584775"/>
+          </a:xfrm>
+          <a:prstGeom prst="rect">
+            <a:avLst/>
+          </a:prstGeom>
+          <a:noFill/>
+        </p:spPr>
+        <p:txBody>
+          <a:bodyPr wrap="square" rtlCol="0">
+            <a:spAutoFit/>
+          </a:bodyPr>
+          <a:lstStyle/>
+          <a:p>
+            <a:r>
+              <a:rPr lang="en-US" sz="3200" b="1" dirty="0"/>
+              <a:t>+</a:t>
+            </a:r>
+          </a:p>
+        </p:txBody>
+      </p:sp>
+      <p:sp>
+        <p:nvSpPr>
+          <p:cNvPr id="50" name="TextBox 49">
+            <a:extLst>
+              <a:ext uri="{FF2B5EF4-FFF2-40B4-BE49-F238E27FC236}">
+                <a16:creationId xmlns:a16="http://schemas.microsoft.com/office/drawing/2014/main" id="{2FC25652-0226-46AD-B27F-B8E8762DEE1E}"/>
+              </a:ext>
+            </a:extLst>
+          </p:cNvPr>
+          <p:cNvSpPr txBox="1"/>
+          <p:nvPr/>
+        </p:nvSpPr>
+        <p:spPr>
+          <a:xfrm>
+            <a:off x="6134899" y="1419999"/>
+            <a:ext cx="362058" cy="584775"/>
+          </a:xfrm>
+          <a:prstGeom prst="rect">
+            <a:avLst/>
+          </a:prstGeom>
+          <a:noFill/>
+        </p:spPr>
+        <p:txBody>
+          <a:bodyPr wrap="square" rtlCol="0">
+            <a:spAutoFit/>
+          </a:bodyPr>
+          <a:lstStyle/>
+          <a:p>
+            <a:r>
+              <a:rPr lang="en-US" sz="3200" b="1" dirty="0"/>
+              <a:t>+</a:t>
+            </a:r>
+          </a:p>
+        </p:txBody>
+      </p:sp>
+      <p:sp>
+        <p:nvSpPr>
+          <p:cNvPr id="51" name="TextBox 50">
+            <a:extLst>
+              <a:ext uri="{FF2B5EF4-FFF2-40B4-BE49-F238E27FC236}">
+                <a16:creationId xmlns:a16="http://schemas.microsoft.com/office/drawing/2014/main" id="{B4213353-77A5-4BE0-99FF-9AE40074C20A}"/>
+              </a:ext>
+            </a:extLst>
+          </p:cNvPr>
+          <p:cNvSpPr txBox="1"/>
+          <p:nvPr/>
+        </p:nvSpPr>
+        <p:spPr>
+          <a:xfrm>
+            <a:off x="1347583" y="2648841"/>
+            <a:ext cx="1025247" cy="461665"/>
+          </a:xfrm>
+          <a:prstGeom prst="rect">
+            <a:avLst/>
+          </a:prstGeom>
+          <a:noFill/>
+        </p:spPr>
+        <p:txBody>
+          <a:bodyPr wrap="square" rtlCol="0">
+            <a:spAutoFit/>
+          </a:bodyPr>
+          <a:lstStyle/>
+          <a:p>
+            <a:r>
+              <a:rPr lang="en-US" sz="2400" b="1" dirty="0" err="1"/>
+              <a:t>sqr</a:t>
+            </a:r>
+            <a:endParaRPr lang="en-US" sz="2400" b="1" dirty="0"/>
+          </a:p>
+        </p:txBody>
+      </p:sp>
+      <p:sp>
+        <p:nvSpPr>
+          <p:cNvPr id="52" name="TextBox 51">
+            <a:extLst>
+              <a:ext uri="{FF2B5EF4-FFF2-40B4-BE49-F238E27FC236}">
+                <a16:creationId xmlns:a16="http://schemas.microsoft.com/office/drawing/2014/main" id="{E6F3CEF3-61B0-4AFE-8AB1-67DD41B10066}"/>
+              </a:ext>
+            </a:extLst>
+          </p:cNvPr>
+          <p:cNvSpPr txBox="1"/>
+          <p:nvPr/>
+        </p:nvSpPr>
+        <p:spPr>
+          <a:xfrm>
+            <a:off x="3420534" y="2777175"/>
+            <a:ext cx="1025247" cy="461665"/>
+          </a:xfrm>
+          <a:prstGeom prst="rect">
+            <a:avLst/>
+          </a:prstGeom>
+          <a:noFill/>
+        </p:spPr>
+        <p:txBody>
+          <a:bodyPr wrap="square" rtlCol="0">
+            <a:spAutoFit/>
+          </a:bodyPr>
+          <a:lstStyle/>
+          <a:p>
+            <a:r>
+              <a:rPr lang="en-US" sz="2400" b="1" dirty="0" err="1"/>
+              <a:t>sqr</a:t>
+            </a:r>
+            <a:endParaRPr lang="en-US" sz="2400" b="1" dirty="0"/>
+          </a:p>
+        </p:txBody>
+      </p:sp>
+      <p:cxnSp>
+        <p:nvCxnSpPr>
+          <p:cNvPr id="70" name="Straight Arrow Connector 69">
+            <a:extLst>
+              <a:ext uri="{FF2B5EF4-FFF2-40B4-BE49-F238E27FC236}">
+                <a16:creationId xmlns:a16="http://schemas.microsoft.com/office/drawing/2014/main" id="{581D8BB3-2546-48FC-B393-09830D293598}"/>
+              </a:ext>
+            </a:extLst>
+          </p:cNvPr>
+          <p:cNvCxnSpPr>
+            <a:cxnSpLocks/>
+          </p:cNvCxnSpPr>
+          <p:nvPr/>
+        </p:nvCxnSpPr>
+        <p:spPr>
+          <a:xfrm flipV="1">
+            <a:off x="2999608" y="1677343"/>
+            <a:ext cx="1184712" cy="328947"/>
+          </a:xfrm>
+          <a:prstGeom prst="straightConnector1">
+            <a:avLst/>
+          </a:prstGeom>
+          <a:ln w="31750">
+            <a:tailEnd type="triangle"/>
+          </a:ln>
+        </p:spPr>
+        <p:style>
+          <a:lnRef idx="1">
+            <a:schemeClr val="accent1"/>
+          </a:lnRef>
+          <a:fillRef idx="0">
+            <a:schemeClr val="accent1"/>
+          </a:fillRef>
+          <a:effectRef idx="0">
+            <a:schemeClr val="accent1"/>
+          </a:effectRef>
+          <a:fontRef idx="minor">
+            <a:schemeClr val="tx1"/>
+          </a:fontRef>
+        </p:style>
+      </p:cxnSp>
+      <p:sp>
+        <p:nvSpPr>
+          <p:cNvPr id="71" name="TextBox 70">
+            <a:extLst>
+              <a:ext uri="{FF2B5EF4-FFF2-40B4-BE49-F238E27FC236}">
+                <a16:creationId xmlns:a16="http://schemas.microsoft.com/office/drawing/2014/main" id="{6C555957-1DC2-45A9-81CA-6FB2EE9CA194}"/>
+              </a:ext>
+            </a:extLst>
+          </p:cNvPr>
+          <p:cNvSpPr txBox="1"/>
+          <p:nvPr/>
+        </p:nvSpPr>
+        <p:spPr>
+          <a:xfrm>
+            <a:off x="2983121" y="1321285"/>
+            <a:ext cx="1025247" cy="461665"/>
+          </a:xfrm>
+          <a:prstGeom prst="rect">
+            <a:avLst/>
+          </a:prstGeom>
+          <a:noFill/>
+        </p:spPr>
+        <p:txBody>
+          <a:bodyPr wrap="square" rtlCol="0">
+            <a:spAutoFit/>
+          </a:bodyPr>
+          <a:lstStyle/>
+          <a:p>
+            <a:r>
+              <a:rPr lang="en-US" sz="2400" b="1" dirty="0"/>
+              <a:t>sum</a:t>
+            </a:r>
+          </a:p>
+        </p:txBody>
+      </p:sp>
+      <p:sp>
+        <p:nvSpPr>
+          <p:cNvPr id="73" name="Oval 72">
+            <a:extLst>
+              <a:ext uri="{FF2B5EF4-FFF2-40B4-BE49-F238E27FC236}">
+                <a16:creationId xmlns:a16="http://schemas.microsoft.com/office/drawing/2014/main" id="{48EA7794-2123-4DE7-A4AD-9FFD500EDD2C}"/>
+              </a:ext>
+            </a:extLst>
+          </p:cNvPr>
+          <p:cNvSpPr/>
+          <p:nvPr/>
+        </p:nvSpPr>
+        <p:spPr>
+          <a:xfrm>
+            <a:off x="4184320" y="1166713"/>
+            <a:ext cx="946896" cy="874467"/>
+          </a:xfrm>
+          <a:prstGeom prst="ellipse">
+            <a:avLst/>
+          </a:prstGeom>
+          <a:noFill/>
+          <a:ln w="31750"/>
+        </p:spPr>
+        <p:style>
+          <a:lnRef idx="2">
+            <a:schemeClr val="accent1">
+              <a:shade val="50000"/>
+            </a:schemeClr>
+          </a:lnRef>
+          <a:fillRef idx="1">
+            <a:schemeClr val="accent1"/>
+          </a:fillRef>
+          <a:effectRef idx="0">
+            <a:schemeClr val="accent1"/>
+          </a:effectRef>
+          <a:fontRef idx="minor">
+            <a:schemeClr val="lt1"/>
+          </a:fontRef>
+        </p:style>
+        <p:txBody>
+          <a:bodyPr rtlCol="0" anchor="ctr"/>
+          <a:lstStyle/>
+          <a:p>
+            <a:pPr algn="ctr"/>
+            <a:r>
+              <a:rPr lang="en-US" sz="2800" b="1" dirty="0">
+                <a:solidFill>
+                  <a:schemeClr val="tx1"/>
+                </a:solidFill>
+              </a:rPr>
+              <a:t>U</a:t>
+            </a:r>
+            <a:r>
+              <a:rPr lang="en-US" sz="2800" b="1" baseline="30000" dirty="0">
+                <a:solidFill>
+                  <a:schemeClr val="tx1"/>
+                </a:solidFill>
+              </a:rPr>
+              <a:t>7</a:t>
+            </a:r>
+          </a:p>
+        </p:txBody>
+      </p:sp>
+      <p:cxnSp>
+        <p:nvCxnSpPr>
+          <p:cNvPr id="76" name="Straight Arrow Connector 75">
+            <a:extLst>
+              <a:ext uri="{FF2B5EF4-FFF2-40B4-BE49-F238E27FC236}">
+                <a16:creationId xmlns:a16="http://schemas.microsoft.com/office/drawing/2014/main" id="{631BE237-855E-4C20-B045-F8A6D7EBB2E8}"/>
+              </a:ext>
+            </a:extLst>
+          </p:cNvPr>
+          <p:cNvCxnSpPr>
+            <a:cxnSpLocks/>
+            <a:stCxn id="20" idx="6"/>
+            <a:endCxn id="78" idx="3"/>
+          </p:cNvCxnSpPr>
+          <p:nvPr/>
+        </p:nvCxnSpPr>
+        <p:spPr>
+          <a:xfrm>
+            <a:off x="5267077" y="3101908"/>
+            <a:ext cx="1095068" cy="213642"/>
+          </a:xfrm>
+          <a:prstGeom prst="straightConnector1">
+            <a:avLst/>
+          </a:prstGeom>
+          <a:ln w="31750">
+            <a:tailEnd type="triangle"/>
+          </a:ln>
+        </p:spPr>
+        <p:style>
+          <a:lnRef idx="1">
+            <a:schemeClr val="accent1"/>
+          </a:lnRef>
+          <a:fillRef idx="0">
+            <a:schemeClr val="accent1"/>
+          </a:fillRef>
+          <a:effectRef idx="0">
+            <a:schemeClr val="accent1"/>
+          </a:effectRef>
+          <a:fontRef idx="minor">
+            <a:schemeClr val="tx1"/>
+          </a:fontRef>
+        </p:style>
+      </p:cxnSp>
+      <p:sp>
+        <p:nvSpPr>
+          <p:cNvPr id="77" name="TextBox 76">
+            <a:extLst>
+              <a:ext uri="{FF2B5EF4-FFF2-40B4-BE49-F238E27FC236}">
+                <a16:creationId xmlns:a16="http://schemas.microsoft.com/office/drawing/2014/main" id="{36623340-313A-4775-909B-BD41F1215738}"/>
+              </a:ext>
+            </a:extLst>
+          </p:cNvPr>
+          <p:cNvSpPr txBox="1"/>
+          <p:nvPr/>
+        </p:nvSpPr>
+        <p:spPr>
+          <a:xfrm>
+            <a:off x="5298852" y="2632370"/>
+            <a:ext cx="1025247" cy="461665"/>
+          </a:xfrm>
+          <a:prstGeom prst="rect">
+            <a:avLst/>
+          </a:prstGeom>
+          <a:noFill/>
+        </p:spPr>
+        <p:txBody>
+          <a:bodyPr wrap="square" rtlCol="0">
+            <a:spAutoFit/>
+          </a:bodyPr>
+          <a:lstStyle/>
+          <a:p>
+            <a:r>
+              <a:rPr lang="en-US" sz="2400" b="1" dirty="0"/>
+              <a:t>sum</a:t>
+            </a:r>
+          </a:p>
+        </p:txBody>
+      </p:sp>
+      <p:sp>
+        <p:nvSpPr>
+          <p:cNvPr id="78" name="Oval 77">
+            <a:extLst>
+              <a:ext uri="{FF2B5EF4-FFF2-40B4-BE49-F238E27FC236}">
+                <a16:creationId xmlns:a16="http://schemas.microsoft.com/office/drawing/2014/main" id="{CFA677F1-79AB-4675-85BF-BA1585AD39DB}"/>
+              </a:ext>
+            </a:extLst>
+          </p:cNvPr>
+          <p:cNvSpPr/>
+          <p:nvPr/>
+        </p:nvSpPr>
+        <p:spPr>
+          <a:xfrm>
+            <a:off x="6223475" y="2569146"/>
+            <a:ext cx="946896" cy="874467"/>
+          </a:xfrm>
+          <a:prstGeom prst="ellipse">
+            <a:avLst/>
+          </a:prstGeom>
+          <a:noFill/>
+          <a:ln w="31750"/>
+        </p:spPr>
+        <p:style>
+          <a:lnRef idx="2">
+            <a:schemeClr val="accent1">
+              <a:shade val="50000"/>
+            </a:schemeClr>
+          </a:lnRef>
+          <a:fillRef idx="1">
+            <a:schemeClr val="accent1"/>
+          </a:fillRef>
+          <a:effectRef idx="0">
+            <a:schemeClr val="accent1"/>
+          </a:effectRef>
+          <a:fontRef idx="minor">
+            <a:schemeClr val="lt1"/>
+          </a:fontRef>
+        </p:style>
+        <p:txBody>
+          <a:bodyPr rtlCol="0" anchor="ctr"/>
+          <a:lstStyle/>
+          <a:p>
+            <a:pPr algn="ctr"/>
+            <a:r>
+              <a:rPr lang="en-US" sz="2800" b="1" dirty="0">
+                <a:solidFill>
+                  <a:schemeClr val="tx1"/>
+                </a:solidFill>
+              </a:rPr>
+              <a:t>U</a:t>
+            </a:r>
+            <a:r>
+              <a:rPr lang="en-US" sz="2800" b="1" baseline="30000" dirty="0">
+                <a:solidFill>
+                  <a:schemeClr val="tx1"/>
+                </a:solidFill>
+              </a:rPr>
+              <a:t>8</a:t>
+            </a:r>
+          </a:p>
+        </p:txBody>
+      </p:sp>
+      <p:sp>
+        <p:nvSpPr>
+          <p:cNvPr id="115" name="Oval 114">
+            <a:extLst>
+              <a:ext uri="{FF2B5EF4-FFF2-40B4-BE49-F238E27FC236}">
+                <a16:creationId xmlns:a16="http://schemas.microsoft.com/office/drawing/2014/main" id="{18EAF98B-509B-4749-8F49-AD8FBB7FA204}"/>
+              </a:ext>
+            </a:extLst>
+          </p:cNvPr>
+          <p:cNvSpPr/>
+          <p:nvPr/>
+        </p:nvSpPr>
+        <p:spPr>
+          <a:xfrm>
+            <a:off x="7894744" y="2236039"/>
+            <a:ext cx="946896" cy="874467"/>
+          </a:xfrm>
+          <a:prstGeom prst="ellipse">
+            <a:avLst/>
+          </a:prstGeom>
+          <a:noFill/>
+          <a:ln w="31750"/>
+        </p:spPr>
+        <p:style>
+          <a:lnRef idx="2">
+            <a:schemeClr val="accent1">
+              <a:shade val="50000"/>
+            </a:schemeClr>
+          </a:lnRef>
+          <a:fillRef idx="1">
+            <a:schemeClr val="accent1"/>
+          </a:fillRef>
+          <a:effectRef idx="0">
+            <a:schemeClr val="accent1"/>
+          </a:effectRef>
+          <a:fontRef idx="minor">
+            <a:schemeClr val="lt1"/>
+          </a:fontRef>
+        </p:style>
+        <p:txBody>
+          <a:bodyPr rtlCol="0" anchor="ctr"/>
+          <a:lstStyle/>
+          <a:p>
+            <a:pPr algn="ctr"/>
+            <a:r>
+              <a:rPr lang="en-US" sz="2800" b="1" dirty="0">
+                <a:solidFill>
+                  <a:schemeClr val="tx1"/>
+                </a:solidFill>
+                <a:latin typeface="Symbol" panose="05050102010706020507" pitchFamily="18" charset="2"/>
+              </a:rPr>
+              <a:t>l</a:t>
+            </a:r>
+          </a:p>
+        </p:txBody>
+      </p:sp>
+      <p:sp>
+        <p:nvSpPr>
+          <p:cNvPr id="118" name="Oval 117">
+            <a:extLst>
+              <a:ext uri="{FF2B5EF4-FFF2-40B4-BE49-F238E27FC236}">
+                <a16:creationId xmlns:a16="http://schemas.microsoft.com/office/drawing/2014/main" id="{82F43D1B-57C7-4078-8584-1B3BCAD3CA9C}"/>
+              </a:ext>
+            </a:extLst>
+          </p:cNvPr>
+          <p:cNvSpPr/>
+          <p:nvPr/>
+        </p:nvSpPr>
+        <p:spPr>
+          <a:xfrm>
+            <a:off x="8270529" y="919542"/>
+            <a:ext cx="946896" cy="874467"/>
+          </a:xfrm>
+          <a:prstGeom prst="ellipse">
+            <a:avLst/>
+          </a:prstGeom>
+          <a:noFill/>
+          <a:ln w="31750"/>
+        </p:spPr>
+        <p:style>
+          <a:lnRef idx="2">
+            <a:schemeClr val="accent1">
+              <a:shade val="50000"/>
+            </a:schemeClr>
+          </a:lnRef>
+          <a:fillRef idx="1">
+            <a:schemeClr val="accent1"/>
+          </a:fillRef>
+          <a:effectRef idx="0">
+            <a:schemeClr val="accent1"/>
+          </a:effectRef>
+          <a:fontRef idx="minor">
+            <a:schemeClr val="lt1"/>
+          </a:fontRef>
+        </p:style>
+        <p:txBody>
+          <a:bodyPr rtlCol="0" anchor="ctr"/>
+          <a:lstStyle/>
+          <a:p>
+            <a:pPr algn="ctr"/>
+            <a:r>
+              <a:rPr lang="en-US" sz="2800" b="1" dirty="0">
+                <a:solidFill>
+                  <a:schemeClr val="tx1"/>
+                </a:solidFill>
+              </a:rPr>
+              <a:t>U</a:t>
+            </a:r>
+            <a:r>
+              <a:rPr lang="en-US" sz="2800" b="1" baseline="30000" dirty="0">
+                <a:solidFill>
+                  <a:schemeClr val="tx1"/>
+                </a:solidFill>
+              </a:rPr>
+              <a:t>10</a:t>
+            </a:r>
+          </a:p>
+        </p:txBody>
+      </p:sp>
+      <p:cxnSp>
+        <p:nvCxnSpPr>
+          <p:cNvPr id="119" name="Straight Arrow Connector 118">
+            <a:extLst>
+              <a:ext uri="{FF2B5EF4-FFF2-40B4-BE49-F238E27FC236}">
+                <a16:creationId xmlns:a16="http://schemas.microsoft.com/office/drawing/2014/main" id="{85AD7100-0246-4F48-B7CA-7C1538A19C9C}"/>
+              </a:ext>
+            </a:extLst>
+          </p:cNvPr>
+          <p:cNvCxnSpPr>
+            <a:cxnSpLocks/>
+            <a:stCxn id="38" idx="6"/>
+            <a:endCxn id="118" idx="2"/>
+          </p:cNvCxnSpPr>
+          <p:nvPr/>
+        </p:nvCxnSpPr>
+        <p:spPr>
+          <a:xfrm>
+            <a:off x="7348979" y="1291935"/>
+            <a:ext cx="921550" cy="64841"/>
+          </a:xfrm>
+          <a:prstGeom prst="straightConnector1">
+            <a:avLst/>
+          </a:prstGeom>
+          <a:ln w="31750">
+            <a:tailEnd type="triangle"/>
+          </a:ln>
+        </p:spPr>
+        <p:style>
+          <a:lnRef idx="1">
+            <a:schemeClr val="accent1"/>
+          </a:lnRef>
+          <a:fillRef idx="0">
+            <a:schemeClr val="accent1"/>
+          </a:fillRef>
+          <a:effectRef idx="0">
+            <a:schemeClr val="accent1"/>
+          </a:effectRef>
+          <a:fontRef idx="minor">
+            <a:schemeClr val="tx1"/>
+          </a:fontRef>
+        </p:style>
+      </p:cxnSp>
+      <p:cxnSp>
+        <p:nvCxnSpPr>
+          <p:cNvPr id="122" name="Straight Arrow Connector 121">
+            <a:extLst>
+              <a:ext uri="{FF2B5EF4-FFF2-40B4-BE49-F238E27FC236}">
+                <a16:creationId xmlns:a16="http://schemas.microsoft.com/office/drawing/2014/main" id="{CD38900C-C0B5-4392-8F77-85E3D55905E4}"/>
+              </a:ext>
+            </a:extLst>
+          </p:cNvPr>
+          <p:cNvCxnSpPr>
+            <a:cxnSpLocks/>
+            <a:stCxn id="115" idx="0"/>
+            <a:endCxn id="118" idx="3"/>
+          </p:cNvCxnSpPr>
+          <p:nvPr/>
+        </p:nvCxnSpPr>
+        <p:spPr>
+          <a:xfrm flipV="1">
+            <a:off x="8368192" y="1665946"/>
+            <a:ext cx="41007" cy="570093"/>
+          </a:xfrm>
+          <a:prstGeom prst="straightConnector1">
+            <a:avLst/>
+          </a:prstGeom>
+          <a:ln w="31750">
+            <a:tailEnd type="triangle"/>
+          </a:ln>
+        </p:spPr>
+        <p:style>
+          <a:lnRef idx="1">
+            <a:schemeClr val="accent1"/>
+          </a:lnRef>
+          <a:fillRef idx="0">
+            <a:schemeClr val="accent1"/>
+          </a:fillRef>
+          <a:effectRef idx="0">
+            <a:schemeClr val="accent1"/>
+          </a:effectRef>
+          <a:fontRef idx="minor">
+            <a:schemeClr val="tx1"/>
+          </a:fontRef>
+        </p:style>
+      </p:cxnSp>
+      <p:sp>
+        <p:nvSpPr>
+          <p:cNvPr id="125" name="TextBox 124">
+            <a:extLst>
+              <a:ext uri="{FF2B5EF4-FFF2-40B4-BE49-F238E27FC236}">
+                <a16:creationId xmlns:a16="http://schemas.microsoft.com/office/drawing/2014/main" id="{1A33775C-3C2C-4084-9B46-990D17097456}"/>
+              </a:ext>
+            </a:extLst>
+          </p:cNvPr>
+          <p:cNvSpPr txBox="1"/>
+          <p:nvPr/>
+        </p:nvSpPr>
+        <p:spPr>
+          <a:xfrm>
+            <a:off x="7518026" y="1446510"/>
+            <a:ext cx="1025247" cy="461665"/>
+          </a:xfrm>
+          <a:prstGeom prst="rect">
+            <a:avLst/>
+          </a:prstGeom>
+          <a:noFill/>
+        </p:spPr>
+        <p:txBody>
+          <a:bodyPr wrap="square" rtlCol="0">
+            <a:spAutoFit/>
+          </a:bodyPr>
+          <a:lstStyle/>
+          <a:p>
+            <a:r>
+              <a:rPr lang="en-US" sz="2400" b="1" dirty="0" err="1"/>
+              <a:t>mult</a:t>
+            </a:r>
+            <a:endParaRPr lang="en-US" sz="2400" b="1" dirty="0"/>
+          </a:p>
+        </p:txBody>
+      </p:sp>
+    </p:spTree>
+    <p:extLst>
+      <p:ext uri="{BB962C8B-B14F-4D97-AF65-F5344CB8AC3E}">
+        <p14:creationId xmlns:p14="http://schemas.microsoft.com/office/powerpoint/2010/main" val="2679327802"/>
       </p:ext>
     </p:extLst>
   </p:cSld>

</xml_diff>

<commit_message>
Added figures for backprop eample
</commit_message>
<xml_diff>
--- a/Lesson1/Figures/Lesson1Figures.pptx
+++ b/Lesson1/Figures/Lesson1Figures.pptx
@@ -12,9 +12,10 @@
     <p:sldId id="260" r:id="rId6"/>
     <p:sldId id="261" r:id="rId7"/>
     <p:sldId id="262" r:id="rId8"/>
+    <p:sldId id="263" r:id="rId9"/>
   </p:sldIdLst>
   <p:sldSz cx="12192000" cy="6858000"/>
-  <p:notesSz cx="6858000" cy="9144000"/>
+  <p:notesSz cx="7010400" cy="9296400"/>
   <p:defaultTextStyle>
     <a:defPPr>
       <a:defRPr lang="en-US"/>
@@ -265,7 +266,7 @@
           <a:p>
             <a:fld id="{A2EECDC0-4DBF-47B0-8F9E-98A50DA8BD3F}" type="datetimeFigureOut">
               <a:rPr lang="en-US" smtClean="0"/>
-              <a:t>3/23/2018</a:t>
+              <a:t>3/29/2018</a:t>
             </a:fld>
             <a:endParaRPr lang="en-US"/>
           </a:p>
@@ -463,7 +464,7 @@
           <a:p>
             <a:fld id="{A2EECDC0-4DBF-47B0-8F9E-98A50DA8BD3F}" type="datetimeFigureOut">
               <a:rPr lang="en-US" smtClean="0"/>
-              <a:t>3/23/2018</a:t>
+              <a:t>3/29/2018</a:t>
             </a:fld>
             <a:endParaRPr lang="en-US"/>
           </a:p>
@@ -671,7 +672,7 @@
           <a:p>
             <a:fld id="{A2EECDC0-4DBF-47B0-8F9E-98A50DA8BD3F}" type="datetimeFigureOut">
               <a:rPr lang="en-US" smtClean="0"/>
-              <a:t>3/23/2018</a:t>
+              <a:t>3/29/2018</a:t>
             </a:fld>
             <a:endParaRPr lang="en-US"/>
           </a:p>
@@ -869,7 +870,7 @@
           <a:p>
             <a:fld id="{A2EECDC0-4DBF-47B0-8F9E-98A50DA8BD3F}" type="datetimeFigureOut">
               <a:rPr lang="en-US" smtClean="0"/>
-              <a:t>3/23/2018</a:t>
+              <a:t>3/29/2018</a:t>
             </a:fld>
             <a:endParaRPr lang="en-US"/>
           </a:p>
@@ -1144,7 +1145,7 @@
           <a:p>
             <a:fld id="{A2EECDC0-4DBF-47B0-8F9E-98A50DA8BD3F}" type="datetimeFigureOut">
               <a:rPr lang="en-US" smtClean="0"/>
-              <a:t>3/23/2018</a:t>
+              <a:t>3/29/2018</a:t>
             </a:fld>
             <a:endParaRPr lang="en-US"/>
           </a:p>
@@ -1409,7 +1410,7 @@
           <a:p>
             <a:fld id="{A2EECDC0-4DBF-47B0-8F9E-98A50DA8BD3F}" type="datetimeFigureOut">
               <a:rPr lang="en-US" smtClean="0"/>
-              <a:t>3/23/2018</a:t>
+              <a:t>3/29/2018</a:t>
             </a:fld>
             <a:endParaRPr lang="en-US"/>
           </a:p>
@@ -1821,7 +1822,7 @@
           <a:p>
             <a:fld id="{A2EECDC0-4DBF-47B0-8F9E-98A50DA8BD3F}" type="datetimeFigureOut">
               <a:rPr lang="en-US" smtClean="0"/>
-              <a:t>3/23/2018</a:t>
+              <a:t>3/29/2018</a:t>
             </a:fld>
             <a:endParaRPr lang="en-US"/>
           </a:p>
@@ -1962,7 +1963,7 @@
           <a:p>
             <a:fld id="{A2EECDC0-4DBF-47B0-8F9E-98A50DA8BD3F}" type="datetimeFigureOut">
               <a:rPr lang="en-US" smtClean="0"/>
-              <a:t>3/23/2018</a:t>
+              <a:t>3/29/2018</a:t>
             </a:fld>
             <a:endParaRPr lang="en-US"/>
           </a:p>
@@ -2075,7 +2076,7 @@
           <a:p>
             <a:fld id="{A2EECDC0-4DBF-47B0-8F9E-98A50DA8BD3F}" type="datetimeFigureOut">
               <a:rPr lang="en-US" smtClean="0"/>
-              <a:t>3/23/2018</a:t>
+              <a:t>3/29/2018</a:t>
             </a:fld>
             <a:endParaRPr lang="en-US"/>
           </a:p>
@@ -2386,7 +2387,7 @@
           <a:p>
             <a:fld id="{A2EECDC0-4DBF-47B0-8F9E-98A50DA8BD3F}" type="datetimeFigureOut">
               <a:rPr lang="en-US" smtClean="0"/>
-              <a:t>3/23/2018</a:t>
+              <a:t>3/29/2018</a:t>
             </a:fld>
             <a:endParaRPr lang="en-US"/>
           </a:p>
@@ -2674,7 +2675,7 @@
           <a:p>
             <a:fld id="{A2EECDC0-4DBF-47B0-8F9E-98A50DA8BD3F}" type="datetimeFigureOut">
               <a:rPr lang="en-US" smtClean="0"/>
-              <a:t>3/23/2018</a:t>
+              <a:t>3/29/2018</a:t>
             </a:fld>
             <a:endParaRPr lang="en-US"/>
           </a:p>
@@ -2915,7 +2916,7 @@
           <a:p>
             <a:fld id="{A2EECDC0-4DBF-47B0-8F9E-98A50DA8BD3F}" type="datetimeFigureOut">
               <a:rPr lang="en-US" smtClean="0"/>
-              <a:t>3/23/2018</a:t>
+              <a:t>3/29/2018</a:t>
             </a:fld>
             <a:endParaRPr lang="en-US"/>
           </a:p>
@@ -11095,6 +11096,1509 @@
 </p:sld>
 </file>
 
+<file path=ppt/slides/slide8.xml><?xml version="1.0" encoding="utf-8"?>
+<p:sld xmlns:a="http://schemas.openxmlformats.org/drawingml/2006/main" xmlns:r="http://schemas.openxmlformats.org/officeDocument/2006/relationships" xmlns:p="http://schemas.openxmlformats.org/presentationml/2006/main">
+  <p:cSld>
+    <p:spTree>
+      <p:nvGrpSpPr>
+        <p:cNvPr id="1" name=""/>
+        <p:cNvGrpSpPr/>
+        <p:nvPr/>
+      </p:nvGrpSpPr>
+      <p:grpSpPr>
+        <a:xfrm>
+          <a:off x="0" y="0"/>
+          <a:ext cx="0" cy="0"/>
+          <a:chOff x="0" y="0"/>
+          <a:chExt cx="0" cy="0"/>
+        </a:xfrm>
+      </p:grpSpPr>
+      <p:sp>
+        <p:nvSpPr>
+          <p:cNvPr id="4" name="Oval 3">
+            <a:extLst>
+              <a:ext uri="{FF2B5EF4-FFF2-40B4-BE49-F238E27FC236}">
+                <a16:creationId xmlns:a16="http://schemas.microsoft.com/office/drawing/2014/main" id="{BB8F69CA-2925-4140-840B-FA90B4908F09}"/>
+              </a:ext>
+            </a:extLst>
+          </p:cNvPr>
+          <p:cNvSpPr/>
+          <p:nvPr/>
+        </p:nvSpPr>
+        <p:spPr>
+          <a:xfrm>
+            <a:off x="6946591" y="1694404"/>
+            <a:ext cx="2101442" cy="1941979"/>
+          </a:xfrm>
+          <a:prstGeom prst="ellipse">
+            <a:avLst/>
+          </a:prstGeom>
+          <a:noFill/>
+          <a:ln w="31750"/>
+        </p:spPr>
+        <p:style>
+          <a:lnRef idx="2">
+            <a:schemeClr val="accent1">
+              <a:shade val="50000"/>
+            </a:schemeClr>
+          </a:lnRef>
+          <a:fillRef idx="1">
+            <a:schemeClr val="accent1"/>
+          </a:fillRef>
+          <a:effectRef idx="0">
+            <a:schemeClr val="accent1"/>
+          </a:effectRef>
+          <a:fontRef idx="minor">
+            <a:schemeClr val="lt1"/>
+          </a:fontRef>
+        </p:style>
+        <p:txBody>
+          <a:bodyPr rtlCol="0" anchor="ctr"/>
+          <a:lstStyle/>
+          <a:p>
+            <a:pPr algn="ctr"/>
+            <a:endParaRPr lang="en-US"/>
+          </a:p>
+        </p:txBody>
+      </p:sp>
+      <p:cxnSp>
+        <p:nvCxnSpPr>
+          <p:cNvPr id="6" name="Straight Arrow Connector 5">
+            <a:extLst>
+              <a:ext uri="{FF2B5EF4-FFF2-40B4-BE49-F238E27FC236}">
+                <a16:creationId xmlns:a16="http://schemas.microsoft.com/office/drawing/2014/main" id="{EF8B217E-5999-4BD5-905C-EAC4AC0F57CD}"/>
+              </a:ext>
+            </a:extLst>
+          </p:cNvPr>
+          <p:cNvCxnSpPr>
+            <a:cxnSpLocks/>
+            <a:stCxn id="4" idx="6"/>
+          </p:cNvCxnSpPr>
+          <p:nvPr/>
+        </p:nvCxnSpPr>
+        <p:spPr>
+          <a:xfrm>
+            <a:off x="9048033" y="2665394"/>
+            <a:ext cx="780997" cy="15881"/>
+          </a:xfrm>
+          <a:prstGeom prst="straightConnector1">
+            <a:avLst/>
+          </a:prstGeom>
+          <a:ln w="31750">
+            <a:tailEnd type="triangle"/>
+          </a:ln>
+        </p:spPr>
+        <p:style>
+          <a:lnRef idx="1">
+            <a:schemeClr val="accent1"/>
+          </a:lnRef>
+          <a:fillRef idx="0">
+            <a:schemeClr val="accent1"/>
+          </a:fillRef>
+          <a:effectRef idx="0">
+            <a:schemeClr val="accent1"/>
+          </a:effectRef>
+          <a:fontRef idx="minor">
+            <a:schemeClr val="tx1"/>
+          </a:fontRef>
+        </p:style>
+      </p:cxnSp>
+      <p:sp>
+        <p:nvSpPr>
+          <p:cNvPr id="7" name="TextBox 6">
+            <a:extLst>
+              <a:ext uri="{FF2B5EF4-FFF2-40B4-BE49-F238E27FC236}">
+                <a16:creationId xmlns:a16="http://schemas.microsoft.com/office/drawing/2014/main" id="{093C07B0-9790-4FC9-AD0E-B96F14ADF6E2}"/>
+              </a:ext>
+            </a:extLst>
+          </p:cNvPr>
+          <p:cNvSpPr txBox="1"/>
+          <p:nvPr/>
+        </p:nvSpPr>
+        <p:spPr>
+          <a:xfrm>
+            <a:off x="457200" y="1027963"/>
+            <a:ext cx="643095" cy="584775"/>
+          </a:xfrm>
+          <a:prstGeom prst="rect">
+            <a:avLst/>
+          </a:prstGeom>
+          <a:noFill/>
+        </p:spPr>
+        <p:txBody>
+          <a:bodyPr wrap="square" rtlCol="0">
+            <a:spAutoFit/>
+          </a:bodyPr>
+          <a:lstStyle/>
+          <a:p>
+            <a:r>
+              <a:rPr lang="en-US" sz="3200" b="1" dirty="0"/>
+              <a:t>X</a:t>
+            </a:r>
+            <a:r>
+              <a:rPr lang="en-US" sz="3200" b="1" baseline="-25000" dirty="0"/>
+              <a:t>1</a:t>
+            </a:r>
+          </a:p>
+        </p:txBody>
+      </p:sp>
+      <p:sp>
+        <p:nvSpPr>
+          <p:cNvPr id="8" name="TextBox 7">
+            <a:extLst>
+              <a:ext uri="{FF2B5EF4-FFF2-40B4-BE49-F238E27FC236}">
+                <a16:creationId xmlns:a16="http://schemas.microsoft.com/office/drawing/2014/main" id="{55C679DA-96B8-4801-8FB9-6C6B2CACFED2}"/>
+              </a:ext>
+            </a:extLst>
+          </p:cNvPr>
+          <p:cNvSpPr txBox="1"/>
+          <p:nvPr/>
+        </p:nvSpPr>
+        <p:spPr>
+          <a:xfrm>
+            <a:off x="7035135" y="2388887"/>
+            <a:ext cx="1957555" cy="584775"/>
+          </a:xfrm>
+          <a:prstGeom prst="rect">
+            <a:avLst/>
+          </a:prstGeom>
+          <a:noFill/>
+        </p:spPr>
+        <p:txBody>
+          <a:bodyPr wrap="square" rtlCol="0">
+            <a:spAutoFit/>
+          </a:bodyPr>
+          <a:lstStyle/>
+          <a:p>
+            <a:pPr algn="ctr"/>
+            <a:r>
+              <a:rPr lang="en-US" sz="3200" b="1" dirty="0"/>
+              <a:t>S</a:t>
+            </a:r>
+            <a:r>
+              <a:rPr lang="en-US" sz="3200" b="1" baseline="-25000" dirty="0">
+                <a:latin typeface="Symbol" panose="05050102010706020507" pitchFamily="18" charset="2"/>
+              </a:rPr>
+              <a:t>3</a:t>
+            </a:r>
+            <a:r>
+              <a:rPr lang="en-US" sz="3200" b="1" dirty="0">
+                <a:latin typeface="Symbol" panose="05050102010706020507" pitchFamily="18" charset="2"/>
+              </a:rPr>
+              <a:t> = S</a:t>
+            </a:r>
+            <a:r>
+              <a:rPr lang="en-US" sz="3200" b="1" dirty="0"/>
+              <a:t> </a:t>
+            </a:r>
+            <a:endParaRPr lang="en-US" sz="2800" b="1" dirty="0">
+              <a:latin typeface="Symbol" panose="05050102010706020507" pitchFamily="18" charset="2"/>
+            </a:endParaRPr>
+          </a:p>
+        </p:txBody>
+      </p:sp>
+      <p:cxnSp>
+        <p:nvCxnSpPr>
+          <p:cNvPr id="9" name="Straight Arrow Connector 8">
+            <a:extLst>
+              <a:ext uri="{FF2B5EF4-FFF2-40B4-BE49-F238E27FC236}">
+                <a16:creationId xmlns:a16="http://schemas.microsoft.com/office/drawing/2014/main" id="{2BA62E85-2CE6-4124-B74F-6A60D9B42F50}"/>
+              </a:ext>
+            </a:extLst>
+          </p:cNvPr>
+          <p:cNvCxnSpPr>
+            <a:cxnSpLocks/>
+            <a:stCxn id="7" idx="3"/>
+          </p:cNvCxnSpPr>
+          <p:nvPr/>
+        </p:nvCxnSpPr>
+        <p:spPr>
+          <a:xfrm flipV="1">
+            <a:off x="1100295" y="967428"/>
+            <a:ext cx="2500135" cy="352923"/>
+          </a:xfrm>
+          <a:prstGeom prst="straightConnector1">
+            <a:avLst/>
+          </a:prstGeom>
+          <a:ln w="31750">
+            <a:tailEnd type="triangle"/>
+          </a:ln>
+        </p:spPr>
+        <p:style>
+          <a:lnRef idx="1">
+            <a:schemeClr val="accent1"/>
+          </a:lnRef>
+          <a:fillRef idx="0">
+            <a:schemeClr val="accent1"/>
+          </a:fillRef>
+          <a:effectRef idx="0">
+            <a:schemeClr val="accent1"/>
+          </a:effectRef>
+          <a:fontRef idx="minor">
+            <a:schemeClr val="tx1"/>
+          </a:fontRef>
+        </p:style>
+      </p:cxnSp>
+      <p:sp>
+        <p:nvSpPr>
+          <p:cNvPr id="19" name="TextBox 18">
+            <a:extLst>
+              <a:ext uri="{FF2B5EF4-FFF2-40B4-BE49-F238E27FC236}">
+                <a16:creationId xmlns:a16="http://schemas.microsoft.com/office/drawing/2014/main" id="{B16B5E90-5D9E-4D80-B81C-2841402B34C1}"/>
+              </a:ext>
+            </a:extLst>
+          </p:cNvPr>
+          <p:cNvSpPr txBox="1"/>
+          <p:nvPr/>
+        </p:nvSpPr>
+        <p:spPr>
+          <a:xfrm>
+            <a:off x="513191" y="2935276"/>
+            <a:ext cx="643095" cy="584775"/>
+          </a:xfrm>
+          <a:prstGeom prst="rect">
+            <a:avLst/>
+          </a:prstGeom>
+          <a:noFill/>
+        </p:spPr>
+        <p:txBody>
+          <a:bodyPr wrap="square" rtlCol="0">
+            <a:spAutoFit/>
+          </a:bodyPr>
+          <a:lstStyle/>
+          <a:p>
+            <a:r>
+              <a:rPr lang="en-US" sz="3200" b="1" dirty="0"/>
+              <a:t>X</a:t>
+            </a:r>
+            <a:r>
+              <a:rPr lang="en-US" sz="3200" b="1" baseline="-25000" dirty="0"/>
+              <a:t>2</a:t>
+            </a:r>
+          </a:p>
+        </p:txBody>
+      </p:sp>
+      <p:cxnSp>
+        <p:nvCxnSpPr>
+          <p:cNvPr id="20" name="Straight Arrow Connector 19">
+            <a:extLst>
+              <a:ext uri="{FF2B5EF4-FFF2-40B4-BE49-F238E27FC236}">
+                <a16:creationId xmlns:a16="http://schemas.microsoft.com/office/drawing/2014/main" id="{F8E97B63-C2BB-4E6B-9BEC-ECB8D4B05667}"/>
+              </a:ext>
+            </a:extLst>
+          </p:cNvPr>
+          <p:cNvCxnSpPr>
+            <a:cxnSpLocks/>
+          </p:cNvCxnSpPr>
+          <p:nvPr/>
+        </p:nvCxnSpPr>
+        <p:spPr>
+          <a:xfrm>
+            <a:off x="1127509" y="1530276"/>
+            <a:ext cx="2670406" cy="1826822"/>
+          </a:xfrm>
+          <a:prstGeom prst="straightConnector1">
+            <a:avLst/>
+          </a:prstGeom>
+          <a:ln w="31750">
+            <a:tailEnd type="triangle"/>
+          </a:ln>
+        </p:spPr>
+        <p:style>
+          <a:lnRef idx="1">
+            <a:schemeClr val="accent1"/>
+          </a:lnRef>
+          <a:fillRef idx="0">
+            <a:schemeClr val="accent1"/>
+          </a:fillRef>
+          <a:effectRef idx="0">
+            <a:schemeClr val="accent1"/>
+          </a:effectRef>
+          <a:fontRef idx="minor">
+            <a:schemeClr val="tx1"/>
+          </a:fontRef>
+        </p:style>
+      </p:cxnSp>
+      <p:sp>
+        <p:nvSpPr>
+          <p:cNvPr id="12" name="TextBox 11">
+            <a:extLst>
+              <a:ext uri="{FF2B5EF4-FFF2-40B4-BE49-F238E27FC236}">
+                <a16:creationId xmlns:a16="http://schemas.microsoft.com/office/drawing/2014/main" id="{5DD43739-AF60-4011-BAF4-56ADA4EFAEF3}"/>
+              </a:ext>
+            </a:extLst>
+          </p:cNvPr>
+          <p:cNvSpPr txBox="1"/>
+          <p:nvPr/>
+        </p:nvSpPr>
+        <p:spPr>
+          <a:xfrm>
+            <a:off x="6024280" y="1047273"/>
+            <a:ext cx="922311" cy="584775"/>
+          </a:xfrm>
+          <a:prstGeom prst="rect">
+            <a:avLst/>
+          </a:prstGeom>
+          <a:noFill/>
+        </p:spPr>
+        <p:txBody>
+          <a:bodyPr wrap="square" rtlCol="0">
+            <a:spAutoFit/>
+          </a:bodyPr>
+          <a:lstStyle/>
+          <a:p>
+            <a:r>
+              <a:rPr lang="en-US" sz="3200" b="1" dirty="0"/>
+              <a:t>w</a:t>
+            </a:r>
+            <a:r>
+              <a:rPr lang="en-US" sz="3200" b="1" baseline="30000" dirty="0"/>
+              <a:t>2</a:t>
+            </a:r>
+            <a:r>
+              <a:rPr lang="en-US" sz="3200" b="1" baseline="-25000" dirty="0"/>
+              <a:t>1</a:t>
+            </a:r>
+          </a:p>
+        </p:txBody>
+      </p:sp>
+      <p:sp>
+        <p:nvSpPr>
+          <p:cNvPr id="23" name="Oval 22">
+            <a:extLst>
+              <a:ext uri="{FF2B5EF4-FFF2-40B4-BE49-F238E27FC236}">
+                <a16:creationId xmlns:a16="http://schemas.microsoft.com/office/drawing/2014/main" id="{FDEE81E1-CA82-4978-9204-09DB3526C7E2}"/>
+              </a:ext>
+            </a:extLst>
+          </p:cNvPr>
+          <p:cNvSpPr/>
+          <p:nvPr/>
+        </p:nvSpPr>
+        <p:spPr>
+          <a:xfrm>
+            <a:off x="3522937" y="380884"/>
+            <a:ext cx="2134679" cy="2008507"/>
+          </a:xfrm>
+          <a:prstGeom prst="ellipse">
+            <a:avLst/>
+          </a:prstGeom>
+          <a:noFill/>
+          <a:ln w="31750"/>
+        </p:spPr>
+        <p:style>
+          <a:lnRef idx="2">
+            <a:schemeClr val="accent1">
+              <a:shade val="50000"/>
+            </a:schemeClr>
+          </a:lnRef>
+          <a:fillRef idx="1">
+            <a:schemeClr val="accent1"/>
+          </a:fillRef>
+          <a:effectRef idx="0">
+            <a:schemeClr val="accent1"/>
+          </a:effectRef>
+          <a:fontRef idx="minor">
+            <a:schemeClr val="lt1"/>
+          </a:fontRef>
+        </p:style>
+        <p:txBody>
+          <a:bodyPr rtlCol="0" anchor="ctr"/>
+          <a:lstStyle/>
+          <a:p>
+            <a:pPr algn="ctr"/>
+            <a:endParaRPr lang="en-US"/>
+          </a:p>
+        </p:txBody>
+      </p:sp>
+      <p:sp>
+        <p:nvSpPr>
+          <p:cNvPr id="24" name="TextBox 23">
+            <a:extLst>
+              <a:ext uri="{FF2B5EF4-FFF2-40B4-BE49-F238E27FC236}">
+                <a16:creationId xmlns:a16="http://schemas.microsoft.com/office/drawing/2014/main" id="{B13E7420-A6E2-4A44-8B0E-7008920594E7}"/>
+              </a:ext>
+            </a:extLst>
+          </p:cNvPr>
+          <p:cNvSpPr txBox="1"/>
+          <p:nvPr/>
+        </p:nvSpPr>
+        <p:spPr>
+          <a:xfrm>
+            <a:off x="3522938" y="1141391"/>
+            <a:ext cx="2067656" cy="584775"/>
+          </a:xfrm>
+          <a:prstGeom prst="rect">
+            <a:avLst/>
+          </a:prstGeom>
+          <a:noFill/>
+        </p:spPr>
+        <p:txBody>
+          <a:bodyPr wrap="square" rtlCol="0">
+            <a:spAutoFit/>
+          </a:bodyPr>
+          <a:lstStyle/>
+          <a:p>
+            <a:pPr algn="ctr"/>
+            <a:r>
+              <a:rPr lang="en-US" sz="3200" b="1" dirty="0"/>
+              <a:t>S</a:t>
+            </a:r>
+            <a:r>
+              <a:rPr lang="en-US" sz="3200" b="1" baseline="-25000" dirty="0">
+                <a:latin typeface="Symbol" panose="05050102010706020507" pitchFamily="18" charset="2"/>
+              </a:rPr>
+              <a:t>1</a:t>
+            </a:r>
+            <a:r>
+              <a:rPr lang="en-US" sz="3200" b="1" dirty="0">
+                <a:latin typeface="Symbol" panose="05050102010706020507" pitchFamily="18" charset="2"/>
+              </a:rPr>
+              <a:t> = </a:t>
+            </a:r>
+            <a:r>
+              <a:rPr lang="en-US" sz="3200" b="1" dirty="0" err="1">
+                <a:latin typeface="Symbol" panose="05050102010706020507" pitchFamily="18" charset="2"/>
+              </a:rPr>
+              <a:t>s</a:t>
+            </a:r>
+            <a:r>
+              <a:rPr lang="en-US" sz="3200" b="1" baseline="-25000" dirty="0" err="1"/>
+              <a:t>h</a:t>
+            </a:r>
+            <a:r>
+              <a:rPr lang="en-US" sz="3200" b="1" dirty="0">
+                <a:latin typeface="Symbol" panose="05050102010706020507" pitchFamily="18" charset="2"/>
+              </a:rPr>
+              <a:t>(S</a:t>
+            </a:r>
+            <a:r>
+              <a:rPr lang="en-US" sz="3200" b="1" dirty="0"/>
+              <a:t> </a:t>
+            </a:r>
+            <a:r>
+              <a:rPr lang="en-US" sz="3200" b="1" dirty="0">
+                <a:latin typeface="Symbol" panose="05050102010706020507" pitchFamily="18" charset="2"/>
+              </a:rPr>
+              <a:t>) </a:t>
+            </a:r>
+          </a:p>
+        </p:txBody>
+      </p:sp>
+      <p:sp>
+        <p:nvSpPr>
+          <p:cNvPr id="25" name="Oval 24">
+            <a:extLst>
+              <a:ext uri="{FF2B5EF4-FFF2-40B4-BE49-F238E27FC236}">
+                <a16:creationId xmlns:a16="http://schemas.microsoft.com/office/drawing/2014/main" id="{C0261D15-2FE3-4F64-8A26-8891028D75B7}"/>
+              </a:ext>
+            </a:extLst>
+          </p:cNvPr>
+          <p:cNvSpPr/>
+          <p:nvPr/>
+        </p:nvSpPr>
+        <p:spPr>
+          <a:xfrm>
+            <a:off x="3600430" y="2903408"/>
+            <a:ext cx="2101442" cy="1941979"/>
+          </a:xfrm>
+          <a:prstGeom prst="ellipse">
+            <a:avLst/>
+          </a:prstGeom>
+          <a:noFill/>
+          <a:ln w="31750"/>
+        </p:spPr>
+        <p:style>
+          <a:lnRef idx="2">
+            <a:schemeClr val="accent1">
+              <a:shade val="50000"/>
+            </a:schemeClr>
+          </a:lnRef>
+          <a:fillRef idx="1">
+            <a:schemeClr val="accent1"/>
+          </a:fillRef>
+          <a:effectRef idx="0">
+            <a:schemeClr val="accent1"/>
+          </a:effectRef>
+          <a:fontRef idx="minor">
+            <a:schemeClr val="lt1"/>
+          </a:fontRef>
+        </p:style>
+        <p:txBody>
+          <a:bodyPr rtlCol="0" anchor="ctr"/>
+          <a:lstStyle/>
+          <a:p>
+            <a:pPr algn="ctr"/>
+            <a:endParaRPr lang="en-US"/>
+          </a:p>
+        </p:txBody>
+      </p:sp>
+      <p:sp>
+        <p:nvSpPr>
+          <p:cNvPr id="26" name="TextBox 25">
+            <a:extLst>
+              <a:ext uri="{FF2B5EF4-FFF2-40B4-BE49-F238E27FC236}">
+                <a16:creationId xmlns:a16="http://schemas.microsoft.com/office/drawing/2014/main" id="{8158276B-CF75-4815-BAFD-EEFA043A10DE}"/>
+              </a:ext>
+            </a:extLst>
+          </p:cNvPr>
+          <p:cNvSpPr txBox="1"/>
+          <p:nvPr/>
+        </p:nvSpPr>
+        <p:spPr>
+          <a:xfrm>
+            <a:off x="3657600" y="3597891"/>
+            <a:ext cx="1988929" cy="584775"/>
+          </a:xfrm>
+          <a:prstGeom prst="rect">
+            <a:avLst/>
+          </a:prstGeom>
+          <a:noFill/>
+        </p:spPr>
+        <p:txBody>
+          <a:bodyPr wrap="square" rtlCol="0">
+            <a:spAutoFit/>
+          </a:bodyPr>
+          <a:lstStyle/>
+          <a:p>
+            <a:pPr algn="ctr"/>
+            <a:r>
+              <a:rPr lang="en-US" sz="3200" b="1" dirty="0"/>
+              <a:t>S</a:t>
+            </a:r>
+            <a:r>
+              <a:rPr lang="en-US" sz="3200" b="1" baseline="-25000" dirty="0">
+                <a:latin typeface="Symbol" panose="05050102010706020507" pitchFamily="18" charset="2"/>
+              </a:rPr>
+              <a:t>2</a:t>
+            </a:r>
+            <a:r>
+              <a:rPr lang="en-US" sz="3200" b="1" dirty="0">
+                <a:latin typeface="Symbol" panose="05050102010706020507" pitchFamily="18" charset="2"/>
+              </a:rPr>
+              <a:t> = </a:t>
+            </a:r>
+            <a:r>
+              <a:rPr lang="en-US" sz="3200" b="1" dirty="0" err="1">
+                <a:latin typeface="Symbol" panose="05050102010706020507" pitchFamily="18" charset="2"/>
+              </a:rPr>
+              <a:t>s</a:t>
+            </a:r>
+            <a:r>
+              <a:rPr lang="en-US" sz="3200" b="1" baseline="-25000" dirty="0" err="1"/>
+              <a:t>h</a:t>
+            </a:r>
+            <a:r>
+              <a:rPr lang="en-US" sz="3200" b="1" dirty="0">
+                <a:latin typeface="Symbol" panose="05050102010706020507" pitchFamily="18" charset="2"/>
+              </a:rPr>
+              <a:t>(S</a:t>
+            </a:r>
+            <a:r>
+              <a:rPr lang="en-US" sz="3200" b="1" dirty="0"/>
+              <a:t> </a:t>
+            </a:r>
+            <a:r>
+              <a:rPr lang="en-US" sz="3200" b="1" dirty="0">
+                <a:latin typeface="Symbol" panose="05050102010706020507" pitchFamily="18" charset="2"/>
+              </a:rPr>
+              <a:t>)</a:t>
+            </a:r>
+          </a:p>
+        </p:txBody>
+      </p:sp>
+      <p:cxnSp>
+        <p:nvCxnSpPr>
+          <p:cNvPr id="27" name="Straight Arrow Connector 26">
+            <a:extLst>
+              <a:ext uri="{FF2B5EF4-FFF2-40B4-BE49-F238E27FC236}">
+                <a16:creationId xmlns:a16="http://schemas.microsoft.com/office/drawing/2014/main" id="{680F9380-7E10-4157-B021-0B98DFC9D30D}"/>
+              </a:ext>
+            </a:extLst>
+          </p:cNvPr>
+          <p:cNvCxnSpPr>
+            <a:cxnSpLocks/>
+          </p:cNvCxnSpPr>
+          <p:nvPr/>
+        </p:nvCxnSpPr>
+        <p:spPr>
+          <a:xfrm>
+            <a:off x="5590593" y="1623069"/>
+            <a:ext cx="1512683" cy="624289"/>
+          </a:xfrm>
+          <a:prstGeom prst="straightConnector1">
+            <a:avLst/>
+          </a:prstGeom>
+          <a:ln w="31750">
+            <a:tailEnd type="triangle"/>
+          </a:ln>
+        </p:spPr>
+        <p:style>
+          <a:lnRef idx="1">
+            <a:schemeClr val="accent1"/>
+          </a:lnRef>
+          <a:fillRef idx="0">
+            <a:schemeClr val="accent1"/>
+          </a:fillRef>
+          <a:effectRef idx="0">
+            <a:schemeClr val="accent1"/>
+          </a:effectRef>
+          <a:fontRef idx="minor">
+            <a:schemeClr val="tx1"/>
+          </a:fontRef>
+        </p:style>
+      </p:cxnSp>
+      <p:cxnSp>
+        <p:nvCxnSpPr>
+          <p:cNvPr id="28" name="Straight Arrow Connector 27">
+            <a:extLst>
+              <a:ext uri="{FF2B5EF4-FFF2-40B4-BE49-F238E27FC236}">
+                <a16:creationId xmlns:a16="http://schemas.microsoft.com/office/drawing/2014/main" id="{74C47E0D-070B-4B04-8C88-BC551FFBEA9A}"/>
+              </a:ext>
+            </a:extLst>
+          </p:cNvPr>
+          <p:cNvCxnSpPr>
+            <a:cxnSpLocks/>
+          </p:cNvCxnSpPr>
+          <p:nvPr/>
+        </p:nvCxnSpPr>
+        <p:spPr>
+          <a:xfrm flipV="1">
+            <a:off x="5735073" y="3159838"/>
+            <a:ext cx="1368203" cy="694802"/>
+          </a:xfrm>
+          <a:prstGeom prst="straightConnector1">
+            <a:avLst/>
+          </a:prstGeom>
+          <a:ln w="31750">
+            <a:tailEnd type="triangle"/>
+          </a:ln>
+        </p:spPr>
+        <p:style>
+          <a:lnRef idx="1">
+            <a:schemeClr val="accent1"/>
+          </a:lnRef>
+          <a:fillRef idx="0">
+            <a:schemeClr val="accent1"/>
+          </a:fillRef>
+          <a:effectRef idx="0">
+            <a:schemeClr val="accent1"/>
+          </a:effectRef>
+          <a:fontRef idx="minor">
+            <a:schemeClr val="tx1"/>
+          </a:fontRef>
+        </p:style>
+      </p:cxnSp>
+      <p:sp>
+        <p:nvSpPr>
+          <p:cNvPr id="29" name="TextBox 28">
+            <a:extLst>
+              <a:ext uri="{FF2B5EF4-FFF2-40B4-BE49-F238E27FC236}">
+                <a16:creationId xmlns:a16="http://schemas.microsoft.com/office/drawing/2014/main" id="{13C103A4-0C0D-4986-AE24-C3E0A52E923D}"/>
+              </a:ext>
+            </a:extLst>
+          </p:cNvPr>
+          <p:cNvSpPr txBox="1"/>
+          <p:nvPr/>
+        </p:nvSpPr>
+        <p:spPr>
+          <a:xfrm>
+            <a:off x="5885778" y="2808209"/>
+            <a:ext cx="922311" cy="584775"/>
+          </a:xfrm>
+          <a:prstGeom prst="rect">
+            <a:avLst/>
+          </a:prstGeom>
+          <a:noFill/>
+        </p:spPr>
+        <p:txBody>
+          <a:bodyPr wrap="square" rtlCol="0">
+            <a:spAutoFit/>
+          </a:bodyPr>
+          <a:lstStyle/>
+          <a:p>
+            <a:r>
+              <a:rPr lang="en-US" sz="3200" b="1" dirty="0"/>
+              <a:t>w</a:t>
+            </a:r>
+            <a:r>
+              <a:rPr lang="en-US" sz="3200" b="1" baseline="30000" dirty="0"/>
+              <a:t>2</a:t>
+            </a:r>
+            <a:r>
+              <a:rPr lang="en-US" sz="3200" b="1" baseline="-25000" dirty="0"/>
+              <a:t>2</a:t>
+            </a:r>
+          </a:p>
+        </p:txBody>
+      </p:sp>
+      <p:cxnSp>
+        <p:nvCxnSpPr>
+          <p:cNvPr id="42" name="Straight Arrow Connector 41">
+            <a:extLst>
+              <a:ext uri="{FF2B5EF4-FFF2-40B4-BE49-F238E27FC236}">
+                <a16:creationId xmlns:a16="http://schemas.microsoft.com/office/drawing/2014/main" id="{16EF692A-73DB-47AE-A493-CBEAC4A229BE}"/>
+              </a:ext>
+            </a:extLst>
+          </p:cNvPr>
+          <p:cNvCxnSpPr>
+            <a:cxnSpLocks/>
+            <a:stCxn id="19" idx="3"/>
+          </p:cNvCxnSpPr>
+          <p:nvPr/>
+        </p:nvCxnSpPr>
+        <p:spPr>
+          <a:xfrm flipV="1">
+            <a:off x="1156286" y="2042549"/>
+            <a:ext cx="2551648" cy="1185115"/>
+          </a:xfrm>
+          <a:prstGeom prst="straightConnector1">
+            <a:avLst/>
+          </a:prstGeom>
+          <a:ln w="31750">
+            <a:tailEnd type="triangle"/>
+          </a:ln>
+        </p:spPr>
+        <p:style>
+          <a:lnRef idx="1">
+            <a:schemeClr val="accent1"/>
+          </a:lnRef>
+          <a:fillRef idx="0">
+            <a:schemeClr val="accent1"/>
+          </a:fillRef>
+          <a:effectRef idx="0">
+            <a:schemeClr val="accent1"/>
+          </a:effectRef>
+          <a:fontRef idx="minor">
+            <a:schemeClr val="tx1"/>
+          </a:fontRef>
+        </p:style>
+      </p:cxnSp>
+      <p:cxnSp>
+        <p:nvCxnSpPr>
+          <p:cNvPr id="47" name="Straight Arrow Connector 46">
+            <a:extLst>
+              <a:ext uri="{FF2B5EF4-FFF2-40B4-BE49-F238E27FC236}">
+                <a16:creationId xmlns:a16="http://schemas.microsoft.com/office/drawing/2014/main" id="{13ACB8DA-EB03-4C05-9967-E73881EFB4A6}"/>
+              </a:ext>
+            </a:extLst>
+          </p:cNvPr>
+          <p:cNvCxnSpPr>
+            <a:cxnSpLocks/>
+          </p:cNvCxnSpPr>
+          <p:nvPr/>
+        </p:nvCxnSpPr>
+        <p:spPr>
+          <a:xfrm>
+            <a:off x="1237376" y="3470388"/>
+            <a:ext cx="2470558" cy="895673"/>
+          </a:xfrm>
+          <a:prstGeom prst="straightConnector1">
+            <a:avLst/>
+          </a:prstGeom>
+          <a:ln w="31750">
+            <a:tailEnd type="triangle"/>
+          </a:ln>
+        </p:spPr>
+        <p:style>
+          <a:lnRef idx="1">
+            <a:schemeClr val="accent1"/>
+          </a:lnRef>
+          <a:fillRef idx="0">
+            <a:schemeClr val="accent1"/>
+          </a:fillRef>
+          <a:effectRef idx="0">
+            <a:schemeClr val="accent1"/>
+          </a:effectRef>
+          <a:fontRef idx="minor">
+            <a:schemeClr val="tx1"/>
+          </a:fontRef>
+        </p:style>
+      </p:cxnSp>
+      <p:sp>
+        <p:nvSpPr>
+          <p:cNvPr id="51" name="TextBox 50">
+            <a:extLst>
+              <a:ext uri="{FF2B5EF4-FFF2-40B4-BE49-F238E27FC236}">
+                <a16:creationId xmlns:a16="http://schemas.microsoft.com/office/drawing/2014/main" id="{52B398FB-B354-4288-A74C-4B6E45ABB363}"/>
+              </a:ext>
+            </a:extLst>
+          </p:cNvPr>
+          <p:cNvSpPr txBox="1"/>
+          <p:nvPr/>
+        </p:nvSpPr>
+        <p:spPr>
+          <a:xfrm>
+            <a:off x="1725072" y="431632"/>
+            <a:ext cx="922311" cy="584775"/>
+          </a:xfrm>
+          <a:prstGeom prst="rect">
+            <a:avLst/>
+          </a:prstGeom>
+          <a:noFill/>
+        </p:spPr>
+        <p:txBody>
+          <a:bodyPr wrap="square" rtlCol="0">
+            <a:spAutoFit/>
+          </a:bodyPr>
+          <a:lstStyle/>
+          <a:p>
+            <a:r>
+              <a:rPr lang="en-US" sz="3200" b="1" dirty="0"/>
+              <a:t>w</a:t>
+            </a:r>
+            <a:r>
+              <a:rPr lang="en-US" sz="3200" b="1" baseline="30000" dirty="0"/>
+              <a:t>1</a:t>
+            </a:r>
+            <a:r>
+              <a:rPr lang="en-US" sz="3200" b="1" baseline="-25000" dirty="0"/>
+              <a:t>11</a:t>
+            </a:r>
+          </a:p>
+        </p:txBody>
+      </p:sp>
+      <p:sp>
+        <p:nvSpPr>
+          <p:cNvPr id="52" name="TextBox 51">
+            <a:extLst>
+              <a:ext uri="{FF2B5EF4-FFF2-40B4-BE49-F238E27FC236}">
+                <a16:creationId xmlns:a16="http://schemas.microsoft.com/office/drawing/2014/main" id="{0C8BA541-0439-4E61-9124-2B7FEF72AED4}"/>
+              </a:ext>
+            </a:extLst>
+          </p:cNvPr>
+          <p:cNvSpPr txBox="1"/>
+          <p:nvPr/>
+        </p:nvSpPr>
+        <p:spPr>
+          <a:xfrm>
+            <a:off x="1803241" y="1356674"/>
+            <a:ext cx="922311" cy="584775"/>
+          </a:xfrm>
+          <a:prstGeom prst="rect">
+            <a:avLst/>
+          </a:prstGeom>
+          <a:noFill/>
+        </p:spPr>
+        <p:txBody>
+          <a:bodyPr wrap="square" rtlCol="0">
+            <a:spAutoFit/>
+          </a:bodyPr>
+          <a:lstStyle/>
+          <a:p>
+            <a:r>
+              <a:rPr lang="en-US" sz="3200" b="1" dirty="0"/>
+              <a:t>w</a:t>
+            </a:r>
+            <a:r>
+              <a:rPr lang="en-US" sz="3200" b="1" baseline="30000" dirty="0"/>
+              <a:t>1</a:t>
+            </a:r>
+            <a:r>
+              <a:rPr lang="en-US" sz="3200" b="1" baseline="-25000" dirty="0"/>
+              <a:t>12</a:t>
+            </a:r>
+          </a:p>
+        </p:txBody>
+      </p:sp>
+      <p:sp>
+        <p:nvSpPr>
+          <p:cNvPr id="53" name="TextBox 52">
+            <a:extLst>
+              <a:ext uri="{FF2B5EF4-FFF2-40B4-BE49-F238E27FC236}">
+                <a16:creationId xmlns:a16="http://schemas.microsoft.com/office/drawing/2014/main" id="{41FFC3E6-3C2C-44C1-88AE-19EB3430D42F}"/>
+              </a:ext>
+            </a:extLst>
+          </p:cNvPr>
+          <p:cNvSpPr txBox="1"/>
+          <p:nvPr/>
+        </p:nvSpPr>
+        <p:spPr>
+          <a:xfrm>
+            <a:off x="1333258" y="2135010"/>
+            <a:ext cx="922311" cy="584775"/>
+          </a:xfrm>
+          <a:prstGeom prst="rect">
+            <a:avLst/>
+          </a:prstGeom>
+          <a:noFill/>
+        </p:spPr>
+        <p:txBody>
+          <a:bodyPr wrap="square" rtlCol="0">
+            <a:spAutoFit/>
+          </a:bodyPr>
+          <a:lstStyle/>
+          <a:p>
+            <a:r>
+              <a:rPr lang="en-US" sz="3200" b="1" dirty="0"/>
+              <a:t>w</a:t>
+            </a:r>
+            <a:r>
+              <a:rPr lang="en-US" sz="3200" b="1" baseline="30000" dirty="0"/>
+              <a:t>1</a:t>
+            </a:r>
+            <a:r>
+              <a:rPr lang="en-US" sz="3200" b="1" baseline="-25000" dirty="0"/>
+              <a:t>21</a:t>
+            </a:r>
+          </a:p>
+        </p:txBody>
+      </p:sp>
+      <p:sp>
+        <p:nvSpPr>
+          <p:cNvPr id="54" name="TextBox 53">
+            <a:extLst>
+              <a:ext uri="{FF2B5EF4-FFF2-40B4-BE49-F238E27FC236}">
+                <a16:creationId xmlns:a16="http://schemas.microsoft.com/office/drawing/2014/main" id="{32891961-5F50-41E8-8A51-7E5F87BFCC2F}"/>
+              </a:ext>
+            </a:extLst>
+          </p:cNvPr>
+          <p:cNvSpPr txBox="1"/>
+          <p:nvPr/>
+        </p:nvSpPr>
+        <p:spPr>
+          <a:xfrm>
+            <a:off x="1602459" y="3018383"/>
+            <a:ext cx="922311" cy="584775"/>
+          </a:xfrm>
+          <a:prstGeom prst="rect">
+            <a:avLst/>
+          </a:prstGeom>
+          <a:noFill/>
+        </p:spPr>
+        <p:txBody>
+          <a:bodyPr wrap="square" rtlCol="0">
+            <a:spAutoFit/>
+          </a:bodyPr>
+          <a:lstStyle/>
+          <a:p>
+            <a:r>
+              <a:rPr lang="en-US" sz="3200" b="1" dirty="0"/>
+              <a:t>w</a:t>
+            </a:r>
+            <a:r>
+              <a:rPr lang="en-US" sz="3200" b="1" baseline="30000" dirty="0"/>
+              <a:t>1</a:t>
+            </a:r>
+            <a:r>
+              <a:rPr lang="en-US" sz="3200" b="1" baseline="-25000" dirty="0"/>
+              <a:t>22</a:t>
+            </a:r>
+          </a:p>
+        </p:txBody>
+      </p:sp>
+      <p:sp>
+        <p:nvSpPr>
+          <p:cNvPr id="2" name="Right Brace 1">
+            <a:extLst>
+              <a:ext uri="{FF2B5EF4-FFF2-40B4-BE49-F238E27FC236}">
+                <a16:creationId xmlns:a16="http://schemas.microsoft.com/office/drawing/2014/main" id="{6495FDCD-DCB2-4BFF-8756-FCB4CF568A51}"/>
+              </a:ext>
+            </a:extLst>
+          </p:cNvPr>
+          <p:cNvSpPr/>
+          <p:nvPr/>
+        </p:nvSpPr>
+        <p:spPr>
+          <a:xfrm rot="5400000">
+            <a:off x="4488801" y="4052327"/>
+            <a:ext cx="426408" cy="2456822"/>
+          </a:xfrm>
+          <a:prstGeom prst="rightBrace">
+            <a:avLst>
+              <a:gd name="adj1" fmla="val 0"/>
+              <a:gd name="adj2" fmla="val 50000"/>
+            </a:avLst>
+          </a:prstGeom>
+          <a:ln w="31750"/>
+        </p:spPr>
+        <p:style>
+          <a:lnRef idx="1">
+            <a:schemeClr val="accent1"/>
+          </a:lnRef>
+          <a:fillRef idx="0">
+            <a:schemeClr val="accent1"/>
+          </a:fillRef>
+          <a:effectRef idx="0">
+            <a:schemeClr val="accent1"/>
+          </a:effectRef>
+          <a:fontRef idx="minor">
+            <a:schemeClr val="tx1"/>
+          </a:fontRef>
+        </p:style>
+        <p:txBody>
+          <a:bodyPr rtlCol="0" anchor="ctr"/>
+          <a:lstStyle/>
+          <a:p>
+            <a:pPr algn="ctr"/>
+            <a:endParaRPr lang="en-US"/>
+          </a:p>
+        </p:txBody>
+      </p:sp>
+      <p:sp>
+        <p:nvSpPr>
+          <p:cNvPr id="30" name="TextBox 29">
+            <a:extLst>
+              <a:ext uri="{FF2B5EF4-FFF2-40B4-BE49-F238E27FC236}">
+                <a16:creationId xmlns:a16="http://schemas.microsoft.com/office/drawing/2014/main" id="{AD3627E2-A584-4589-B096-2BF48786A134}"/>
+              </a:ext>
+            </a:extLst>
+          </p:cNvPr>
+          <p:cNvSpPr txBox="1"/>
+          <p:nvPr/>
+        </p:nvSpPr>
+        <p:spPr>
+          <a:xfrm>
+            <a:off x="3794024" y="5543467"/>
+            <a:ext cx="1860064" cy="420628"/>
+          </a:xfrm>
+          <a:prstGeom prst="rect">
+            <a:avLst/>
+          </a:prstGeom>
+          <a:noFill/>
+        </p:spPr>
+        <p:txBody>
+          <a:bodyPr wrap="square" rtlCol="0">
+            <a:spAutoFit/>
+          </a:bodyPr>
+          <a:lstStyle/>
+          <a:p>
+            <a:pPr algn="ctr"/>
+            <a:r>
+              <a:rPr lang="en-US" sz="3200" b="1" baseline="-25000" dirty="0"/>
+              <a:t>Hidden Layer</a:t>
+            </a:r>
+          </a:p>
+        </p:txBody>
+      </p:sp>
+      <p:sp>
+        <p:nvSpPr>
+          <p:cNvPr id="31" name="Right Brace 30">
+            <a:extLst>
+              <a:ext uri="{FF2B5EF4-FFF2-40B4-BE49-F238E27FC236}">
+                <a16:creationId xmlns:a16="http://schemas.microsoft.com/office/drawing/2014/main" id="{9173B771-E8DD-40E0-B54E-911C022A304D}"/>
+              </a:ext>
+            </a:extLst>
+          </p:cNvPr>
+          <p:cNvSpPr/>
+          <p:nvPr/>
+        </p:nvSpPr>
+        <p:spPr>
+          <a:xfrm rot="5400000">
+            <a:off x="7731069" y="4051864"/>
+            <a:ext cx="426408" cy="2456822"/>
+          </a:xfrm>
+          <a:prstGeom prst="rightBrace">
+            <a:avLst>
+              <a:gd name="adj1" fmla="val 0"/>
+              <a:gd name="adj2" fmla="val 50000"/>
+            </a:avLst>
+          </a:prstGeom>
+          <a:ln w="31750"/>
+        </p:spPr>
+        <p:style>
+          <a:lnRef idx="1">
+            <a:schemeClr val="accent1"/>
+          </a:lnRef>
+          <a:fillRef idx="0">
+            <a:schemeClr val="accent1"/>
+          </a:fillRef>
+          <a:effectRef idx="0">
+            <a:schemeClr val="accent1"/>
+          </a:effectRef>
+          <a:fontRef idx="minor">
+            <a:schemeClr val="tx1"/>
+          </a:fontRef>
+        </p:style>
+        <p:txBody>
+          <a:bodyPr rtlCol="0" anchor="ctr"/>
+          <a:lstStyle/>
+          <a:p>
+            <a:pPr algn="ctr"/>
+            <a:endParaRPr lang="en-US"/>
+          </a:p>
+        </p:txBody>
+      </p:sp>
+      <p:sp>
+        <p:nvSpPr>
+          <p:cNvPr id="32" name="TextBox 31">
+            <a:extLst>
+              <a:ext uri="{FF2B5EF4-FFF2-40B4-BE49-F238E27FC236}">
+                <a16:creationId xmlns:a16="http://schemas.microsoft.com/office/drawing/2014/main" id="{6DDE0CB4-B8D8-4D0D-93A1-3A167835B00B}"/>
+              </a:ext>
+            </a:extLst>
+          </p:cNvPr>
+          <p:cNvSpPr txBox="1"/>
+          <p:nvPr/>
+        </p:nvSpPr>
+        <p:spPr>
+          <a:xfrm>
+            <a:off x="7036292" y="5543004"/>
+            <a:ext cx="1860064" cy="420628"/>
+          </a:xfrm>
+          <a:prstGeom prst="rect">
+            <a:avLst/>
+          </a:prstGeom>
+          <a:noFill/>
+        </p:spPr>
+        <p:txBody>
+          <a:bodyPr wrap="square" rtlCol="0">
+            <a:spAutoFit/>
+          </a:bodyPr>
+          <a:lstStyle/>
+          <a:p>
+            <a:pPr algn="ctr"/>
+            <a:r>
+              <a:rPr lang="en-US" sz="3200" b="1" baseline="-25000" dirty="0"/>
+              <a:t>Output Layer</a:t>
+            </a:r>
+          </a:p>
+        </p:txBody>
+      </p:sp>
+      <p:sp>
+        <p:nvSpPr>
+          <p:cNvPr id="33" name="Right Brace 32">
+            <a:extLst>
+              <a:ext uri="{FF2B5EF4-FFF2-40B4-BE49-F238E27FC236}">
+                <a16:creationId xmlns:a16="http://schemas.microsoft.com/office/drawing/2014/main" id="{579D474D-BA2C-4B6A-A39C-3CB68B398441}"/>
+              </a:ext>
+            </a:extLst>
+          </p:cNvPr>
+          <p:cNvSpPr/>
+          <p:nvPr/>
+        </p:nvSpPr>
+        <p:spPr>
+          <a:xfrm rot="5400000">
+            <a:off x="1003995" y="4754321"/>
+            <a:ext cx="426408" cy="1015746"/>
+          </a:xfrm>
+          <a:prstGeom prst="rightBrace">
+            <a:avLst>
+              <a:gd name="adj1" fmla="val 0"/>
+              <a:gd name="adj2" fmla="val 50000"/>
+            </a:avLst>
+          </a:prstGeom>
+          <a:ln w="31750"/>
+        </p:spPr>
+        <p:style>
+          <a:lnRef idx="1">
+            <a:schemeClr val="accent1"/>
+          </a:lnRef>
+          <a:fillRef idx="0">
+            <a:schemeClr val="accent1"/>
+          </a:fillRef>
+          <a:effectRef idx="0">
+            <a:schemeClr val="accent1"/>
+          </a:effectRef>
+          <a:fontRef idx="minor">
+            <a:schemeClr val="tx1"/>
+          </a:fontRef>
+        </p:style>
+        <p:txBody>
+          <a:bodyPr rtlCol="0" anchor="ctr"/>
+          <a:lstStyle/>
+          <a:p>
+            <a:pPr algn="ctr"/>
+            <a:endParaRPr lang="en-US" dirty="0"/>
+          </a:p>
+        </p:txBody>
+      </p:sp>
+      <p:sp>
+        <p:nvSpPr>
+          <p:cNvPr id="34" name="TextBox 33">
+            <a:extLst>
+              <a:ext uri="{FF2B5EF4-FFF2-40B4-BE49-F238E27FC236}">
+                <a16:creationId xmlns:a16="http://schemas.microsoft.com/office/drawing/2014/main" id="{DB1FF568-C283-41F9-A5AF-7F0B093CD811}"/>
+              </a:ext>
+            </a:extLst>
+          </p:cNvPr>
+          <p:cNvSpPr txBox="1"/>
+          <p:nvPr/>
+        </p:nvSpPr>
+        <p:spPr>
+          <a:xfrm>
+            <a:off x="381582" y="5516210"/>
+            <a:ext cx="1671234" cy="420628"/>
+          </a:xfrm>
+          <a:prstGeom prst="rect">
+            <a:avLst/>
+          </a:prstGeom>
+          <a:noFill/>
+        </p:spPr>
+        <p:txBody>
+          <a:bodyPr wrap="square" rtlCol="0">
+            <a:spAutoFit/>
+          </a:bodyPr>
+          <a:lstStyle/>
+          <a:p>
+            <a:pPr algn="ctr"/>
+            <a:r>
+              <a:rPr lang="en-US" sz="3200" b="1" baseline="-25000" dirty="0"/>
+              <a:t>Input Layer</a:t>
+            </a:r>
+          </a:p>
+        </p:txBody>
+      </p:sp>
+      <p:sp>
+        <p:nvSpPr>
+          <p:cNvPr id="41" name="Oval 40">
+            <a:extLst>
+              <a:ext uri="{FF2B5EF4-FFF2-40B4-BE49-F238E27FC236}">
+                <a16:creationId xmlns:a16="http://schemas.microsoft.com/office/drawing/2014/main" id="{AC5A948E-0B37-49BF-9700-9DA5D7FF47EF}"/>
+              </a:ext>
+            </a:extLst>
+          </p:cNvPr>
+          <p:cNvSpPr/>
+          <p:nvPr/>
+        </p:nvSpPr>
+        <p:spPr>
+          <a:xfrm>
+            <a:off x="9808021" y="1694403"/>
+            <a:ext cx="2101442" cy="1941979"/>
+          </a:xfrm>
+          <a:prstGeom prst="ellipse">
+            <a:avLst/>
+          </a:prstGeom>
+          <a:noFill/>
+          <a:ln w="31750"/>
+        </p:spPr>
+        <p:style>
+          <a:lnRef idx="2">
+            <a:schemeClr val="accent1">
+              <a:shade val="50000"/>
+            </a:schemeClr>
+          </a:lnRef>
+          <a:fillRef idx="1">
+            <a:schemeClr val="accent1"/>
+          </a:fillRef>
+          <a:effectRef idx="0">
+            <a:schemeClr val="accent1"/>
+          </a:effectRef>
+          <a:fontRef idx="minor">
+            <a:schemeClr val="lt1"/>
+          </a:fontRef>
+        </p:style>
+        <p:txBody>
+          <a:bodyPr rtlCol="0" anchor="ctr"/>
+          <a:lstStyle/>
+          <a:p>
+            <a:pPr algn="ctr"/>
+            <a:endParaRPr lang="en-US"/>
+          </a:p>
+        </p:txBody>
+      </p:sp>
+      <p:sp>
+        <p:nvSpPr>
+          <p:cNvPr id="43" name="TextBox 42">
+            <a:extLst>
+              <a:ext uri="{FF2B5EF4-FFF2-40B4-BE49-F238E27FC236}">
+                <a16:creationId xmlns:a16="http://schemas.microsoft.com/office/drawing/2014/main" id="{391803F3-7E4D-4585-BDC0-55315ECF6918}"/>
+              </a:ext>
+            </a:extLst>
+          </p:cNvPr>
+          <p:cNvSpPr txBox="1"/>
+          <p:nvPr/>
+        </p:nvSpPr>
+        <p:spPr>
+          <a:xfrm>
+            <a:off x="9795223" y="2342718"/>
+            <a:ext cx="1957555" cy="584775"/>
+          </a:xfrm>
+          <a:prstGeom prst="rect">
+            <a:avLst/>
+          </a:prstGeom>
+          <a:noFill/>
+        </p:spPr>
+        <p:txBody>
+          <a:bodyPr wrap="square" rtlCol="0">
+            <a:spAutoFit/>
+          </a:bodyPr>
+          <a:lstStyle/>
+          <a:p>
+            <a:pPr algn="ctr"/>
+            <a:r>
+              <a:rPr lang="en-US" sz="3200" b="1" dirty="0"/>
+              <a:t>E(W)</a:t>
+            </a:r>
+            <a:endParaRPr lang="en-US" sz="2800" b="1" dirty="0">
+              <a:latin typeface="Symbol" panose="05050102010706020507" pitchFamily="18" charset="2"/>
+            </a:endParaRPr>
+          </a:p>
+        </p:txBody>
+      </p:sp>
+      <p:sp>
+        <p:nvSpPr>
+          <p:cNvPr id="44" name="TextBox 43">
+            <a:extLst>
+              <a:ext uri="{FF2B5EF4-FFF2-40B4-BE49-F238E27FC236}">
+                <a16:creationId xmlns:a16="http://schemas.microsoft.com/office/drawing/2014/main" id="{75E2BAEA-89CE-495A-B9EC-3AA12B4D783D}"/>
+              </a:ext>
+            </a:extLst>
+          </p:cNvPr>
+          <p:cNvSpPr txBox="1"/>
+          <p:nvPr/>
+        </p:nvSpPr>
+        <p:spPr>
+          <a:xfrm>
+            <a:off x="9654395" y="4207833"/>
+            <a:ext cx="454339" cy="584775"/>
+          </a:xfrm>
+          <a:prstGeom prst="rect">
+            <a:avLst/>
+          </a:prstGeom>
+          <a:noFill/>
+        </p:spPr>
+        <p:txBody>
+          <a:bodyPr wrap="square" rtlCol="0">
+            <a:spAutoFit/>
+          </a:bodyPr>
+          <a:lstStyle/>
+          <a:p>
+            <a:r>
+              <a:rPr lang="en-US" sz="3200" b="1" dirty="0"/>
+              <a:t>Y</a:t>
+            </a:r>
+          </a:p>
+        </p:txBody>
+      </p:sp>
+      <p:cxnSp>
+        <p:nvCxnSpPr>
+          <p:cNvPr id="45" name="Straight Arrow Connector 44">
+            <a:extLst>
+              <a:ext uri="{FF2B5EF4-FFF2-40B4-BE49-F238E27FC236}">
+                <a16:creationId xmlns:a16="http://schemas.microsoft.com/office/drawing/2014/main" id="{18D3A321-F41E-4CEF-907E-E5E15EFD0097}"/>
+              </a:ext>
+            </a:extLst>
+          </p:cNvPr>
+          <p:cNvCxnSpPr>
+            <a:cxnSpLocks/>
+            <a:stCxn id="44" idx="0"/>
+          </p:cNvCxnSpPr>
+          <p:nvPr/>
+        </p:nvCxnSpPr>
+        <p:spPr>
+          <a:xfrm flipV="1">
+            <a:off x="9881565" y="3528477"/>
+            <a:ext cx="454339" cy="679356"/>
+          </a:xfrm>
+          <a:prstGeom prst="straightConnector1">
+            <a:avLst/>
+          </a:prstGeom>
+          <a:ln w="31750">
+            <a:tailEnd type="triangle"/>
+          </a:ln>
+        </p:spPr>
+        <p:style>
+          <a:lnRef idx="1">
+            <a:schemeClr val="accent1"/>
+          </a:lnRef>
+          <a:fillRef idx="0">
+            <a:schemeClr val="accent1"/>
+          </a:fillRef>
+          <a:effectRef idx="0">
+            <a:schemeClr val="accent1"/>
+          </a:effectRef>
+          <a:fontRef idx="minor">
+            <a:schemeClr val="tx1"/>
+          </a:fontRef>
+        </p:style>
+      </p:cxnSp>
+      <p:sp>
+        <p:nvSpPr>
+          <p:cNvPr id="48" name="Right Brace 47">
+            <a:extLst>
+              <a:ext uri="{FF2B5EF4-FFF2-40B4-BE49-F238E27FC236}">
+                <a16:creationId xmlns:a16="http://schemas.microsoft.com/office/drawing/2014/main" id="{10112D52-0987-4029-A419-1C71E8925374}"/>
+              </a:ext>
+            </a:extLst>
+          </p:cNvPr>
+          <p:cNvSpPr/>
+          <p:nvPr/>
+        </p:nvSpPr>
+        <p:spPr>
+          <a:xfrm rot="5400000">
+            <a:off x="10667950" y="4207141"/>
+            <a:ext cx="381579" cy="2101440"/>
+          </a:xfrm>
+          <a:prstGeom prst="rightBrace">
+            <a:avLst>
+              <a:gd name="adj1" fmla="val 0"/>
+              <a:gd name="adj2" fmla="val 50000"/>
+            </a:avLst>
+          </a:prstGeom>
+          <a:ln w="31750"/>
+        </p:spPr>
+        <p:style>
+          <a:lnRef idx="1">
+            <a:schemeClr val="accent1"/>
+          </a:lnRef>
+          <a:fillRef idx="0">
+            <a:schemeClr val="accent1"/>
+          </a:fillRef>
+          <a:effectRef idx="0">
+            <a:schemeClr val="accent1"/>
+          </a:effectRef>
+          <a:fontRef idx="minor">
+            <a:schemeClr val="tx1"/>
+          </a:fontRef>
+        </p:style>
+        <p:txBody>
+          <a:bodyPr rtlCol="0" anchor="ctr"/>
+          <a:lstStyle/>
+          <a:p>
+            <a:pPr algn="ctr"/>
+            <a:endParaRPr lang="en-US" dirty="0"/>
+          </a:p>
+        </p:txBody>
+      </p:sp>
+      <p:sp>
+        <p:nvSpPr>
+          <p:cNvPr id="49" name="TextBox 48">
+            <a:extLst>
+              <a:ext uri="{FF2B5EF4-FFF2-40B4-BE49-F238E27FC236}">
+                <a16:creationId xmlns:a16="http://schemas.microsoft.com/office/drawing/2014/main" id="{C15CF991-0140-4F0D-9BA5-C0005E272903}"/>
+              </a:ext>
+            </a:extLst>
+          </p:cNvPr>
+          <p:cNvSpPr txBox="1"/>
+          <p:nvPr/>
+        </p:nvSpPr>
+        <p:spPr>
+          <a:xfrm>
+            <a:off x="9808019" y="5529242"/>
+            <a:ext cx="2101441" cy="420628"/>
+          </a:xfrm>
+          <a:prstGeom prst="rect">
+            <a:avLst/>
+          </a:prstGeom>
+          <a:noFill/>
+        </p:spPr>
+        <p:txBody>
+          <a:bodyPr wrap="square" rtlCol="0">
+            <a:spAutoFit/>
+          </a:bodyPr>
+          <a:lstStyle/>
+          <a:p>
+            <a:pPr algn="ctr"/>
+            <a:r>
+              <a:rPr lang="en-US" sz="3200" b="1" baseline="-25000" dirty="0"/>
+              <a:t>Loss Function</a:t>
+            </a:r>
+          </a:p>
+        </p:txBody>
+      </p:sp>
+    </p:spTree>
+    <p:extLst>
+      <p:ext uri="{BB962C8B-B14F-4D97-AF65-F5344CB8AC3E}">
+        <p14:creationId xmlns:p14="http://schemas.microsoft.com/office/powerpoint/2010/main" val="108479004"/>
+      </p:ext>
+    </p:extLst>
+  </p:cSld>
+  <p:clrMapOvr>
+    <a:masterClrMapping/>
+  </p:clrMapOvr>
+</p:sld>
+</file>
+
 <file path=ppt/theme/theme1.xml><?xml version="1.0" encoding="utf-8"?>
 <a:theme xmlns:a="http://schemas.openxmlformats.org/drawingml/2006/main" name="Office Theme">
   <a:themeElements>

</xml_diff>